<commit_message>
Pequeños cambios en ppt 01
</commit_message>
<xml_diff>
--- a/00 PRESENTACIONES compartida alumnos/ED02a - Diagramas de comportamiento CU.pptx
+++ b/00 PRESENTACIONES compartida alumnos/ED02a - Diagramas de comportamiento CU.pptx
@@ -261,7 +261,7 @@
 <file path=ppt/revisionInfo.xml><?xml version="1.0" encoding="utf-8"?>
 <p1510:revInfo xmlns:a="http://schemas.openxmlformats.org/drawingml/2006/main" xmlns:r="http://schemas.openxmlformats.org/officeDocument/2006/relationships" xmlns:p1510="http://schemas.microsoft.com/office/powerpoint/2015/10/main">
   <p1510:revLst>
-    <p1510:client id="{6BB54B94-95A1-4CB9-84EC-4B68CAB84776}" v="13" dt="2025-07-08T08:54:47.159"/>
+    <p1510:client id="{E09DD130-612E-646E-A622-1F0A4BF8BCB8}" v="29" dt="2025-10-04T07:15:30.355"/>
   </p1510:revLst>
 </p1510:revInfo>
 </file>
@@ -269,2604 +269,42 @@
 <file path=ppt/changesInfos/changesInfo1.xml><?xml version="1.0" encoding="utf-8"?>
 <pc:chgInfo xmlns:a="http://schemas.openxmlformats.org/drawingml/2006/main" xmlns:r="http://schemas.openxmlformats.org/officeDocument/2006/relationships" xmlns:ac="http://schemas.microsoft.com/office/drawing/2013/main/command" xmlns:pc="http://schemas.microsoft.com/office/powerpoint/2013/main/command">
   <pc:docChgLst>
-    <pc:chgData name="MIGUEL TRIGUEROS MUÑOZ" userId="93f31087-8566-4d16-a7a1-f20635823349" providerId="ADAL" clId="{88B4D73E-19ED-43A7-8D03-64AAA446BD61}"/>
-    <pc:docChg chg="undo custSel addSld delSld modSld modMainMaster">
-      <pc:chgData name="MIGUEL TRIGUEROS MUÑOZ" userId="93f31087-8566-4d16-a7a1-f20635823349" providerId="ADAL" clId="{88B4D73E-19ED-43A7-8D03-64AAA446BD61}" dt="2022-11-01T11:34:02.916" v="397" actId="20577"/>
+    <pc:chgData name="MIGUEL TRIGUEROS MUÑOZ" userId="S::miguel.trigueros@aulaxxi.murciaeduca.es::a4ee0321-97d7-430f-98a8-7ed13ff9a4bf" providerId="AD" clId="Web-{E09DD130-612E-646E-A622-1F0A4BF8BCB8}"/>
+    <pc:docChg chg="modSld sldOrd">
+      <pc:chgData name="MIGUEL TRIGUEROS MUÑOZ" userId="S::miguel.trigueros@aulaxxi.murciaeduca.es::a4ee0321-97d7-430f-98a8-7ed13ff9a4bf" providerId="AD" clId="Web-{E09DD130-612E-646E-A622-1F0A4BF8BCB8}" dt="2025-10-04T07:15:30.355" v="28" actId="20577"/>
       <pc:docMkLst>
         <pc:docMk/>
       </pc:docMkLst>
-      <pc:sldChg chg="delSp modSp mod">
-        <pc:chgData name="MIGUEL TRIGUEROS MUÑOZ" userId="93f31087-8566-4d16-a7a1-f20635823349" providerId="ADAL" clId="{88B4D73E-19ED-43A7-8D03-64AAA446BD61}" dt="2022-11-01T11:03:41.795" v="235" actId="478"/>
-        <pc:sldMkLst>
-          <pc:docMk/>
-          <pc:sldMk cId="308865771" sldId="256"/>
-        </pc:sldMkLst>
-      </pc:sldChg>
-      <pc:sldChg chg="del">
-        <pc:chgData name="MIGUEL TRIGUEROS MUÑOZ" userId="93f31087-8566-4d16-a7a1-f20635823349" providerId="ADAL" clId="{88B4D73E-19ED-43A7-8D03-64AAA446BD61}" dt="2022-11-01T10:58:17.753" v="0" actId="47"/>
-        <pc:sldMkLst>
-          <pc:docMk/>
-          <pc:sldMk cId="0" sldId="257"/>
-        </pc:sldMkLst>
-      </pc:sldChg>
-      <pc:sldChg chg="del">
-        <pc:chgData name="MIGUEL TRIGUEROS MUÑOZ" userId="93f31087-8566-4d16-a7a1-f20635823349" providerId="ADAL" clId="{88B4D73E-19ED-43A7-8D03-64AAA446BD61}" dt="2022-11-01T11:00:45.772" v="68" actId="47"/>
-        <pc:sldMkLst>
-          <pc:docMk/>
-          <pc:sldMk cId="0" sldId="272"/>
-        </pc:sldMkLst>
-      </pc:sldChg>
-      <pc:sldChg chg="del">
-        <pc:chgData name="MIGUEL TRIGUEROS MUÑOZ" userId="93f31087-8566-4d16-a7a1-f20635823349" providerId="ADAL" clId="{88B4D73E-19ED-43A7-8D03-64AAA446BD61}" dt="2022-11-01T11:00:46.915" v="69" actId="47"/>
-        <pc:sldMkLst>
-          <pc:docMk/>
-          <pc:sldMk cId="0" sldId="273"/>
-        </pc:sldMkLst>
-      </pc:sldChg>
-      <pc:sldChg chg="del">
-        <pc:chgData name="MIGUEL TRIGUEROS MUÑOZ" userId="93f31087-8566-4d16-a7a1-f20635823349" providerId="ADAL" clId="{88B4D73E-19ED-43A7-8D03-64AAA446BD61}" dt="2022-11-01T11:00:47.711" v="70" actId="47"/>
-        <pc:sldMkLst>
-          <pc:docMk/>
-          <pc:sldMk cId="0" sldId="274"/>
-        </pc:sldMkLst>
-      </pc:sldChg>
-      <pc:sldChg chg="del">
-        <pc:chgData name="MIGUEL TRIGUEROS MUÑOZ" userId="93f31087-8566-4d16-a7a1-f20635823349" providerId="ADAL" clId="{88B4D73E-19ED-43A7-8D03-64AAA446BD61}" dt="2022-11-01T11:00:48.560" v="71" actId="47"/>
-        <pc:sldMkLst>
-          <pc:docMk/>
-          <pc:sldMk cId="0" sldId="275"/>
-        </pc:sldMkLst>
-      </pc:sldChg>
-      <pc:sldChg chg="del">
-        <pc:chgData name="MIGUEL TRIGUEROS MUÑOZ" userId="93f31087-8566-4d16-a7a1-f20635823349" providerId="ADAL" clId="{88B4D73E-19ED-43A7-8D03-64AAA446BD61}" dt="2022-11-01T11:00:50.837" v="73" actId="47"/>
-        <pc:sldMkLst>
-          <pc:docMk/>
-          <pc:sldMk cId="0" sldId="276"/>
-        </pc:sldMkLst>
-      </pc:sldChg>
-      <pc:sldChg chg="del">
-        <pc:chgData name="MIGUEL TRIGUEROS MUÑOZ" userId="93f31087-8566-4d16-a7a1-f20635823349" providerId="ADAL" clId="{88B4D73E-19ED-43A7-8D03-64AAA446BD61}" dt="2022-11-01T11:00:49.382" v="72" actId="47"/>
-        <pc:sldMkLst>
-          <pc:docMk/>
-          <pc:sldMk cId="0" sldId="277"/>
-        </pc:sldMkLst>
-      </pc:sldChg>
-      <pc:sldChg chg="del">
-        <pc:chgData name="MIGUEL TRIGUEROS MUÑOZ" userId="93f31087-8566-4d16-a7a1-f20635823349" providerId="ADAL" clId="{88B4D73E-19ED-43A7-8D03-64AAA446BD61}" dt="2022-11-01T11:00:51.815" v="74" actId="47"/>
-        <pc:sldMkLst>
-          <pc:docMk/>
-          <pc:sldMk cId="0" sldId="293"/>
-        </pc:sldMkLst>
-      </pc:sldChg>
-      <pc:sldChg chg="addSp delSp modSp mod">
-        <pc:chgData name="MIGUEL TRIGUEROS MUÑOZ" userId="93f31087-8566-4d16-a7a1-f20635823349" providerId="ADAL" clId="{88B4D73E-19ED-43A7-8D03-64AAA446BD61}" dt="2022-11-01T11:07:33.099" v="374" actId="113"/>
-        <pc:sldMkLst>
-          <pc:docMk/>
-          <pc:sldMk cId="2182144064" sldId="295"/>
-        </pc:sldMkLst>
-      </pc:sldChg>
-      <pc:sldChg chg="delSp modSp mod">
-        <pc:chgData name="MIGUEL TRIGUEROS MUÑOZ" userId="93f31087-8566-4d16-a7a1-f20635823349" providerId="ADAL" clId="{88B4D73E-19ED-43A7-8D03-64AAA446BD61}" dt="2022-11-01T11:03:45.399" v="237" actId="478"/>
-        <pc:sldMkLst>
-          <pc:docMk/>
-          <pc:sldMk cId="3881213358" sldId="296"/>
-        </pc:sldMkLst>
-      </pc:sldChg>
-      <pc:sldChg chg="delSp modSp mod">
-        <pc:chgData name="MIGUEL TRIGUEROS MUÑOZ" userId="93f31087-8566-4d16-a7a1-f20635823349" providerId="ADAL" clId="{88B4D73E-19ED-43A7-8D03-64AAA446BD61}" dt="2022-11-01T11:03:46.722" v="238" actId="478"/>
+      <pc:sldChg chg="ord">
+        <pc:chgData name="MIGUEL TRIGUEROS MUÑOZ" userId="S::miguel.trigueros@aulaxxi.murciaeduca.es::a4ee0321-97d7-430f-98a8-7ed13ff9a4bf" providerId="AD" clId="Web-{E09DD130-612E-646E-A622-1F0A4BF8BCB8}" dt="2025-10-04T07:06:29.649" v="0"/>
         <pc:sldMkLst>
           <pc:docMk/>
           <pc:sldMk cId="651048111" sldId="297"/>
         </pc:sldMkLst>
       </pc:sldChg>
-      <pc:sldChg chg="delSp modSp mod">
-        <pc:chgData name="MIGUEL TRIGUEROS MUÑOZ" userId="93f31087-8566-4d16-a7a1-f20635823349" providerId="ADAL" clId="{88B4D73E-19ED-43A7-8D03-64AAA446BD61}" dt="2022-11-01T11:03:47.654" v="239" actId="478"/>
-        <pc:sldMkLst>
-          <pc:docMk/>
-          <pc:sldMk cId="1285496475" sldId="298"/>
-        </pc:sldMkLst>
-      </pc:sldChg>
-      <pc:sldChg chg="delSp modSp mod">
-        <pc:chgData name="MIGUEL TRIGUEROS MUÑOZ" userId="93f31087-8566-4d16-a7a1-f20635823349" providerId="ADAL" clId="{88B4D73E-19ED-43A7-8D03-64AAA446BD61}" dt="2022-11-01T11:03:48.511" v="240" actId="478"/>
-        <pc:sldMkLst>
-          <pc:docMk/>
-          <pc:sldMk cId="975738591" sldId="299"/>
-        </pc:sldMkLst>
-      </pc:sldChg>
-      <pc:sldChg chg="delSp modSp mod">
-        <pc:chgData name="MIGUEL TRIGUEROS MUÑOZ" userId="93f31087-8566-4d16-a7a1-f20635823349" providerId="ADAL" clId="{88B4D73E-19ED-43A7-8D03-64AAA446BD61}" dt="2022-11-01T11:03:49.477" v="241" actId="478"/>
-        <pc:sldMkLst>
-          <pc:docMk/>
-          <pc:sldMk cId="1286011775" sldId="300"/>
-        </pc:sldMkLst>
-      </pc:sldChg>
-      <pc:sldChg chg="add del">
-        <pc:chgData name="MIGUEL TRIGUEROS MUÑOZ" userId="93f31087-8566-4d16-a7a1-f20635823349" providerId="ADAL" clId="{88B4D73E-19ED-43A7-8D03-64AAA446BD61}" dt="2022-11-01T11:01:00.328" v="77" actId="47"/>
-        <pc:sldMkLst>
-          <pc:docMk/>
-          <pc:sldMk cId="4280179594" sldId="301"/>
-        </pc:sldMkLst>
-      </pc:sldChg>
-      <pc:sldChg chg="delSp modSp mod">
-        <pc:chgData name="MIGUEL TRIGUEROS MUÑOZ" userId="93f31087-8566-4d16-a7a1-f20635823349" providerId="ADAL" clId="{88B4D73E-19ED-43A7-8D03-64AAA446BD61}" dt="2022-11-01T11:34:02.916" v="397" actId="20577"/>
-        <pc:sldMkLst>
-          <pc:docMk/>
-          <pc:sldMk cId="1662085430" sldId="302"/>
-        </pc:sldMkLst>
-      </pc:sldChg>
-      <pc:sldChg chg="del">
-        <pc:chgData name="MIGUEL TRIGUEROS MUÑOZ" userId="93f31087-8566-4d16-a7a1-f20635823349" providerId="ADAL" clId="{88B4D73E-19ED-43A7-8D03-64AAA446BD61}" dt="2022-11-01T11:01:03.209" v="79" actId="47"/>
-        <pc:sldMkLst>
-          <pc:docMk/>
-          <pc:sldMk cId="40683663" sldId="303"/>
-        </pc:sldMkLst>
-      </pc:sldChg>
-      <pc:sldChg chg="delSp modSp mod">
-        <pc:chgData name="MIGUEL TRIGUEROS MUÑOZ" userId="93f31087-8566-4d16-a7a1-f20635823349" providerId="ADAL" clId="{88B4D73E-19ED-43A7-8D03-64AAA446BD61}" dt="2022-11-01T11:03:50.499" v="242" actId="478"/>
-        <pc:sldMkLst>
-          <pc:docMk/>
-          <pc:sldMk cId="1878582030" sldId="304"/>
-        </pc:sldMkLst>
-      </pc:sldChg>
-      <pc:sldChg chg="delSp modSp mod">
-        <pc:chgData name="MIGUEL TRIGUEROS MUÑOZ" userId="93f31087-8566-4d16-a7a1-f20635823349" providerId="ADAL" clId="{88B4D73E-19ED-43A7-8D03-64AAA446BD61}" dt="2022-11-01T11:03:51.482" v="243" actId="478"/>
-        <pc:sldMkLst>
-          <pc:docMk/>
-          <pc:sldMk cId="524834107" sldId="305"/>
-        </pc:sldMkLst>
-      </pc:sldChg>
-      <pc:sldChg chg="delSp modSp mod">
-        <pc:chgData name="MIGUEL TRIGUEROS MUÑOZ" userId="93f31087-8566-4d16-a7a1-f20635823349" providerId="ADAL" clId="{88B4D73E-19ED-43A7-8D03-64AAA446BD61}" dt="2022-11-01T11:03:52.418" v="244" actId="478"/>
-        <pc:sldMkLst>
-          <pc:docMk/>
-          <pc:sldMk cId="3007344242" sldId="306"/>
-        </pc:sldMkLst>
-      </pc:sldChg>
-      <pc:sldChg chg="del">
-        <pc:chgData name="MIGUEL TRIGUEROS MUÑOZ" userId="93f31087-8566-4d16-a7a1-f20635823349" providerId="ADAL" clId="{88B4D73E-19ED-43A7-8D03-64AAA446BD61}" dt="2022-11-01T11:01:01.510" v="78" actId="47"/>
-        <pc:sldMkLst>
-          <pc:docMk/>
-          <pc:sldMk cId="1441313987" sldId="308"/>
-        </pc:sldMkLst>
-      </pc:sldChg>
-      <pc:sldChg chg="delSp modSp mod">
-        <pc:chgData name="MIGUEL TRIGUEROS MUÑOZ" userId="93f31087-8566-4d16-a7a1-f20635823349" providerId="ADAL" clId="{88B4D73E-19ED-43A7-8D03-64AAA446BD61}" dt="2022-11-01T11:03:53.358" v="245" actId="478"/>
-        <pc:sldMkLst>
-          <pc:docMk/>
-          <pc:sldMk cId="1679762254" sldId="309"/>
-        </pc:sldMkLst>
-      </pc:sldChg>
-      <pc:sldChg chg="delSp modSp mod">
-        <pc:chgData name="MIGUEL TRIGUEROS MUÑOZ" userId="93f31087-8566-4d16-a7a1-f20635823349" providerId="ADAL" clId="{88B4D73E-19ED-43A7-8D03-64AAA446BD61}" dt="2022-11-01T11:03:54.529" v="246" actId="478"/>
-        <pc:sldMkLst>
-          <pc:docMk/>
-          <pc:sldMk cId="2242644199" sldId="310"/>
-        </pc:sldMkLst>
-      </pc:sldChg>
-      <pc:sldChg chg="delSp modSp mod">
-        <pc:chgData name="MIGUEL TRIGUEROS MUÑOZ" userId="93f31087-8566-4d16-a7a1-f20635823349" providerId="ADAL" clId="{88B4D73E-19ED-43A7-8D03-64AAA446BD61}" dt="2022-11-01T11:04:18.335" v="260" actId="1038"/>
-        <pc:sldMkLst>
-          <pc:docMk/>
-          <pc:sldMk cId="1813723418" sldId="311"/>
-        </pc:sldMkLst>
-      </pc:sldChg>
-      <pc:sldChg chg="delSp modSp mod">
-        <pc:chgData name="MIGUEL TRIGUEROS MUÑOZ" userId="93f31087-8566-4d16-a7a1-f20635823349" providerId="ADAL" clId="{88B4D73E-19ED-43A7-8D03-64AAA446BD61}" dt="2022-11-01T11:03:56.863" v="248" actId="478"/>
-        <pc:sldMkLst>
-          <pc:docMk/>
-          <pc:sldMk cId="2269836530" sldId="312"/>
-        </pc:sldMkLst>
-      </pc:sldChg>
-      <pc:sldChg chg="delSp modSp mod">
-        <pc:chgData name="MIGUEL TRIGUEROS MUÑOZ" userId="93f31087-8566-4d16-a7a1-f20635823349" providerId="ADAL" clId="{88B4D73E-19ED-43A7-8D03-64AAA446BD61}" dt="2022-11-01T11:03:58.101" v="249" actId="478"/>
-        <pc:sldMkLst>
-          <pc:docMk/>
-          <pc:sldMk cId="1814859966" sldId="313"/>
-        </pc:sldMkLst>
-      </pc:sldChg>
-      <pc:sldChg chg="modSp new mod">
-        <pc:chgData name="MIGUEL TRIGUEROS MUÑOZ" userId="93f31087-8566-4d16-a7a1-f20635823349" providerId="ADAL" clId="{88B4D73E-19ED-43A7-8D03-64AAA446BD61}" dt="2022-11-01T11:03:24.021" v="234"/>
-        <pc:sldMkLst>
-          <pc:docMk/>
-          <pc:sldMk cId="745458148" sldId="314"/>
-        </pc:sldMkLst>
-      </pc:sldChg>
-      <pc:sldMasterChg chg="modSp modSldLayout">
-        <pc:chgData name="MIGUEL TRIGUEROS MUÑOZ" userId="93f31087-8566-4d16-a7a1-f20635823349" providerId="ADAL" clId="{88B4D73E-19ED-43A7-8D03-64AAA446BD61}" dt="2022-11-01T11:03:24.021" v="234"/>
-        <pc:sldMasterMkLst>
-          <pc:docMk/>
-          <pc:sldMasterMk cId="1556463269" sldId="2147483650"/>
-        </pc:sldMasterMkLst>
-        <pc:sldLayoutChg chg="modSp">
-          <pc:chgData name="MIGUEL TRIGUEROS MUÑOZ" userId="93f31087-8566-4d16-a7a1-f20635823349" providerId="ADAL" clId="{88B4D73E-19ED-43A7-8D03-64AAA446BD61}" dt="2022-11-01T11:03:24.021" v="234"/>
-          <pc:sldLayoutMkLst>
-            <pc:docMk/>
-            <pc:sldMasterMk cId="1556463269" sldId="2147483650"/>
-            <pc:sldLayoutMk cId="2457708068" sldId="2147483651"/>
-          </pc:sldLayoutMkLst>
-        </pc:sldLayoutChg>
-        <pc:sldLayoutChg chg="modSp">
-          <pc:chgData name="MIGUEL TRIGUEROS MUÑOZ" userId="93f31087-8566-4d16-a7a1-f20635823349" providerId="ADAL" clId="{88B4D73E-19ED-43A7-8D03-64AAA446BD61}" dt="2022-11-01T11:03:24.021" v="234"/>
-          <pc:sldLayoutMkLst>
-            <pc:docMk/>
-            <pc:sldMasterMk cId="1556463269" sldId="2147483650"/>
-            <pc:sldLayoutMk cId="476614851" sldId="2147483653"/>
-          </pc:sldLayoutMkLst>
-        </pc:sldLayoutChg>
-        <pc:sldLayoutChg chg="modSp">
-          <pc:chgData name="MIGUEL TRIGUEROS MUÑOZ" userId="93f31087-8566-4d16-a7a1-f20635823349" providerId="ADAL" clId="{88B4D73E-19ED-43A7-8D03-64AAA446BD61}" dt="2022-11-01T11:03:24.021" v="234"/>
-          <pc:sldLayoutMkLst>
-            <pc:docMk/>
-            <pc:sldMasterMk cId="1556463269" sldId="2147483650"/>
-            <pc:sldLayoutMk cId="3626004973" sldId="2147483654"/>
-          </pc:sldLayoutMkLst>
-        </pc:sldLayoutChg>
-        <pc:sldLayoutChg chg="modSp">
-          <pc:chgData name="MIGUEL TRIGUEROS MUÑOZ" userId="93f31087-8566-4d16-a7a1-f20635823349" providerId="ADAL" clId="{88B4D73E-19ED-43A7-8D03-64AAA446BD61}" dt="2022-11-01T11:03:24.021" v="234"/>
-          <pc:sldLayoutMkLst>
-            <pc:docMk/>
-            <pc:sldMasterMk cId="1556463269" sldId="2147483650"/>
-            <pc:sldLayoutMk cId="1820072059" sldId="2147483655"/>
-          </pc:sldLayoutMkLst>
-        </pc:sldLayoutChg>
-        <pc:sldLayoutChg chg="modSp">
-          <pc:chgData name="MIGUEL TRIGUEROS MUÑOZ" userId="93f31087-8566-4d16-a7a1-f20635823349" providerId="ADAL" clId="{88B4D73E-19ED-43A7-8D03-64AAA446BD61}" dt="2022-11-01T11:03:24.021" v="234"/>
-          <pc:sldLayoutMkLst>
-            <pc:docMk/>
-            <pc:sldMasterMk cId="1556463269" sldId="2147483650"/>
-            <pc:sldLayoutMk cId="1306797549" sldId="2147483656"/>
-          </pc:sldLayoutMkLst>
-        </pc:sldLayoutChg>
-        <pc:sldLayoutChg chg="modSp">
-          <pc:chgData name="MIGUEL TRIGUEROS MUÑOZ" userId="93f31087-8566-4d16-a7a1-f20635823349" providerId="ADAL" clId="{88B4D73E-19ED-43A7-8D03-64AAA446BD61}" dt="2022-11-01T11:03:24.021" v="234"/>
-          <pc:sldLayoutMkLst>
-            <pc:docMk/>
-            <pc:sldMasterMk cId="1556463269" sldId="2147483650"/>
-            <pc:sldLayoutMk cId="1145431880" sldId="2147483658"/>
-          </pc:sldLayoutMkLst>
-        </pc:sldLayoutChg>
-        <pc:sldLayoutChg chg="modSp">
-          <pc:chgData name="MIGUEL TRIGUEROS MUÑOZ" userId="93f31087-8566-4d16-a7a1-f20635823349" providerId="ADAL" clId="{88B4D73E-19ED-43A7-8D03-64AAA446BD61}" dt="2022-11-01T11:03:24.021" v="234"/>
-          <pc:sldLayoutMkLst>
-            <pc:docMk/>
-            <pc:sldMasterMk cId="1556463269" sldId="2147483650"/>
-            <pc:sldLayoutMk cId="483850310" sldId="2147483659"/>
-          </pc:sldLayoutMkLst>
-        </pc:sldLayoutChg>
-        <pc:sldLayoutChg chg="modSp">
-          <pc:chgData name="MIGUEL TRIGUEROS MUÑOZ" userId="93f31087-8566-4d16-a7a1-f20635823349" providerId="ADAL" clId="{88B4D73E-19ED-43A7-8D03-64AAA446BD61}" dt="2022-11-01T11:03:24.021" v="234"/>
-          <pc:sldLayoutMkLst>
-            <pc:docMk/>
-            <pc:sldMasterMk cId="1556463269" sldId="2147483650"/>
-            <pc:sldLayoutMk cId="3010608803" sldId="2147483660"/>
-          </pc:sldLayoutMkLst>
-        </pc:sldLayoutChg>
-        <pc:sldLayoutChg chg="modSp">
-          <pc:chgData name="MIGUEL TRIGUEROS MUÑOZ" userId="93f31087-8566-4d16-a7a1-f20635823349" providerId="ADAL" clId="{88B4D73E-19ED-43A7-8D03-64AAA446BD61}" dt="2022-11-01T11:03:24.021" v="234"/>
-          <pc:sldLayoutMkLst>
-            <pc:docMk/>
-            <pc:sldMasterMk cId="1556463269" sldId="2147483650"/>
-            <pc:sldLayoutMk cId="4005746396" sldId="2147483661"/>
-          </pc:sldLayoutMkLst>
-        </pc:sldLayoutChg>
-        <pc:sldLayoutChg chg="modSp">
-          <pc:chgData name="MIGUEL TRIGUEROS MUÑOZ" userId="93f31087-8566-4d16-a7a1-f20635823349" providerId="ADAL" clId="{88B4D73E-19ED-43A7-8D03-64AAA446BD61}" dt="2022-11-01T11:03:24.021" v="234"/>
-          <pc:sldLayoutMkLst>
-            <pc:docMk/>
-            <pc:sldMasterMk cId="1556463269" sldId="2147483650"/>
-            <pc:sldLayoutMk cId="3598708856" sldId="2147483662"/>
-          </pc:sldLayoutMkLst>
-        </pc:sldLayoutChg>
-        <pc:sldLayoutChg chg="modSp">
-          <pc:chgData name="MIGUEL TRIGUEROS MUÑOZ" userId="93f31087-8566-4d16-a7a1-f20635823349" providerId="ADAL" clId="{88B4D73E-19ED-43A7-8D03-64AAA446BD61}" dt="2022-11-01T11:03:24.021" v="234"/>
-          <pc:sldLayoutMkLst>
-            <pc:docMk/>
-            <pc:sldMasterMk cId="1556463269" sldId="2147483650"/>
-            <pc:sldLayoutMk cId="4071405183" sldId="2147483663"/>
-          </pc:sldLayoutMkLst>
-        </pc:sldLayoutChg>
-        <pc:sldLayoutChg chg="modSp">
-          <pc:chgData name="MIGUEL TRIGUEROS MUÑOZ" userId="93f31087-8566-4d16-a7a1-f20635823349" providerId="ADAL" clId="{88B4D73E-19ED-43A7-8D03-64AAA446BD61}" dt="2022-11-01T11:03:24.021" v="234"/>
-          <pc:sldLayoutMkLst>
-            <pc:docMk/>
-            <pc:sldMasterMk cId="1556463269" sldId="2147483650"/>
-            <pc:sldLayoutMk cId="3029885662" sldId="2147483664"/>
-          </pc:sldLayoutMkLst>
-        </pc:sldLayoutChg>
-        <pc:sldLayoutChg chg="modSp">
-          <pc:chgData name="MIGUEL TRIGUEROS MUÑOZ" userId="93f31087-8566-4d16-a7a1-f20635823349" providerId="ADAL" clId="{88B4D73E-19ED-43A7-8D03-64AAA446BD61}" dt="2022-11-01T11:03:24.021" v="234"/>
-          <pc:sldLayoutMkLst>
-            <pc:docMk/>
-            <pc:sldMasterMk cId="1556463269" sldId="2147483650"/>
-            <pc:sldLayoutMk cId="727740866" sldId="2147483666"/>
-          </pc:sldLayoutMkLst>
-        </pc:sldLayoutChg>
-      </pc:sldMasterChg>
-    </pc:docChg>
-  </pc:docChgLst>
-  <pc:docChgLst>
-    <pc:chgData name="MIGUEL TRIGUEROS MUÑOZ" userId="93f31087-8566-4d16-a7a1-f20635823349" providerId="ADAL" clId="{28A45800-A829-4FF9-9AF1-45101DDF326D}"/>
-    <pc:docChg chg="undo custSel addSld delSld modSld">
-      <pc:chgData name="MIGUEL TRIGUEROS MUÑOZ" userId="93f31087-8566-4d16-a7a1-f20635823349" providerId="ADAL" clId="{28A45800-A829-4FF9-9AF1-45101DDF326D}" dt="2022-11-13T18:01:51.441" v="523" actId="11"/>
-      <pc:docMkLst>
-        <pc:docMk/>
-      </pc:docMkLst>
-      <pc:sldChg chg="delSp modSp mod">
-        <pc:chgData name="MIGUEL TRIGUEROS MUÑOZ" userId="93f31087-8566-4d16-a7a1-f20635823349" providerId="ADAL" clId="{28A45800-A829-4FF9-9AF1-45101DDF326D}" dt="2022-11-13T06:28:42.575" v="312" actId="113"/>
-        <pc:sldMkLst>
-          <pc:docMk/>
-          <pc:sldMk cId="3881213358" sldId="296"/>
-        </pc:sldMkLst>
-      </pc:sldChg>
-      <pc:sldChg chg="modSp mod">
-        <pc:chgData name="MIGUEL TRIGUEROS MUÑOZ" userId="93f31087-8566-4d16-a7a1-f20635823349" providerId="ADAL" clId="{28A45800-A829-4FF9-9AF1-45101DDF326D}" dt="2022-11-13T17:55:53.386" v="473" actId="207"/>
-        <pc:sldMkLst>
-          <pc:docMk/>
-          <pc:sldMk cId="1286011775" sldId="300"/>
-        </pc:sldMkLst>
-      </pc:sldChg>
-      <pc:sldChg chg="modSp add del mod">
-        <pc:chgData name="MIGUEL TRIGUEROS MUÑOZ" userId="93f31087-8566-4d16-a7a1-f20635823349" providerId="ADAL" clId="{28A45800-A829-4FF9-9AF1-45101DDF326D}" dt="2022-11-13T17:59:04.065" v="478"/>
-        <pc:sldMkLst>
-          <pc:docMk/>
-          <pc:sldMk cId="1564841555" sldId="301"/>
-        </pc:sldMkLst>
-      </pc:sldChg>
-      <pc:sldChg chg="modSp mod">
-        <pc:chgData name="MIGUEL TRIGUEROS MUÑOZ" userId="93f31087-8566-4d16-a7a1-f20635823349" providerId="ADAL" clId="{28A45800-A829-4FF9-9AF1-45101DDF326D}" dt="2022-11-13T18:01:51.441" v="523" actId="11"/>
-        <pc:sldMkLst>
-          <pc:docMk/>
-          <pc:sldMk cId="1662085430" sldId="302"/>
-        </pc:sldMkLst>
-      </pc:sldChg>
-      <pc:sldChg chg="modSp add del mod">
-        <pc:chgData name="MIGUEL TRIGUEROS MUÑOZ" userId="93f31087-8566-4d16-a7a1-f20635823349" providerId="ADAL" clId="{28A45800-A829-4FF9-9AF1-45101DDF326D}" dt="2022-11-13T18:01:36.302" v="522" actId="20577"/>
-        <pc:sldMkLst>
-          <pc:docMk/>
-          <pc:sldMk cId="1441313987" sldId="308"/>
-        </pc:sldMkLst>
-      </pc:sldChg>
-      <pc:sldChg chg="modSp mod">
-        <pc:chgData name="MIGUEL TRIGUEROS MUÑOZ" userId="93f31087-8566-4d16-a7a1-f20635823349" providerId="ADAL" clId="{28A45800-A829-4FF9-9AF1-45101DDF326D}" dt="2022-11-13T17:56:50.534" v="474" actId="20577"/>
-        <pc:sldMkLst>
-          <pc:docMk/>
-          <pc:sldMk cId="1679762254" sldId="309"/>
-        </pc:sldMkLst>
-      </pc:sldChg>
-      <pc:sldChg chg="modSp mod">
-        <pc:chgData name="MIGUEL TRIGUEROS MUÑOZ" userId="93f31087-8566-4d16-a7a1-f20635823349" providerId="ADAL" clId="{28A45800-A829-4FF9-9AF1-45101DDF326D}" dt="2022-11-13T05:46:50.057" v="28" actId="20577"/>
-        <pc:sldMkLst>
-          <pc:docMk/>
-          <pc:sldMk cId="2242644199" sldId="310"/>
-        </pc:sldMkLst>
-      </pc:sldChg>
-      <pc:sldChg chg="modSp mod">
-        <pc:chgData name="MIGUEL TRIGUEROS MUÑOZ" userId="93f31087-8566-4d16-a7a1-f20635823349" providerId="ADAL" clId="{28A45800-A829-4FF9-9AF1-45101DDF326D}" dt="2022-11-13T18:00:24.255" v="510" actId="20577"/>
-        <pc:sldMkLst>
-          <pc:docMk/>
-          <pc:sldMk cId="1814859966" sldId="313"/>
-        </pc:sldMkLst>
-      </pc:sldChg>
-      <pc:sldChg chg="modSp mod">
-        <pc:chgData name="MIGUEL TRIGUEROS MUÑOZ" userId="93f31087-8566-4d16-a7a1-f20635823349" providerId="ADAL" clId="{28A45800-A829-4FF9-9AF1-45101DDF326D}" dt="2022-11-13T17:54:34.728" v="469" actId="1076"/>
-        <pc:sldMkLst>
-          <pc:docMk/>
-          <pc:sldMk cId="745458148" sldId="314"/>
-        </pc:sldMkLst>
-      </pc:sldChg>
-      <pc:sldChg chg="delSp modSp add mod">
-        <pc:chgData name="MIGUEL TRIGUEROS MUÑOZ" userId="93f31087-8566-4d16-a7a1-f20635823349" providerId="ADAL" clId="{28A45800-A829-4FF9-9AF1-45101DDF326D}" dt="2022-11-13T06:30:20.958" v="344" actId="122"/>
-        <pc:sldMkLst>
-          <pc:docMk/>
-          <pc:sldMk cId="279635090" sldId="315"/>
-        </pc:sldMkLst>
-      </pc:sldChg>
-      <pc:sldChg chg="addSp delSp modSp add del mod">
-        <pc:chgData name="MIGUEL TRIGUEROS MUÑOZ" userId="93f31087-8566-4d16-a7a1-f20635823349" providerId="ADAL" clId="{28A45800-A829-4FF9-9AF1-45101DDF326D}" dt="2022-11-13T17:59:32.177" v="485" actId="14100"/>
-        <pc:sldMkLst>
-          <pc:docMk/>
-          <pc:sldMk cId="2861142992" sldId="316"/>
-        </pc:sldMkLst>
-      </pc:sldChg>
-      <pc:sldChg chg="modSp add del mod">
-        <pc:chgData name="MIGUEL TRIGUEROS MUÑOZ" userId="93f31087-8566-4d16-a7a1-f20635823349" providerId="ADAL" clId="{28A45800-A829-4FF9-9AF1-45101DDF326D}" dt="2022-11-13T10:20:27.303" v="430"/>
-        <pc:sldMkLst>
-          <pc:docMk/>
-          <pc:sldMk cId="2928801094" sldId="317"/>
-        </pc:sldMkLst>
-      </pc:sldChg>
-      <pc:sldChg chg="modSp add del mod">
-        <pc:chgData name="MIGUEL TRIGUEROS MUÑOZ" userId="93f31087-8566-4d16-a7a1-f20635823349" providerId="ADAL" clId="{28A45800-A829-4FF9-9AF1-45101DDF326D}" dt="2022-11-13T10:20:27.303" v="430"/>
-        <pc:sldMkLst>
-          <pc:docMk/>
-          <pc:sldMk cId="579504102" sldId="318"/>
-        </pc:sldMkLst>
-      </pc:sldChg>
-      <pc:sldChg chg="modSp add del mod">
-        <pc:chgData name="MIGUEL TRIGUEROS MUÑOZ" userId="93f31087-8566-4d16-a7a1-f20635823349" providerId="ADAL" clId="{28A45800-A829-4FF9-9AF1-45101DDF326D}" dt="2022-11-13T10:20:27.303" v="430"/>
-        <pc:sldMkLst>
-          <pc:docMk/>
-          <pc:sldMk cId="3820478449" sldId="319"/>
-        </pc:sldMkLst>
-      </pc:sldChg>
-      <pc:sldChg chg="add">
-        <pc:chgData name="MIGUEL TRIGUEROS MUÑOZ" userId="93f31087-8566-4d16-a7a1-f20635823349" providerId="ADAL" clId="{28A45800-A829-4FF9-9AF1-45101DDF326D}" dt="2022-11-13T17:59:11.427" v="479" actId="2890"/>
-        <pc:sldMkLst>
-          <pc:docMk/>
-          <pc:sldMk cId="3143426356" sldId="320"/>
-        </pc:sldMkLst>
-      </pc:sldChg>
-    </pc:docChg>
-  </pc:docChgLst>
-  <pc:docChgLst>
-    <pc:chgData name="MIGUEL TRIGUEROS MUÑOZ" userId="S::miguel.trigueros@aulaxxi.murciaeduca.es::a4ee0321-97d7-430f-98a8-7ed13ff9a4bf" providerId="AD" clId="Web-{F84A73B3-7A0D-9E72-9405-59F7710A5BA6}"/>
-    <pc:docChg chg="modSld">
-      <pc:chgData name="MIGUEL TRIGUEROS MUÑOZ" userId="S::miguel.trigueros@aulaxxi.murciaeduca.es::a4ee0321-97d7-430f-98a8-7ed13ff9a4bf" providerId="AD" clId="Web-{F84A73B3-7A0D-9E72-9405-59F7710A5BA6}" dt="2024-11-21T11:08:26.915" v="20"/>
-      <pc:docMkLst>
-        <pc:docMk/>
-      </pc:docMkLst>
-      <pc:sldChg chg="modNotes">
-        <pc:chgData name="MIGUEL TRIGUEROS MUÑOZ" userId="S::miguel.trigueros@aulaxxi.murciaeduca.es::a4ee0321-97d7-430f-98a8-7ed13ff9a4bf" providerId="AD" clId="Web-{F84A73B3-7A0D-9E72-9405-59F7710A5BA6}" dt="2024-11-21T11:08:26.915" v="20"/>
-        <pc:sldMkLst>
-          <pc:docMk/>
-          <pc:sldMk cId="1188484412" sldId="350"/>
-        </pc:sldMkLst>
-      </pc:sldChg>
-    </pc:docChg>
-  </pc:docChgLst>
-  <pc:docChgLst>
-    <pc:chgData name="MIGUEL TRIGUEROS MUÑOZ" userId="a4ee0321-97d7-430f-98a8-7ed13ff9a4bf" providerId="ADAL" clId="{2AEE6863-937B-4AA7-8B19-2C717111FF6F}"/>
-    <pc:docChg chg="undo custSel addSld delSld modSld sldOrd modSection">
-      <pc:chgData name="MIGUEL TRIGUEROS MUÑOZ" userId="a4ee0321-97d7-430f-98a8-7ed13ff9a4bf" providerId="ADAL" clId="{2AEE6863-937B-4AA7-8B19-2C717111FF6F}" dt="2024-06-05T11:23:47.647" v="707" actId="1076"/>
-      <pc:docMkLst>
-        <pc:docMk/>
-      </pc:docMkLst>
-      <pc:sldChg chg="modSp mod modNotesTx">
-        <pc:chgData name="MIGUEL TRIGUEROS MUÑOZ" userId="a4ee0321-97d7-430f-98a8-7ed13ff9a4bf" providerId="ADAL" clId="{2AEE6863-937B-4AA7-8B19-2C717111FF6F}" dt="2024-06-05T09:04:17.421" v="260" actId="20577"/>
-        <pc:sldMkLst>
-          <pc:docMk/>
-          <pc:sldMk cId="651048111" sldId="297"/>
-        </pc:sldMkLst>
-      </pc:sldChg>
-      <pc:sldChg chg="addSp delSp modSp mod modNotesTx">
-        <pc:chgData name="MIGUEL TRIGUEROS MUÑOZ" userId="a4ee0321-97d7-430f-98a8-7ed13ff9a4bf" providerId="ADAL" clId="{2AEE6863-937B-4AA7-8B19-2C717111FF6F}" dt="2024-06-05T10:20:36.161" v="372" actId="1076"/>
-        <pc:sldMkLst>
-          <pc:docMk/>
-          <pc:sldMk cId="1878582030" sldId="304"/>
-        </pc:sldMkLst>
-      </pc:sldChg>
-      <pc:sldChg chg="addSp delSp modSp mod">
-        <pc:chgData name="MIGUEL TRIGUEROS MUÑOZ" userId="a4ee0321-97d7-430f-98a8-7ed13ff9a4bf" providerId="ADAL" clId="{2AEE6863-937B-4AA7-8B19-2C717111FF6F}" dt="2024-06-05T10:24:04.931" v="390" actId="1076"/>
-        <pc:sldMkLst>
-          <pc:docMk/>
-          <pc:sldMk cId="524834107" sldId="305"/>
-        </pc:sldMkLst>
-      </pc:sldChg>
       <pc:sldChg chg="modSp">
-        <pc:chgData name="MIGUEL TRIGUEROS MUÑOZ" userId="a4ee0321-97d7-430f-98a8-7ed13ff9a4bf" providerId="ADAL" clId="{2AEE6863-937B-4AA7-8B19-2C717111FF6F}" dt="2024-06-05T10:35:00.464" v="452" actId="20577"/>
-        <pc:sldMkLst>
-          <pc:docMk/>
-          <pc:sldMk cId="3007344242" sldId="306"/>
-        </pc:sldMkLst>
-      </pc:sldChg>
-      <pc:sldChg chg="modSp">
-        <pc:chgData name="MIGUEL TRIGUEROS MUÑOZ" userId="a4ee0321-97d7-430f-98a8-7ed13ff9a4bf" providerId="ADAL" clId="{2AEE6863-937B-4AA7-8B19-2C717111FF6F}" dt="2024-06-05T10:35:41.007" v="459" actId="5793"/>
-        <pc:sldMkLst>
-          <pc:docMk/>
-          <pc:sldMk cId="1679762254" sldId="309"/>
-        </pc:sldMkLst>
-      </pc:sldChg>
-      <pc:sldChg chg="modSp mod ord modCm">
-        <pc:chgData name="MIGUEL TRIGUEROS MUÑOZ" userId="a4ee0321-97d7-430f-98a8-7ed13ff9a4bf" providerId="ADAL" clId="{2AEE6863-937B-4AA7-8B19-2C717111FF6F}" dt="2024-06-05T10:47:09.115" v="570" actId="20577"/>
-        <pc:sldMkLst>
-          <pc:docMk/>
-          <pc:sldMk cId="2242644199" sldId="310"/>
-        </pc:sldMkLst>
-        <pc:extLst>
-          <p:ext xmlns:p="http://schemas.openxmlformats.org/presentationml/2006/main" uri="{D6D511B9-2390-475A-947B-AFAB55BFBCF1}">
-            <pc226:cmChg xmlns:pc226="http://schemas.microsoft.com/office/powerpoint/2022/06/main/command" chg="mod">
-              <pc226:chgData name="MIGUEL TRIGUEROS MUÑOZ" userId="a4ee0321-97d7-430f-98a8-7ed13ff9a4bf" providerId="ADAL" clId="{2AEE6863-937B-4AA7-8B19-2C717111FF6F}" dt="2024-06-05T10:40:23.694" v="536" actId="20577"/>
-              <pc2:cmMkLst xmlns:pc2="http://schemas.microsoft.com/office/powerpoint/2019/9/main/command">
-                <pc:docMk/>
-                <pc:sldMk cId="2242644199" sldId="310"/>
-                <pc2:cmMk id="{67C8A8FA-5B21-4352-9C79-EB9142759F2D}"/>
-              </pc2:cmMkLst>
-            </pc226:cmChg>
-          </p:ext>
-        </pc:extLst>
-      </pc:sldChg>
-      <pc:sldChg chg="addSp delSp modSp mod">
-        <pc:chgData name="MIGUEL TRIGUEROS MUÑOZ" userId="a4ee0321-97d7-430f-98a8-7ed13ff9a4bf" providerId="ADAL" clId="{2AEE6863-937B-4AA7-8B19-2C717111FF6F}" dt="2024-06-05T10:49:08.552" v="573" actId="1076"/>
-        <pc:sldMkLst>
-          <pc:docMk/>
-          <pc:sldMk cId="1813723418" sldId="311"/>
-        </pc:sldMkLst>
-      </pc:sldChg>
-      <pc:sldChg chg="modSp mod ord modNotesTx">
-        <pc:chgData name="MIGUEL TRIGUEROS MUÑOZ" userId="a4ee0321-97d7-430f-98a8-7ed13ff9a4bf" providerId="ADAL" clId="{2AEE6863-937B-4AA7-8B19-2C717111FF6F}" dt="2024-06-05T10:51:53.988" v="626" actId="20577"/>
-        <pc:sldMkLst>
-          <pc:docMk/>
-          <pc:sldMk cId="2269836530" sldId="312"/>
-        </pc:sldMkLst>
-      </pc:sldChg>
-      <pc:sldChg chg="modSp mod ord">
-        <pc:chgData name="MIGUEL TRIGUEROS MUÑOZ" userId="a4ee0321-97d7-430f-98a8-7ed13ff9a4bf" providerId="ADAL" clId="{2AEE6863-937B-4AA7-8B19-2C717111FF6F}" dt="2024-06-05T10:39:39.255" v="506" actId="20577"/>
-        <pc:sldMkLst>
-          <pc:docMk/>
-          <pc:sldMk cId="1814859966" sldId="313"/>
-        </pc:sldMkLst>
-      </pc:sldChg>
-      <pc:sldChg chg="modSp mod modNotesTx">
-        <pc:chgData name="MIGUEL TRIGUEROS MUÑOZ" userId="a4ee0321-97d7-430f-98a8-7ed13ff9a4bf" providerId="ADAL" clId="{2AEE6863-937B-4AA7-8B19-2C717111FF6F}" dt="2024-06-05T10:52:42.844" v="704" actId="20577"/>
-        <pc:sldMkLst>
-          <pc:docMk/>
-          <pc:sldMk cId="2928801094" sldId="317"/>
-        </pc:sldMkLst>
-      </pc:sldChg>
-      <pc:sldChg chg="modSp">
-        <pc:chgData name="MIGUEL TRIGUEROS MUÑOZ" userId="a4ee0321-97d7-430f-98a8-7ed13ff9a4bf" providerId="ADAL" clId="{2AEE6863-937B-4AA7-8B19-2C717111FF6F}" dt="2024-06-05T10:27:31.747" v="395" actId="113"/>
-        <pc:sldMkLst>
-          <pc:docMk/>
-          <pc:sldMk cId="1855636476" sldId="340"/>
-        </pc:sldMkLst>
-      </pc:sldChg>
-      <pc:sldChg chg="addSp delSp modSp mod">
-        <pc:chgData name="MIGUEL TRIGUEROS MUÑOZ" userId="a4ee0321-97d7-430f-98a8-7ed13ff9a4bf" providerId="ADAL" clId="{2AEE6863-937B-4AA7-8B19-2C717111FF6F}" dt="2024-06-05T11:23:47.647" v="707" actId="1076"/>
-        <pc:sldMkLst>
-          <pc:docMk/>
-          <pc:sldMk cId="59108425" sldId="345"/>
-        </pc:sldMkLst>
-      </pc:sldChg>
-      <pc:sldChg chg="modSp add del">
-        <pc:chgData name="MIGUEL TRIGUEROS MUÑOZ" userId="a4ee0321-97d7-430f-98a8-7ed13ff9a4bf" providerId="ADAL" clId="{2AEE6863-937B-4AA7-8B19-2C717111FF6F}" dt="2024-06-05T10:08:18.186" v="305" actId="2696"/>
-        <pc:sldMkLst>
-          <pc:docMk/>
-          <pc:sldMk cId="2521459586" sldId="350"/>
-        </pc:sldMkLst>
-      </pc:sldChg>
-      <pc:sldChg chg="modSp add del">
-        <pc:chgData name="MIGUEL TRIGUEROS MUÑOZ" userId="a4ee0321-97d7-430f-98a8-7ed13ff9a4bf" providerId="ADAL" clId="{2AEE6863-937B-4AA7-8B19-2C717111FF6F}" dt="2024-06-05T10:13:22.896" v="326" actId="2696"/>
-        <pc:sldMkLst>
-          <pc:docMk/>
-          <pc:sldMk cId="3076450737" sldId="350"/>
-        </pc:sldMkLst>
-      </pc:sldChg>
-    </pc:docChg>
-  </pc:docChgLst>
-  <pc:docChgLst>
-    <pc:chgData name="MIGUEL TRIGUEROS MUÑOZ" userId="a4ee0321-97d7-430f-98a8-7ed13ff9a4bf" providerId="ADAL" clId="{ED9151D6-2F0F-426F-A2ED-2173232EC2B0}"/>
-    <pc:docChg chg="modSld">
-      <pc:chgData name="MIGUEL TRIGUEROS MUÑOZ" userId="a4ee0321-97d7-430f-98a8-7ed13ff9a4bf" providerId="ADAL" clId="{ED9151D6-2F0F-426F-A2ED-2173232EC2B0}" dt="2025-02-07T16:23:54.749" v="22" actId="20577"/>
-      <pc:docMkLst>
-        <pc:docMk/>
-      </pc:docMkLst>
-      <pc:sldChg chg="modSp mod">
-        <pc:chgData name="MIGUEL TRIGUEROS MUÑOZ" userId="a4ee0321-97d7-430f-98a8-7ed13ff9a4bf" providerId="ADAL" clId="{ED9151D6-2F0F-426F-A2ED-2173232EC2B0}" dt="2025-02-07T16:23:54.749" v="22" actId="20577"/>
-        <pc:sldMkLst>
-          <pc:docMk/>
-          <pc:sldMk cId="1662085430" sldId="302"/>
-        </pc:sldMkLst>
-      </pc:sldChg>
-    </pc:docChg>
-  </pc:docChgLst>
-  <pc:docChgLst>
-    <pc:chgData name="MIGUEL TRIGUEROS MUÑOZ" userId="S::miguel.trigueros@aulaxxi.murciaeduca.es::a4ee0321-97d7-430f-98a8-7ed13ff9a4bf" providerId="AD" clId="Web-{DF44C4A1-E9F9-CEF8-CC48-0724636AA584}"/>
-    <pc:docChg chg="modSld">
-      <pc:chgData name="MIGUEL TRIGUEROS MUÑOZ" userId="S::miguel.trigueros@aulaxxi.murciaeduca.es::a4ee0321-97d7-430f-98a8-7ed13ff9a4bf" providerId="AD" clId="Web-{DF44C4A1-E9F9-CEF8-CC48-0724636AA584}" dt="2024-01-15T11:34:58.616" v="0" actId="1076"/>
-      <pc:docMkLst>
-        <pc:docMk/>
-      </pc:docMkLst>
-      <pc:sldChg chg="modSp">
-        <pc:chgData name="MIGUEL TRIGUEROS MUÑOZ" userId="S::miguel.trigueros@aulaxxi.murciaeduca.es::a4ee0321-97d7-430f-98a8-7ed13ff9a4bf" providerId="AD" clId="Web-{DF44C4A1-E9F9-CEF8-CC48-0724636AA584}" dt="2024-01-15T11:34:58.616" v="0" actId="1076"/>
-        <pc:sldMkLst>
-          <pc:docMk/>
-          <pc:sldMk cId="982610843" sldId="348"/>
-        </pc:sldMkLst>
-      </pc:sldChg>
-    </pc:docChg>
-  </pc:docChgLst>
-  <pc:docChgLst>
-    <pc:chgData name="MIGUEL TRIGUEROS MUÑOZ" userId="a4ee0321-97d7-430f-98a8-7ed13ff9a4bf" providerId="ADAL" clId="{9C88CFC2-C7BB-4861-A542-548B698160AC}"/>
-    <pc:docChg chg="undo redo custSel addSld delSld modSld modMainMaster modSection">
-      <pc:chgData name="MIGUEL TRIGUEROS MUÑOZ" userId="a4ee0321-97d7-430f-98a8-7ed13ff9a4bf" providerId="ADAL" clId="{9C88CFC2-C7BB-4861-A542-548B698160AC}" dt="2024-11-07T16:25:58.647" v="3666"/>
-      <pc:docMkLst>
-        <pc:docMk/>
-      </pc:docMkLst>
-      <pc:sldChg chg="modSp mod">
-        <pc:chgData name="MIGUEL TRIGUEROS MUÑOZ" userId="a4ee0321-97d7-430f-98a8-7ed13ff9a4bf" providerId="ADAL" clId="{9C88CFC2-C7BB-4861-A542-548B698160AC}" dt="2024-10-13T06:07:32.428" v="186" actId="1076"/>
-        <pc:sldMkLst>
-          <pc:docMk/>
-          <pc:sldMk cId="308865771" sldId="256"/>
-        </pc:sldMkLst>
-      </pc:sldChg>
-      <pc:sldChg chg="addSp modSp del mod modClrScheme chgLayout">
-        <pc:chgData name="MIGUEL TRIGUEROS MUÑOZ" userId="a4ee0321-97d7-430f-98a8-7ed13ff9a4bf" providerId="ADAL" clId="{9C88CFC2-C7BB-4861-A542-548B698160AC}" dt="2024-10-13T06:14:24.260" v="556" actId="2696"/>
-        <pc:sldMkLst>
-          <pc:docMk/>
-          <pc:sldMk cId="2182144064" sldId="295"/>
-        </pc:sldMkLst>
-      </pc:sldChg>
-      <pc:sldChg chg="modSp mod modClrScheme chgLayout modNotesTx">
-        <pc:chgData name="MIGUEL TRIGUEROS MUÑOZ" userId="a4ee0321-97d7-430f-98a8-7ed13ff9a4bf" providerId="ADAL" clId="{9C88CFC2-C7BB-4861-A542-548B698160AC}" dt="2024-11-07T16:24:31.005" v="3655"/>
-        <pc:sldMkLst>
-          <pc:docMk/>
-          <pc:sldMk cId="3881213358" sldId="296"/>
-        </pc:sldMkLst>
-      </pc:sldChg>
-      <pc:sldChg chg="addSp delSp modSp mod modClrScheme chgLayout modNotesTx">
-        <pc:chgData name="MIGUEL TRIGUEROS MUÑOZ" userId="a4ee0321-97d7-430f-98a8-7ed13ff9a4bf" providerId="ADAL" clId="{9C88CFC2-C7BB-4861-A542-548B698160AC}" dt="2024-10-21T21:48:45.356" v="1545" actId="20577"/>
-        <pc:sldMkLst>
-          <pc:docMk/>
-          <pc:sldMk cId="651048111" sldId="297"/>
-        </pc:sldMkLst>
-      </pc:sldChg>
-      <pc:sldChg chg="addSp delSp modSp mod modClrScheme chgLayout">
-        <pc:chgData name="MIGUEL TRIGUEROS MUÑOZ" userId="a4ee0321-97d7-430f-98a8-7ed13ff9a4bf" providerId="ADAL" clId="{9C88CFC2-C7BB-4861-A542-548B698160AC}" dt="2024-10-13T06:42:34.487" v="1003" actId="20577"/>
-        <pc:sldMkLst>
-          <pc:docMk/>
-          <pc:sldMk cId="1285496475" sldId="298"/>
-        </pc:sldMkLst>
-      </pc:sldChg>
-      <pc:sldChg chg="addSp delSp modSp mod modClrScheme chgLayout">
-        <pc:chgData name="MIGUEL TRIGUEROS MUÑOZ" userId="a4ee0321-97d7-430f-98a8-7ed13ff9a4bf" providerId="ADAL" clId="{9C88CFC2-C7BB-4861-A542-548B698160AC}" dt="2024-10-13T06:42:38.247" v="1007" actId="20577"/>
-        <pc:sldMkLst>
-          <pc:docMk/>
-          <pc:sldMk cId="975738591" sldId="299"/>
-        </pc:sldMkLst>
-      </pc:sldChg>
-      <pc:sldChg chg="addSp delSp modSp mod modClrScheme chgLayout">
-        <pc:chgData name="MIGUEL TRIGUEROS MUÑOZ" userId="a4ee0321-97d7-430f-98a8-7ed13ff9a4bf" providerId="ADAL" clId="{9C88CFC2-C7BB-4861-A542-548B698160AC}" dt="2024-10-13T06:42:43.134" v="1011" actId="20577"/>
-        <pc:sldMkLst>
-          <pc:docMk/>
-          <pc:sldMk cId="1286011775" sldId="300"/>
-        </pc:sldMkLst>
-      </pc:sldChg>
-      <pc:sldChg chg="modSp mod modClrScheme chgLayout">
-        <pc:chgData name="MIGUEL TRIGUEROS MUÑOZ" userId="a4ee0321-97d7-430f-98a8-7ed13ff9a4bf" providerId="ADAL" clId="{9C88CFC2-C7BB-4861-A542-548B698160AC}" dt="2024-10-22T16:48:45.692" v="2270" actId="20577"/>
-        <pc:sldMkLst>
-          <pc:docMk/>
-          <pc:sldMk cId="1662085430" sldId="302"/>
-        </pc:sldMkLst>
-      </pc:sldChg>
-      <pc:sldChg chg="addSp modSp mod modClrScheme chgLayout">
-        <pc:chgData name="MIGUEL TRIGUEROS MUÑOZ" userId="a4ee0321-97d7-430f-98a8-7ed13ff9a4bf" providerId="ADAL" clId="{9C88CFC2-C7BB-4861-A542-548B698160AC}" dt="2024-10-13T06:42:46.727" v="1015" actId="20577"/>
-        <pc:sldMkLst>
-          <pc:docMk/>
-          <pc:sldMk cId="1878582030" sldId="304"/>
-        </pc:sldMkLst>
-      </pc:sldChg>
-      <pc:sldChg chg="addSp modSp mod modClrScheme chgLayout modNotesTx">
-        <pc:chgData name="MIGUEL TRIGUEROS MUÑOZ" userId="a4ee0321-97d7-430f-98a8-7ed13ff9a4bf" providerId="ADAL" clId="{9C88CFC2-C7BB-4861-A542-548B698160AC}" dt="2024-11-03T07:38:48.522" v="2997" actId="20577"/>
-        <pc:sldMkLst>
-          <pc:docMk/>
-          <pc:sldMk cId="524834107" sldId="305"/>
-        </pc:sldMkLst>
-      </pc:sldChg>
-      <pc:sldChg chg="addSp modSp mod modClrScheme chgLayout">
-        <pc:chgData name="MIGUEL TRIGUEROS MUÑOZ" userId="a4ee0321-97d7-430f-98a8-7ed13ff9a4bf" providerId="ADAL" clId="{9C88CFC2-C7BB-4861-A542-548B698160AC}" dt="2024-11-03T08:30:00.894" v="3436" actId="1076"/>
-        <pc:sldMkLst>
-          <pc:docMk/>
-          <pc:sldMk cId="3007344242" sldId="306"/>
-        </pc:sldMkLst>
-      </pc:sldChg>
-      <pc:sldChg chg="modSp mod modClrScheme chgLayout">
-        <pc:chgData name="MIGUEL TRIGUEROS MUÑOZ" userId="a4ee0321-97d7-430f-98a8-7ed13ff9a4bf" providerId="ADAL" clId="{9C88CFC2-C7BB-4861-A542-548B698160AC}" dt="2024-10-22T18:23:24.747" v="2868" actId="20577"/>
-        <pc:sldMkLst>
-          <pc:docMk/>
-          <pc:sldMk cId="1441313987" sldId="308"/>
-        </pc:sldMkLst>
-      </pc:sldChg>
-      <pc:sldChg chg="addSp modSp mod modClrScheme chgLayout">
-        <pc:chgData name="MIGUEL TRIGUEROS MUÑOZ" userId="a4ee0321-97d7-430f-98a8-7ed13ff9a4bf" providerId="ADAL" clId="{9C88CFC2-C7BB-4861-A542-548B698160AC}" dt="2024-10-13T06:51:49.680" v="1066" actId="207"/>
-        <pc:sldMkLst>
-          <pc:docMk/>
-          <pc:sldMk cId="1679762254" sldId="309"/>
-        </pc:sldMkLst>
-      </pc:sldChg>
-      <pc:sldChg chg="addSp delSp modSp mod modClrScheme chgLayout">
-        <pc:chgData name="MIGUEL TRIGUEROS MUÑOZ" userId="a4ee0321-97d7-430f-98a8-7ed13ff9a4bf" providerId="ADAL" clId="{9C88CFC2-C7BB-4861-A542-548B698160AC}" dt="2024-10-13T06:58:23.880" v="1197" actId="20577"/>
-        <pc:sldMkLst>
-          <pc:docMk/>
-          <pc:sldMk cId="2242644199" sldId="310"/>
-        </pc:sldMkLst>
-      </pc:sldChg>
-      <pc:sldChg chg="addSp delSp modSp mod modClrScheme chgLayout">
-        <pc:chgData name="MIGUEL TRIGUEROS MUÑOZ" userId="a4ee0321-97d7-430f-98a8-7ed13ff9a4bf" providerId="ADAL" clId="{9C88CFC2-C7BB-4861-A542-548B698160AC}" dt="2024-11-03T07:47:33.487" v="3198" actId="1076"/>
-        <pc:sldMkLst>
-          <pc:docMk/>
-          <pc:sldMk cId="1813723418" sldId="311"/>
-        </pc:sldMkLst>
-      </pc:sldChg>
-      <pc:sldChg chg="addSp delSp modSp mod modClrScheme chgLayout">
-        <pc:chgData name="MIGUEL TRIGUEROS MUÑOZ" userId="a4ee0321-97d7-430f-98a8-7ed13ff9a4bf" providerId="ADAL" clId="{9C88CFC2-C7BB-4861-A542-548B698160AC}" dt="2024-10-13T07:05:36.452" v="1273" actId="20577"/>
-        <pc:sldMkLst>
-          <pc:docMk/>
-          <pc:sldMk cId="2269836530" sldId="312"/>
-        </pc:sldMkLst>
-      </pc:sldChg>
-      <pc:sldChg chg="addSp delSp modSp mod modClrScheme chgLayout modNotesTx">
-        <pc:chgData name="MIGUEL TRIGUEROS MUÑOZ" userId="a4ee0321-97d7-430f-98a8-7ed13ff9a4bf" providerId="ADAL" clId="{9C88CFC2-C7BB-4861-A542-548B698160AC}" dt="2024-11-03T07:45:55.769" v="3177" actId="20577"/>
-        <pc:sldMkLst>
-          <pc:docMk/>
-          <pc:sldMk cId="1814859966" sldId="313"/>
-        </pc:sldMkLst>
-      </pc:sldChg>
-      <pc:sldChg chg="modSp mod modClrScheme modCm chgLayout modNotesTx">
-        <pc:chgData name="MIGUEL TRIGUEROS MUÑOZ" userId="a4ee0321-97d7-430f-98a8-7ed13ff9a4bf" providerId="ADAL" clId="{9C88CFC2-C7BB-4861-A542-548B698160AC}" dt="2024-11-07T16:23:31.433" v="3626" actId="108"/>
-        <pc:sldMkLst>
-          <pc:docMk/>
-          <pc:sldMk cId="745458148" sldId="314"/>
-        </pc:sldMkLst>
-        <pc:extLst>
-          <p:ext xmlns:p="http://schemas.openxmlformats.org/presentationml/2006/main" uri="{D6D511B9-2390-475A-947B-AFAB55BFBCF1}">
-            <pc226:cmChg xmlns:pc226="http://schemas.microsoft.com/office/powerpoint/2022/06/main/command" chg="mod">
-              <pc226:chgData name="MIGUEL TRIGUEROS MUÑOZ" userId="a4ee0321-97d7-430f-98a8-7ed13ff9a4bf" providerId="ADAL" clId="{9C88CFC2-C7BB-4861-A542-548B698160AC}" dt="2024-11-07T16:23:06.098" v="3625" actId="6549"/>
-              <pc2:cmMkLst xmlns:pc2="http://schemas.microsoft.com/office/powerpoint/2019/9/main/command">
-                <pc:docMk/>
-                <pc:sldMk cId="745458148" sldId="314"/>
-                <pc2:cmMk id="{A31BAD83-C51C-46DB-88E1-1E3F9DD51A54}"/>
-              </pc2:cmMkLst>
-            </pc226:cmChg>
-          </p:ext>
-        </pc:extLst>
-      </pc:sldChg>
-      <pc:sldChg chg="modSp mod modClrScheme chgLayout modNotesTx">
-        <pc:chgData name="MIGUEL TRIGUEROS MUÑOZ" userId="a4ee0321-97d7-430f-98a8-7ed13ff9a4bf" providerId="ADAL" clId="{9C88CFC2-C7BB-4861-A542-548B698160AC}" dt="2024-11-03T11:43:28.856" v="3620" actId="113"/>
-        <pc:sldMkLst>
-          <pc:docMk/>
-          <pc:sldMk cId="279635090" sldId="315"/>
-        </pc:sldMkLst>
-      </pc:sldChg>
-      <pc:sldChg chg="addSp delSp modSp mod modClrScheme chgLayout">
-        <pc:chgData name="MIGUEL TRIGUEROS MUÑOZ" userId="a4ee0321-97d7-430f-98a8-7ed13ff9a4bf" providerId="ADAL" clId="{9C88CFC2-C7BB-4861-A542-548B698160AC}" dt="2024-10-13T07:06:36.897" v="1284" actId="164"/>
-        <pc:sldMkLst>
-          <pc:docMk/>
-          <pc:sldMk cId="2861142992" sldId="316"/>
-        </pc:sldMkLst>
-      </pc:sldChg>
-      <pc:sldChg chg="addSp modSp mod modClrScheme chgLayout">
-        <pc:chgData name="MIGUEL TRIGUEROS MUÑOZ" userId="a4ee0321-97d7-430f-98a8-7ed13ff9a4bf" providerId="ADAL" clId="{9C88CFC2-C7BB-4861-A542-548B698160AC}" dt="2024-10-13T07:03:56.865" v="1259" actId="1076"/>
-        <pc:sldMkLst>
-          <pc:docMk/>
-          <pc:sldMk cId="2928801094" sldId="317"/>
-        </pc:sldMkLst>
-      </pc:sldChg>
-      <pc:sldChg chg="addSp modSp mod modClrScheme chgLayout">
-        <pc:chgData name="MIGUEL TRIGUEROS MUÑOZ" userId="a4ee0321-97d7-430f-98a8-7ed13ff9a4bf" providerId="ADAL" clId="{9C88CFC2-C7BB-4861-A542-548B698160AC}" dt="2024-10-13T07:03:09.004" v="1251" actId="14100"/>
-        <pc:sldMkLst>
-          <pc:docMk/>
-          <pc:sldMk cId="3143426356" sldId="320"/>
-        </pc:sldMkLst>
-      </pc:sldChg>
-      <pc:sldChg chg="addSp delSp modSp mod modClrScheme chgLayout modNotesTx">
-        <pc:chgData name="MIGUEL TRIGUEROS MUÑOZ" userId="a4ee0321-97d7-430f-98a8-7ed13ff9a4bf" providerId="ADAL" clId="{9C88CFC2-C7BB-4861-A542-548B698160AC}" dt="2024-11-07T16:24:07.234" v="3632"/>
-        <pc:sldMkLst>
-          <pc:docMk/>
-          <pc:sldMk cId="2894294298" sldId="321"/>
-        </pc:sldMkLst>
-      </pc:sldChg>
-      <pc:sldChg chg="modSp mod modClrScheme chgLayout">
-        <pc:chgData name="MIGUEL TRIGUEROS MUÑOZ" userId="a4ee0321-97d7-430f-98a8-7ed13ff9a4bf" providerId="ADAL" clId="{9C88CFC2-C7BB-4861-A542-548B698160AC}" dt="2024-11-03T08:28:10.062" v="3364" actId="20577"/>
-        <pc:sldMkLst>
-          <pc:docMk/>
-          <pc:sldMk cId="986423972" sldId="322"/>
-        </pc:sldMkLst>
-      </pc:sldChg>
-      <pc:sldChg chg="addSp modSp mod modClrScheme chgLayout modNotesTx">
-        <pc:chgData name="MIGUEL TRIGUEROS MUÑOZ" userId="a4ee0321-97d7-430f-98a8-7ed13ff9a4bf" providerId="ADAL" clId="{9C88CFC2-C7BB-4861-A542-548B698160AC}" dt="2024-11-07T16:25:23.619" v="3664" actId="20577"/>
-        <pc:sldMkLst>
-          <pc:docMk/>
-          <pc:sldMk cId="1069880379" sldId="323"/>
-        </pc:sldMkLst>
-      </pc:sldChg>
-      <pc:sldChg chg="addSp modSp mod modClrScheme chgLayout">
-        <pc:chgData name="MIGUEL TRIGUEROS MUÑOZ" userId="a4ee0321-97d7-430f-98a8-7ed13ff9a4bf" providerId="ADAL" clId="{9C88CFC2-C7BB-4861-A542-548B698160AC}" dt="2024-10-13T07:30:34.483" v="1501" actId="6549"/>
-        <pc:sldMkLst>
-          <pc:docMk/>
-          <pc:sldMk cId="2304737095" sldId="324"/>
-        </pc:sldMkLst>
-      </pc:sldChg>
-      <pc:sldChg chg="addSp modSp mod modClrScheme chgLayout">
-        <pc:chgData name="MIGUEL TRIGUEROS MUÑOZ" userId="a4ee0321-97d7-430f-98a8-7ed13ff9a4bf" providerId="ADAL" clId="{9C88CFC2-C7BB-4861-A542-548B698160AC}" dt="2024-10-13T07:09:50.239" v="1358" actId="20577"/>
-        <pc:sldMkLst>
-          <pc:docMk/>
-          <pc:sldMk cId="1122745256" sldId="325"/>
-        </pc:sldMkLst>
-      </pc:sldChg>
-      <pc:sldChg chg="addSp delSp modSp mod modClrScheme chgLayout">
-        <pc:chgData name="MIGUEL TRIGUEROS MUÑOZ" userId="a4ee0321-97d7-430f-98a8-7ed13ff9a4bf" providerId="ADAL" clId="{9C88CFC2-C7BB-4861-A542-548B698160AC}" dt="2024-10-13T07:12:58.055" v="1377" actId="20577"/>
-        <pc:sldMkLst>
-          <pc:docMk/>
-          <pc:sldMk cId="3983183523" sldId="326"/>
-        </pc:sldMkLst>
-      </pc:sldChg>
-      <pc:sldChg chg="modSp del">
-        <pc:chgData name="MIGUEL TRIGUEROS MUÑOZ" userId="a4ee0321-97d7-430f-98a8-7ed13ff9a4bf" providerId="ADAL" clId="{9C88CFC2-C7BB-4861-A542-548B698160AC}" dt="2024-10-21T21:47:54.151" v="1531" actId="47"/>
-        <pc:sldMkLst>
-          <pc:docMk/>
-          <pc:sldMk cId="1414400370" sldId="327"/>
-        </pc:sldMkLst>
-      </pc:sldChg>
-      <pc:sldChg chg="addSp modSp mod modClrScheme chgLayout">
-        <pc:chgData name="MIGUEL TRIGUEROS MUÑOZ" userId="a4ee0321-97d7-430f-98a8-7ed13ff9a4bf" providerId="ADAL" clId="{9C88CFC2-C7BB-4861-A542-548B698160AC}" dt="2024-10-13T07:08:30.129" v="1311" actId="20577"/>
-        <pc:sldMkLst>
-          <pc:docMk/>
-          <pc:sldMk cId="3410194891" sldId="328"/>
-        </pc:sldMkLst>
-      </pc:sldChg>
-      <pc:sldChg chg="addSp modSp mod modClrScheme chgLayout">
-        <pc:chgData name="MIGUEL TRIGUEROS MUÑOZ" userId="a4ee0321-97d7-430f-98a8-7ed13ff9a4bf" providerId="ADAL" clId="{9C88CFC2-C7BB-4861-A542-548B698160AC}" dt="2024-10-13T07:02:13.786" v="1245" actId="5793"/>
-        <pc:sldMkLst>
-          <pc:docMk/>
-          <pc:sldMk cId="544873430" sldId="330"/>
-        </pc:sldMkLst>
-      </pc:sldChg>
-      <pc:sldChg chg="addSp modSp mod modClrScheme chgLayout">
-        <pc:chgData name="MIGUEL TRIGUEROS MUÑOZ" userId="a4ee0321-97d7-430f-98a8-7ed13ff9a4bf" providerId="ADAL" clId="{9C88CFC2-C7BB-4861-A542-548B698160AC}" dt="2024-10-13T07:06:29.513" v="1283" actId="164"/>
-        <pc:sldMkLst>
-          <pc:docMk/>
-          <pc:sldMk cId="959411268" sldId="331"/>
-        </pc:sldMkLst>
-      </pc:sldChg>
-      <pc:sldChg chg="addSp modSp mod modClrScheme chgLayout">
-        <pc:chgData name="MIGUEL TRIGUEROS MUÑOZ" userId="a4ee0321-97d7-430f-98a8-7ed13ff9a4bf" providerId="ADAL" clId="{9C88CFC2-C7BB-4861-A542-548B698160AC}" dt="2024-10-13T07:06:17.928" v="1282" actId="164"/>
-        <pc:sldMkLst>
-          <pc:docMk/>
-          <pc:sldMk cId="1952241282" sldId="332"/>
-        </pc:sldMkLst>
-      </pc:sldChg>
-      <pc:sldChg chg="modSp mod modClrScheme chgLayout">
-        <pc:chgData name="MIGUEL TRIGUEROS MUÑOZ" userId="a4ee0321-97d7-430f-98a8-7ed13ff9a4bf" providerId="ADAL" clId="{9C88CFC2-C7BB-4861-A542-548B698160AC}" dt="2024-10-13T07:17:57.181" v="1455" actId="1076"/>
-        <pc:sldMkLst>
-          <pc:docMk/>
-          <pc:sldMk cId="2336738011" sldId="333"/>
-        </pc:sldMkLst>
-      </pc:sldChg>
-      <pc:sldChg chg="addSp delSp modSp del mod modClrScheme chgLayout">
-        <pc:chgData name="MIGUEL TRIGUEROS MUÑOZ" userId="a4ee0321-97d7-430f-98a8-7ed13ff9a4bf" providerId="ADAL" clId="{9C88CFC2-C7BB-4861-A542-548B698160AC}" dt="2024-10-13T06:14:24.239" v="554" actId="2696"/>
-        <pc:sldMkLst>
-          <pc:docMk/>
-          <pc:sldMk cId="1325656893" sldId="334"/>
-        </pc:sldMkLst>
-      </pc:sldChg>
-      <pc:sldChg chg="addSp modSp del mod modClrScheme chgLayout">
-        <pc:chgData name="MIGUEL TRIGUEROS MUÑOZ" userId="a4ee0321-97d7-430f-98a8-7ed13ff9a4bf" providerId="ADAL" clId="{9C88CFC2-C7BB-4861-A542-548B698160AC}" dt="2024-10-13T06:14:24.249" v="555" actId="2696"/>
-        <pc:sldMkLst>
-          <pc:docMk/>
-          <pc:sldMk cId="2012064882" sldId="335"/>
-        </pc:sldMkLst>
-      </pc:sldChg>
-      <pc:sldChg chg="modSp mod modClrScheme chgLayout">
-        <pc:chgData name="MIGUEL TRIGUEROS MUÑOZ" userId="a4ee0321-97d7-430f-98a8-7ed13ff9a4bf" providerId="ADAL" clId="{9C88CFC2-C7BB-4861-A542-548B698160AC}" dt="2024-10-13T06:16:08.170" v="598" actId="1076"/>
-        <pc:sldMkLst>
-          <pc:docMk/>
-          <pc:sldMk cId="3389564933" sldId="336"/>
-        </pc:sldMkLst>
-      </pc:sldChg>
-      <pc:sldChg chg="modSp mod modClrScheme chgLayout">
-        <pc:chgData name="MIGUEL TRIGUEROS MUÑOZ" userId="a4ee0321-97d7-430f-98a8-7ed13ff9a4bf" providerId="ADAL" clId="{9C88CFC2-C7BB-4861-A542-548B698160AC}" dt="2024-10-13T06:16:11.472" v="599" actId="1076"/>
-        <pc:sldMkLst>
-          <pc:docMk/>
-          <pc:sldMk cId="3634630687" sldId="337"/>
-        </pc:sldMkLst>
-      </pc:sldChg>
-      <pc:sldChg chg="addSp modSp mod modClrScheme chgLayout">
-        <pc:chgData name="MIGUEL TRIGUEROS MUÑOZ" userId="a4ee0321-97d7-430f-98a8-7ed13ff9a4bf" providerId="ADAL" clId="{9C88CFC2-C7BB-4861-A542-548B698160AC}" dt="2024-10-13T06:42:50.381" v="1019" actId="20577"/>
-        <pc:sldMkLst>
-          <pc:docMk/>
-          <pc:sldMk cId="2601617281" sldId="338"/>
-        </pc:sldMkLst>
-      </pc:sldChg>
-      <pc:sldChg chg="addSp modSp mod modClrScheme chgLayout">
-        <pc:chgData name="MIGUEL TRIGUEROS MUÑOZ" userId="a4ee0321-97d7-430f-98a8-7ed13ff9a4bf" providerId="ADAL" clId="{9C88CFC2-C7BB-4861-A542-548B698160AC}" dt="2024-10-22T12:09:32.402" v="1602" actId="1076"/>
-        <pc:sldMkLst>
-          <pc:docMk/>
-          <pc:sldMk cId="548552804" sldId="339"/>
-        </pc:sldMkLst>
-      </pc:sldChg>
-      <pc:sldChg chg="addSp modSp mod modClrScheme chgLayout">
-        <pc:chgData name="MIGUEL TRIGUEROS MUÑOZ" userId="a4ee0321-97d7-430f-98a8-7ed13ff9a4bf" providerId="ADAL" clId="{9C88CFC2-C7BB-4861-A542-548B698160AC}" dt="2024-10-13T06:43:05.284" v="1031" actId="20577"/>
-        <pc:sldMkLst>
-          <pc:docMk/>
-          <pc:sldMk cId="1855636476" sldId="340"/>
-        </pc:sldMkLst>
-      </pc:sldChg>
-      <pc:sldChg chg="addSp modSp mod modClrScheme chgLayout">
-        <pc:chgData name="MIGUEL TRIGUEROS MUÑOZ" userId="a4ee0321-97d7-430f-98a8-7ed13ff9a4bf" providerId="ADAL" clId="{9C88CFC2-C7BB-4861-A542-548B698160AC}" dt="2024-10-13T07:14:19.082" v="1427" actId="15"/>
-        <pc:sldMkLst>
-          <pc:docMk/>
-          <pc:sldMk cId="3761948457" sldId="341"/>
-        </pc:sldMkLst>
-      </pc:sldChg>
-      <pc:sldChg chg="addSp modSp mod modClrScheme chgLayout">
-        <pc:chgData name="MIGUEL TRIGUEROS MUÑOZ" userId="a4ee0321-97d7-430f-98a8-7ed13ff9a4bf" providerId="ADAL" clId="{9C88CFC2-C7BB-4861-A542-548B698160AC}" dt="2024-10-13T07:14:31.932" v="1435" actId="20577"/>
-        <pc:sldMkLst>
-          <pc:docMk/>
-          <pc:sldMk cId="1759713922" sldId="342"/>
-        </pc:sldMkLst>
-      </pc:sldChg>
-      <pc:sldChg chg="modSp mod modClrScheme chgLayout">
-        <pc:chgData name="MIGUEL TRIGUEROS MUÑOZ" userId="a4ee0321-97d7-430f-98a8-7ed13ff9a4bf" providerId="ADAL" clId="{9C88CFC2-C7BB-4861-A542-548B698160AC}" dt="2024-10-22T12:02:59.415" v="1561" actId="20577"/>
-        <pc:sldMkLst>
-          <pc:docMk/>
-          <pc:sldMk cId="1363057816" sldId="343"/>
-        </pc:sldMkLst>
-      </pc:sldChg>
-      <pc:sldChg chg="modSp del mod modClrScheme chgLayout">
-        <pc:chgData name="MIGUEL TRIGUEROS MUÑOZ" userId="a4ee0321-97d7-430f-98a8-7ed13ff9a4bf" providerId="ADAL" clId="{9C88CFC2-C7BB-4861-A542-548B698160AC}" dt="2024-10-22T16:46:51.559" v="2268" actId="2696"/>
-        <pc:sldMkLst>
-          <pc:docMk/>
-          <pc:sldMk cId="3323428066" sldId="344"/>
-        </pc:sldMkLst>
-      </pc:sldChg>
-      <pc:sldChg chg="modSp del mod modClrScheme chgLayout">
-        <pc:chgData name="MIGUEL TRIGUEROS MUÑOZ" userId="a4ee0321-97d7-430f-98a8-7ed13ff9a4bf" providerId="ADAL" clId="{9C88CFC2-C7BB-4861-A542-548B698160AC}" dt="2024-10-22T16:46:51.559" v="2268" actId="2696"/>
-        <pc:sldMkLst>
-          <pc:docMk/>
-          <pc:sldMk cId="59108425" sldId="345"/>
-        </pc:sldMkLst>
-      </pc:sldChg>
-      <pc:sldChg chg="modSp del mod modClrScheme chgLayout">
-        <pc:chgData name="MIGUEL TRIGUEROS MUÑOZ" userId="a4ee0321-97d7-430f-98a8-7ed13ff9a4bf" providerId="ADAL" clId="{9C88CFC2-C7BB-4861-A542-548B698160AC}" dt="2024-10-22T16:46:51.559" v="2268" actId="2696"/>
-        <pc:sldMkLst>
-          <pc:docMk/>
-          <pc:sldMk cId="1293908598" sldId="346"/>
-        </pc:sldMkLst>
-      </pc:sldChg>
-      <pc:sldChg chg="modSp del mod modClrScheme chgLayout">
-        <pc:chgData name="MIGUEL TRIGUEROS MUÑOZ" userId="a4ee0321-97d7-430f-98a8-7ed13ff9a4bf" providerId="ADAL" clId="{9C88CFC2-C7BB-4861-A542-548B698160AC}" dt="2024-10-22T16:46:51.559" v="2268" actId="2696"/>
-        <pc:sldMkLst>
-          <pc:docMk/>
-          <pc:sldMk cId="42083021" sldId="347"/>
-        </pc:sldMkLst>
-      </pc:sldChg>
-      <pc:sldChg chg="modSp del mod modClrScheme chgLayout">
-        <pc:chgData name="MIGUEL TRIGUEROS MUÑOZ" userId="a4ee0321-97d7-430f-98a8-7ed13ff9a4bf" providerId="ADAL" clId="{9C88CFC2-C7BB-4861-A542-548B698160AC}" dt="2024-10-22T16:46:51.559" v="2268" actId="2696"/>
-        <pc:sldMkLst>
-          <pc:docMk/>
-          <pc:sldMk cId="982610843" sldId="348"/>
-        </pc:sldMkLst>
-      </pc:sldChg>
-      <pc:sldChg chg="modSp del mod modClrScheme chgLayout">
-        <pc:chgData name="MIGUEL TRIGUEROS MUÑOZ" userId="a4ee0321-97d7-430f-98a8-7ed13ff9a4bf" providerId="ADAL" clId="{9C88CFC2-C7BB-4861-A542-548B698160AC}" dt="2024-10-22T16:46:51.559" v="2268" actId="2696"/>
-        <pc:sldMkLst>
-          <pc:docMk/>
-          <pc:sldMk cId="796993660" sldId="349"/>
-        </pc:sldMkLst>
-      </pc:sldChg>
-      <pc:sldChg chg="modSp add del">
-        <pc:chgData name="MIGUEL TRIGUEROS MUÑOZ" userId="a4ee0321-97d7-430f-98a8-7ed13ff9a4bf" providerId="ADAL" clId="{9C88CFC2-C7BB-4861-A542-548B698160AC}" dt="2024-10-13T06:21:32.427" v="712" actId="2696"/>
-        <pc:sldMkLst>
-          <pc:docMk/>
-          <pc:sldMk cId="868835383" sldId="350"/>
-        </pc:sldMkLst>
-      </pc:sldChg>
-      <pc:sldChg chg="modSp add del">
-        <pc:chgData name="MIGUEL TRIGUEROS MUÑOZ" userId="a4ee0321-97d7-430f-98a8-7ed13ff9a4bf" providerId="ADAL" clId="{9C88CFC2-C7BB-4861-A542-548B698160AC}" dt="2024-10-13T06:18:06.867" v="613" actId="2696"/>
-        <pc:sldMkLst>
-          <pc:docMk/>
-          <pc:sldMk cId="923694121" sldId="350"/>
-        </pc:sldMkLst>
-      </pc:sldChg>
-      <pc:sldChg chg="modSp add del">
-        <pc:chgData name="MIGUEL TRIGUEROS MUÑOZ" userId="a4ee0321-97d7-430f-98a8-7ed13ff9a4bf" providerId="ADAL" clId="{9C88CFC2-C7BB-4861-A542-548B698160AC}" dt="2024-10-13T07:13:15.505" v="1405" actId="2696"/>
-        <pc:sldMkLst>
-          <pc:docMk/>
-          <pc:sldMk cId="1174595158" sldId="350"/>
-        </pc:sldMkLst>
-      </pc:sldChg>
-      <pc:sldChg chg="addSp delSp modSp add mod modClrScheme chgLayout modNotesTx">
-        <pc:chgData name="MIGUEL TRIGUEROS MUÑOZ" userId="a4ee0321-97d7-430f-98a8-7ed13ff9a4bf" providerId="ADAL" clId="{9C88CFC2-C7BB-4861-A542-548B698160AC}" dt="2024-11-07T16:25:46.221" v="3665"/>
-        <pc:sldMkLst>
-          <pc:docMk/>
-          <pc:sldMk cId="1188484412" sldId="350"/>
-        </pc:sldMkLst>
-      </pc:sldChg>
-      <pc:sldChg chg="modSp add del">
-        <pc:chgData name="MIGUEL TRIGUEROS MUÑOZ" userId="a4ee0321-97d7-430f-98a8-7ed13ff9a4bf" providerId="ADAL" clId="{9C88CFC2-C7BB-4861-A542-548B698160AC}" dt="2024-10-13T07:14:01.622" v="1423" actId="2696"/>
-        <pc:sldMkLst>
-          <pc:docMk/>
-          <pc:sldMk cId="1625039490" sldId="350"/>
-        </pc:sldMkLst>
-      </pc:sldChg>
-      <pc:sldChg chg="modSp add del">
-        <pc:chgData name="MIGUEL TRIGUEROS MUÑOZ" userId="a4ee0321-97d7-430f-98a8-7ed13ff9a4bf" providerId="ADAL" clId="{9C88CFC2-C7BB-4861-A542-548B698160AC}" dt="2024-10-13T07:09:09.304" v="1343"/>
-        <pc:sldMkLst>
-          <pc:docMk/>
-          <pc:sldMk cId="1989159900" sldId="350"/>
-        </pc:sldMkLst>
-      </pc:sldChg>
-      <pc:sldChg chg="modSp add del">
-        <pc:chgData name="MIGUEL TRIGUEROS MUÑOZ" userId="a4ee0321-97d7-430f-98a8-7ed13ff9a4bf" providerId="ADAL" clId="{9C88CFC2-C7BB-4861-A542-548B698160AC}" dt="2024-10-13T06:19:42.053" v="681" actId="2696"/>
-        <pc:sldMkLst>
-          <pc:docMk/>
-          <pc:sldMk cId="2218038200" sldId="350"/>
-        </pc:sldMkLst>
-      </pc:sldChg>
-      <pc:sldChg chg="modSp add del">
-        <pc:chgData name="MIGUEL TRIGUEROS MUÑOZ" userId="a4ee0321-97d7-430f-98a8-7ed13ff9a4bf" providerId="ADAL" clId="{9C88CFC2-C7BB-4861-A542-548B698160AC}" dt="2024-10-13T06:19:04.673" v="658"/>
-        <pc:sldMkLst>
-          <pc:docMk/>
-          <pc:sldMk cId="2461667371" sldId="350"/>
-        </pc:sldMkLst>
-      </pc:sldChg>
-      <pc:sldChg chg="modSp add del">
-        <pc:chgData name="MIGUEL TRIGUEROS MUÑOZ" userId="a4ee0321-97d7-430f-98a8-7ed13ff9a4bf" providerId="ADAL" clId="{9C88CFC2-C7BB-4861-A542-548B698160AC}" dt="2024-10-13T06:53:02.789" v="1071" actId="2696"/>
-        <pc:sldMkLst>
-          <pc:docMk/>
-          <pc:sldMk cId="2657817143" sldId="350"/>
-        </pc:sldMkLst>
-      </pc:sldChg>
-      <pc:sldChg chg="modSp add del">
-        <pc:chgData name="MIGUEL TRIGUEROS MUÑOZ" userId="a4ee0321-97d7-430f-98a8-7ed13ff9a4bf" providerId="ADAL" clId="{9C88CFC2-C7BB-4861-A542-548B698160AC}" dt="2024-10-13T06:19:06.124" v="660" actId="2696"/>
-        <pc:sldMkLst>
-          <pc:docMk/>
-          <pc:sldMk cId="2857524527" sldId="350"/>
-        </pc:sldMkLst>
-      </pc:sldChg>
-      <pc:sldChg chg="modSp add del">
-        <pc:chgData name="MIGUEL TRIGUEROS MUÑOZ" userId="a4ee0321-97d7-430f-98a8-7ed13ff9a4bf" providerId="ADAL" clId="{9C88CFC2-C7BB-4861-A542-548B698160AC}" dt="2024-10-13T06:19:25.051" v="665" actId="2696"/>
-        <pc:sldMkLst>
-          <pc:docMk/>
-          <pc:sldMk cId="2867982799" sldId="350"/>
-        </pc:sldMkLst>
-      </pc:sldChg>
-      <pc:sldChg chg="modSp add del">
-        <pc:chgData name="MIGUEL TRIGUEROS MUÑOZ" userId="a4ee0321-97d7-430f-98a8-7ed13ff9a4bf" providerId="ADAL" clId="{9C88CFC2-C7BB-4861-A542-548B698160AC}" dt="2024-10-13T07:12:25.108" v="1370" actId="2696"/>
-        <pc:sldMkLst>
-          <pc:docMk/>
-          <pc:sldMk cId="2894411345" sldId="350"/>
-        </pc:sldMkLst>
-      </pc:sldChg>
-      <pc:sldChg chg="modSp add del">
-        <pc:chgData name="MIGUEL TRIGUEROS MUÑOZ" userId="a4ee0321-97d7-430f-98a8-7ed13ff9a4bf" providerId="ADAL" clId="{9C88CFC2-C7BB-4861-A542-548B698160AC}" dt="2024-10-13T07:12:38.303" v="1375" actId="2696"/>
-        <pc:sldMkLst>
-          <pc:docMk/>
-          <pc:sldMk cId="3434666207" sldId="350"/>
-        </pc:sldMkLst>
-      </pc:sldChg>
-      <pc:sldChg chg="modSp add del">
-        <pc:chgData name="MIGUEL TRIGUEROS MUÑOZ" userId="a4ee0321-97d7-430f-98a8-7ed13ff9a4bf" providerId="ADAL" clId="{9C88CFC2-C7BB-4861-A542-548B698160AC}" dt="2024-10-13T07:09:47.973" v="1355" actId="2696"/>
-        <pc:sldMkLst>
-          <pc:docMk/>
-          <pc:sldMk cId="4255889001" sldId="350"/>
-        </pc:sldMkLst>
-      </pc:sldChg>
-      <pc:sldChg chg="addSp delSp modSp add mod modClrScheme chgLayout">
-        <pc:chgData name="MIGUEL TRIGUEROS MUÑOZ" userId="a4ee0321-97d7-430f-98a8-7ed13ff9a4bf" providerId="ADAL" clId="{9C88CFC2-C7BB-4861-A542-548B698160AC}" dt="2024-10-22T15:39:29.146" v="1732" actId="33524"/>
-        <pc:sldMkLst>
-          <pc:docMk/>
-          <pc:sldMk cId="2076484974" sldId="351"/>
-        </pc:sldMkLst>
-      </pc:sldChg>
-      <pc:sldChg chg="modSp add del">
-        <pc:chgData name="MIGUEL TRIGUEROS MUÑOZ" userId="a4ee0321-97d7-430f-98a8-7ed13ff9a4bf" providerId="ADAL" clId="{9C88CFC2-C7BB-4861-A542-548B698160AC}" dt="2024-10-13T07:19:05.761" v="1493" actId="2696"/>
-        <pc:sldMkLst>
-          <pc:docMk/>
-          <pc:sldMk cId="3060298993" sldId="351"/>
-        </pc:sldMkLst>
-      </pc:sldChg>
-      <pc:sldChg chg="addSp delSp modSp new mod modNotesTx">
-        <pc:chgData name="MIGUEL TRIGUEROS MUÑOZ" userId="a4ee0321-97d7-430f-98a8-7ed13ff9a4bf" providerId="ADAL" clId="{9C88CFC2-C7BB-4861-A542-548B698160AC}" dt="2024-11-07T16:25:58.647" v="3666"/>
-        <pc:sldMkLst>
-          <pc:docMk/>
-          <pc:sldMk cId="683416156" sldId="352"/>
-        </pc:sldMkLst>
-      </pc:sldChg>
-      <pc:sldChg chg="addSp modSp add mod">
-        <pc:chgData name="MIGUEL TRIGUEROS MUÑOZ" userId="a4ee0321-97d7-430f-98a8-7ed13ff9a4bf" providerId="ADAL" clId="{9C88CFC2-C7BB-4861-A542-548B698160AC}" dt="2024-10-22T16:25:43.228" v="1796" actId="1076"/>
-        <pc:sldMkLst>
-          <pc:docMk/>
-          <pc:sldMk cId="1131165253" sldId="353"/>
-        </pc:sldMkLst>
-      </pc:sldChg>
-      <pc:sldChg chg="addSp delSp modSp new mod">
-        <pc:chgData name="MIGUEL TRIGUEROS MUÑOZ" userId="a4ee0321-97d7-430f-98a8-7ed13ff9a4bf" providerId="ADAL" clId="{9C88CFC2-C7BB-4861-A542-548B698160AC}" dt="2024-10-22T16:35:21.019" v="2228" actId="15"/>
-        <pc:sldMkLst>
-          <pc:docMk/>
-          <pc:sldMk cId="3098520206" sldId="354"/>
-        </pc:sldMkLst>
-      </pc:sldChg>
-      <pc:sldChg chg="addSp delSp modSp new mod modClrScheme chgLayout">
-        <pc:chgData name="MIGUEL TRIGUEROS MUÑOZ" userId="a4ee0321-97d7-430f-98a8-7ed13ff9a4bf" providerId="ADAL" clId="{9C88CFC2-C7BB-4861-A542-548B698160AC}" dt="2024-10-22T16:50:58.344" v="2573" actId="20577"/>
-        <pc:sldMkLst>
-          <pc:docMk/>
-          <pc:sldMk cId="3753997660" sldId="355"/>
-        </pc:sldMkLst>
-      </pc:sldChg>
-      <pc:sldMasterChg chg="addSp modSp mod delSldLayout modSldLayout">
-        <pc:chgData name="MIGUEL TRIGUEROS MUÑOZ" userId="a4ee0321-97d7-430f-98a8-7ed13ff9a4bf" providerId="ADAL" clId="{9C88CFC2-C7BB-4861-A542-548B698160AC}" dt="2024-10-22T16:40:06.553" v="2266" actId="20577"/>
-        <pc:sldMasterMkLst>
-          <pc:docMk/>
-          <pc:sldMasterMk cId="876523488" sldId="2147483687"/>
-        </pc:sldMasterMkLst>
-        <pc:sldLayoutChg chg="modSp">
-          <pc:chgData name="MIGUEL TRIGUEROS MUÑOZ" userId="a4ee0321-97d7-430f-98a8-7ed13ff9a4bf" providerId="ADAL" clId="{9C88CFC2-C7BB-4861-A542-548B698160AC}" dt="2024-10-13T06:05:40.843" v="184"/>
-          <pc:sldLayoutMkLst>
-            <pc:docMk/>
-            <pc:sldMasterMk cId="876523488" sldId="2147483687"/>
-            <pc:sldLayoutMk cId="2151700916" sldId="2147483669"/>
-          </pc:sldLayoutMkLst>
-        </pc:sldLayoutChg>
-        <pc:sldLayoutChg chg="modSp">
-          <pc:chgData name="MIGUEL TRIGUEROS MUÑOZ" userId="a4ee0321-97d7-430f-98a8-7ed13ff9a4bf" providerId="ADAL" clId="{9C88CFC2-C7BB-4861-A542-548B698160AC}" dt="2024-10-13T06:05:40.843" v="184"/>
-          <pc:sldLayoutMkLst>
-            <pc:docMk/>
-            <pc:sldMasterMk cId="876523488" sldId="2147483687"/>
-            <pc:sldLayoutMk cId="1007035637" sldId="2147483686"/>
-          </pc:sldLayoutMkLst>
-        </pc:sldLayoutChg>
-        <pc:sldLayoutChg chg="del">
-          <pc:chgData name="MIGUEL TRIGUEROS MUÑOZ" userId="a4ee0321-97d7-430f-98a8-7ed13ff9a4bf" providerId="ADAL" clId="{9C88CFC2-C7BB-4861-A542-548B698160AC}" dt="2024-10-21T21:47:54.151" v="1531" actId="47"/>
-          <pc:sldLayoutMkLst>
-            <pc:docMk/>
-            <pc:sldMasterMk cId="876523488" sldId="2147483687"/>
-            <pc:sldLayoutMk cId="3461786865" sldId="2147483696"/>
-          </pc:sldLayoutMkLst>
-        </pc:sldLayoutChg>
-      </pc:sldMasterChg>
-    </pc:docChg>
-  </pc:docChgLst>
-  <pc:docChgLst>
-    <pc:chgData name="MIGUEL TRIGUEROS MUÑOZ" userId="a4ee0321-97d7-430f-98a8-7ed13ff9a4bf" providerId="ADAL" clId="{ECF7CA32-5363-4D47-B025-306E25F55430}"/>
-    <pc:docChg chg="undo redo custSel addSld delSld modSld sldOrd modMainMaster modSection">
-      <pc:chgData name="MIGUEL TRIGUEROS MUÑOZ" userId="a4ee0321-97d7-430f-98a8-7ed13ff9a4bf" providerId="ADAL" clId="{ECF7CA32-5363-4D47-B025-306E25F55430}" dt="2023-12-10T17:50:55.406" v="3306"/>
-      <pc:docMkLst>
-        <pc:docMk/>
-      </pc:docMkLst>
-      <pc:sldChg chg="addSp delSp modSp mod">
-        <pc:chgData name="MIGUEL TRIGUEROS MUÑOZ" userId="a4ee0321-97d7-430f-98a8-7ed13ff9a4bf" providerId="ADAL" clId="{ECF7CA32-5363-4D47-B025-306E25F55430}" dt="2023-11-26T06:44:07.136" v="2127" actId="1076"/>
-        <pc:sldMkLst>
-          <pc:docMk/>
-          <pc:sldMk cId="308865771" sldId="256"/>
-        </pc:sldMkLst>
-      </pc:sldChg>
-      <pc:sldChg chg="delSp modSp mod addCm">
-        <pc:chgData name="MIGUEL TRIGUEROS MUÑOZ" userId="a4ee0321-97d7-430f-98a8-7ed13ff9a4bf" providerId="ADAL" clId="{ECF7CA32-5363-4D47-B025-306E25F55430}" dt="2023-12-03T16:41:05.523" v="3048" actId="20577"/>
-        <pc:sldMkLst>
-          <pc:docMk/>
-          <pc:sldMk cId="2182144064" sldId="295"/>
-        </pc:sldMkLst>
-        <pc:extLst>
-          <p:ext xmlns:p="http://schemas.openxmlformats.org/presentationml/2006/main" uri="{D6D511B9-2390-475A-947B-AFAB55BFBCF1}">
-            <pc226:cmChg xmlns:pc226="http://schemas.microsoft.com/office/powerpoint/2022/06/main/command" chg="add">
-              <pc226:chgData name="MIGUEL TRIGUEROS MUÑOZ" userId="a4ee0321-97d7-430f-98a8-7ed13ff9a4bf" providerId="ADAL" clId="{ECF7CA32-5363-4D47-B025-306E25F55430}" dt="2023-11-25T07:18:35.948" v="409"/>
-              <pc2:cmMkLst xmlns:pc2="http://schemas.microsoft.com/office/powerpoint/2019/9/main/command">
-                <pc:docMk/>
-                <pc:sldMk cId="2182144064" sldId="295"/>
-                <pc2:cmMk id="{CA9C8CAE-6CDC-4224-88C4-31AC8CCAA95F}"/>
-              </pc2:cmMkLst>
-            </pc226:cmChg>
-          </p:ext>
-        </pc:extLst>
-      </pc:sldChg>
-      <pc:sldChg chg="addSp delSp modSp mod">
-        <pc:chgData name="MIGUEL TRIGUEROS MUÑOZ" userId="a4ee0321-97d7-430f-98a8-7ed13ff9a4bf" providerId="ADAL" clId="{ECF7CA32-5363-4D47-B025-306E25F55430}" dt="2023-12-06T11:21:44.910" v="3139" actId="14100"/>
-        <pc:sldMkLst>
-          <pc:docMk/>
-          <pc:sldMk cId="3881213358" sldId="296"/>
-        </pc:sldMkLst>
-      </pc:sldChg>
-      <pc:sldChg chg="modSp mod">
-        <pc:chgData name="MIGUEL TRIGUEROS MUÑOZ" userId="a4ee0321-97d7-430f-98a8-7ed13ff9a4bf" providerId="ADAL" clId="{ECF7CA32-5363-4D47-B025-306E25F55430}" dt="2023-12-10T17:47:50.163" v="3259" actId="207"/>
-        <pc:sldMkLst>
-          <pc:docMk/>
-          <pc:sldMk cId="1286011775" sldId="300"/>
-        </pc:sldMkLst>
-      </pc:sldChg>
-      <pc:sldChg chg="modSp">
-        <pc:chgData name="MIGUEL TRIGUEROS MUÑOZ" userId="a4ee0321-97d7-430f-98a8-7ed13ff9a4bf" providerId="ADAL" clId="{ECF7CA32-5363-4D47-B025-306E25F55430}" dt="2023-11-25T10:40:06.923" v="1766" actId="20577"/>
-        <pc:sldMkLst>
-          <pc:docMk/>
-          <pc:sldMk cId="1662085430" sldId="302"/>
-        </pc:sldMkLst>
-      </pc:sldChg>
-      <pc:sldChg chg="addSp delSp modSp mod">
-        <pc:chgData name="MIGUEL TRIGUEROS MUÑOZ" userId="a4ee0321-97d7-430f-98a8-7ed13ff9a4bf" providerId="ADAL" clId="{ECF7CA32-5363-4D47-B025-306E25F55430}" dt="2023-12-10T17:47:53.734" v="3260" actId="207"/>
-        <pc:sldMkLst>
-          <pc:docMk/>
-          <pc:sldMk cId="1878582030" sldId="304"/>
-        </pc:sldMkLst>
-      </pc:sldChg>
-      <pc:sldChg chg="addSp modSp mod">
-        <pc:chgData name="MIGUEL TRIGUEROS MUÑOZ" userId="a4ee0321-97d7-430f-98a8-7ed13ff9a4bf" providerId="ADAL" clId="{ECF7CA32-5363-4D47-B025-306E25F55430}" dt="2023-11-26T07:33:38.517" v="2905" actId="20577"/>
-        <pc:sldMkLst>
-          <pc:docMk/>
-          <pc:sldMk cId="524834107" sldId="305"/>
-        </pc:sldMkLst>
-      </pc:sldChg>
-      <pc:sldChg chg="addSp delSp modSp mod">
-        <pc:chgData name="MIGUEL TRIGUEROS MUÑOZ" userId="a4ee0321-97d7-430f-98a8-7ed13ff9a4bf" providerId="ADAL" clId="{ECF7CA32-5363-4D47-B025-306E25F55430}" dt="2023-12-03T16:46:13.291" v="3103" actId="113"/>
-        <pc:sldMkLst>
-          <pc:docMk/>
-          <pc:sldMk cId="3007344242" sldId="306"/>
-        </pc:sldMkLst>
-      </pc:sldChg>
-      <pc:sldChg chg="addSp delSp modSp mod">
-        <pc:chgData name="MIGUEL TRIGUEROS MUÑOZ" userId="a4ee0321-97d7-430f-98a8-7ed13ff9a4bf" providerId="ADAL" clId="{ECF7CA32-5363-4D47-B025-306E25F55430}" dt="2023-12-03T16:47:44.029" v="3120" actId="20577"/>
-        <pc:sldMkLst>
-          <pc:docMk/>
-          <pc:sldMk cId="1441313987" sldId="308"/>
-        </pc:sldMkLst>
-      </pc:sldChg>
-      <pc:sldChg chg="modSp">
-        <pc:chgData name="MIGUEL TRIGUEROS MUÑOZ" userId="a4ee0321-97d7-430f-98a8-7ed13ff9a4bf" providerId="ADAL" clId="{ECF7CA32-5363-4D47-B025-306E25F55430}" dt="2023-11-26T07:35:58.589" v="2951" actId="20577"/>
-        <pc:sldMkLst>
-          <pc:docMk/>
-          <pc:sldMk cId="1679762254" sldId="309"/>
-        </pc:sldMkLst>
-      </pc:sldChg>
-      <pc:sldChg chg="modSp addCm">
-        <pc:chgData name="MIGUEL TRIGUEROS MUÑOZ" userId="a4ee0321-97d7-430f-98a8-7ed13ff9a4bf" providerId="ADAL" clId="{ECF7CA32-5363-4D47-B025-306E25F55430}" dt="2023-12-10T17:50:55.406" v="3306"/>
-        <pc:sldMkLst>
-          <pc:docMk/>
-          <pc:sldMk cId="2242644199" sldId="310"/>
-        </pc:sldMkLst>
-        <pc:extLst>
-          <p:ext xmlns:p="http://schemas.openxmlformats.org/presentationml/2006/main" uri="{D6D511B9-2390-475A-947B-AFAB55BFBCF1}">
-            <pc226:cmChg xmlns:pc226="http://schemas.microsoft.com/office/powerpoint/2022/06/main/command" chg="add">
-              <pc226:chgData name="MIGUEL TRIGUEROS MUÑOZ" userId="a4ee0321-97d7-430f-98a8-7ed13ff9a4bf" providerId="ADAL" clId="{ECF7CA32-5363-4D47-B025-306E25F55430}" dt="2023-12-10T17:50:55.406" v="3306"/>
-              <pc2:cmMkLst xmlns:pc2="http://schemas.microsoft.com/office/powerpoint/2019/9/main/command">
-                <pc:docMk/>
-                <pc:sldMk cId="2242644199" sldId="310"/>
-                <pc2:cmMk id="{67C8A8FA-5B21-4352-9C79-EB9142759F2D}"/>
-              </pc2:cmMkLst>
-            </pc226:cmChg>
-          </p:ext>
-        </pc:extLst>
-      </pc:sldChg>
-      <pc:sldChg chg="modSp">
-        <pc:chgData name="MIGUEL TRIGUEROS MUÑOZ" userId="a4ee0321-97d7-430f-98a8-7ed13ff9a4bf" providerId="ADAL" clId="{ECF7CA32-5363-4D47-B025-306E25F55430}" dt="2023-11-26T07:41:28.771" v="2992" actId="20577"/>
-        <pc:sldMkLst>
-          <pc:docMk/>
-          <pc:sldMk cId="2269836530" sldId="312"/>
-        </pc:sldMkLst>
-      </pc:sldChg>
-      <pc:sldChg chg="delSp modSp mod">
-        <pc:chgData name="MIGUEL TRIGUEROS MUÑOZ" userId="a4ee0321-97d7-430f-98a8-7ed13ff9a4bf" providerId="ADAL" clId="{ECF7CA32-5363-4D47-B025-306E25F55430}" dt="2023-11-26T07:14:26.572" v="2640" actId="20577"/>
-        <pc:sldMkLst>
-          <pc:docMk/>
-          <pc:sldMk cId="745458148" sldId="314"/>
-        </pc:sldMkLst>
-      </pc:sldChg>
-      <pc:sldChg chg="addSp delSp modSp mod">
-        <pc:chgData name="MIGUEL TRIGUEROS MUÑOZ" userId="a4ee0321-97d7-430f-98a8-7ed13ff9a4bf" providerId="ADAL" clId="{ECF7CA32-5363-4D47-B025-306E25F55430}" dt="2023-12-10T17:49:36.524" v="3305" actId="20577"/>
-        <pc:sldMkLst>
-          <pc:docMk/>
-          <pc:sldMk cId="279635090" sldId="315"/>
-        </pc:sldMkLst>
-      </pc:sldChg>
-      <pc:sldChg chg="addSp delSp modSp mod addCm">
-        <pc:chgData name="MIGUEL TRIGUEROS MUÑOZ" userId="a4ee0321-97d7-430f-98a8-7ed13ff9a4bf" providerId="ADAL" clId="{ECF7CA32-5363-4D47-B025-306E25F55430}" dt="2023-11-26T07:06:42.666" v="2606" actId="9405"/>
-        <pc:sldMkLst>
-          <pc:docMk/>
-          <pc:sldMk cId="2861142992" sldId="316"/>
-        </pc:sldMkLst>
-        <pc:extLst>
-          <p:ext xmlns:p="http://schemas.openxmlformats.org/presentationml/2006/main" uri="{D6D511B9-2390-475A-947B-AFAB55BFBCF1}">
-            <pc226:cmChg xmlns:pc226="http://schemas.microsoft.com/office/powerpoint/2022/06/main/command" chg="add">
-              <pc226:chgData name="MIGUEL TRIGUEROS MUÑOZ" userId="a4ee0321-97d7-430f-98a8-7ed13ff9a4bf" providerId="ADAL" clId="{ECF7CA32-5363-4D47-B025-306E25F55430}" dt="2023-11-25T07:24:21.334" v="421"/>
-              <pc2:cmMkLst xmlns:pc2="http://schemas.microsoft.com/office/powerpoint/2019/9/main/command">
-                <pc:docMk/>
-                <pc:sldMk cId="2861142992" sldId="316"/>
-                <pc2:cmMk id="{1A07DCB7-E8E0-4095-912E-CA94356E266C}"/>
-              </pc2:cmMkLst>
-            </pc226:cmChg>
-          </p:ext>
-        </pc:extLst>
-      </pc:sldChg>
-      <pc:sldChg chg="addSp delSp modSp mod">
-        <pc:chgData name="MIGUEL TRIGUEROS MUÑOZ" userId="a4ee0321-97d7-430f-98a8-7ed13ff9a4bf" providerId="ADAL" clId="{ECF7CA32-5363-4D47-B025-306E25F55430}" dt="2023-11-26T06:52:56.488" v="2311" actId="20577"/>
-        <pc:sldMkLst>
-          <pc:docMk/>
-          <pc:sldMk cId="2928801094" sldId="317"/>
-        </pc:sldMkLst>
-      </pc:sldChg>
-      <pc:sldChg chg="delSp del">
-        <pc:chgData name="MIGUEL TRIGUEROS MUÑOZ" userId="a4ee0321-97d7-430f-98a8-7ed13ff9a4bf" providerId="ADAL" clId="{ECF7CA32-5363-4D47-B025-306E25F55430}" dt="2023-11-26T07:09:27.655" v="2619" actId="2696"/>
-        <pc:sldMkLst>
-          <pc:docMk/>
-          <pc:sldMk cId="579504102" sldId="318"/>
-        </pc:sldMkLst>
-      </pc:sldChg>
-      <pc:sldChg chg="delSp del">
-        <pc:chgData name="MIGUEL TRIGUEROS MUÑOZ" userId="a4ee0321-97d7-430f-98a8-7ed13ff9a4bf" providerId="ADAL" clId="{ECF7CA32-5363-4D47-B025-306E25F55430}" dt="2023-11-26T07:11:06.637" v="2627" actId="2696"/>
-        <pc:sldMkLst>
-          <pc:docMk/>
-          <pc:sldMk cId="3820478449" sldId="319"/>
-        </pc:sldMkLst>
-      </pc:sldChg>
-      <pc:sldChg chg="addSp delSp modSp mod ord">
-        <pc:chgData name="MIGUEL TRIGUEROS MUÑOZ" userId="a4ee0321-97d7-430f-98a8-7ed13ff9a4bf" providerId="ADAL" clId="{ECF7CA32-5363-4D47-B025-306E25F55430}" dt="2023-11-26T07:05:04.814" v="2592" actId="14100"/>
-        <pc:sldMkLst>
-          <pc:docMk/>
-          <pc:sldMk cId="3143426356" sldId="320"/>
-        </pc:sldMkLst>
-      </pc:sldChg>
-      <pc:sldChg chg="addSp delSp modSp add mod ord">
-        <pc:chgData name="MIGUEL TRIGUEROS MUÑOZ" userId="a4ee0321-97d7-430f-98a8-7ed13ff9a4bf" providerId="ADAL" clId="{ECF7CA32-5363-4D47-B025-306E25F55430}" dt="2023-12-03T16:39:36.963" v="3037" actId="207"/>
-        <pc:sldMkLst>
-          <pc:docMk/>
-          <pc:sldMk cId="2894294298" sldId="321"/>
-        </pc:sldMkLst>
-      </pc:sldChg>
-      <pc:sldChg chg="addSp delSp modSp add mod">
-        <pc:chgData name="MIGUEL TRIGUEROS MUÑOZ" userId="a4ee0321-97d7-430f-98a8-7ed13ff9a4bf" providerId="ADAL" clId="{ECF7CA32-5363-4D47-B025-306E25F55430}" dt="2023-11-25T06:27:45.248" v="153" actId="207"/>
-        <pc:sldMkLst>
-          <pc:docMk/>
-          <pc:sldMk cId="986423972" sldId="322"/>
-        </pc:sldMkLst>
-      </pc:sldChg>
-      <pc:sldChg chg="modSp add del">
-        <pc:chgData name="MIGUEL TRIGUEROS MUÑOZ" userId="a4ee0321-97d7-430f-98a8-7ed13ff9a4bf" providerId="ADAL" clId="{ECF7CA32-5363-4D47-B025-306E25F55430}" dt="2023-11-25T06:30:59.477" v="303" actId="2696"/>
-        <pc:sldMkLst>
-          <pc:docMk/>
-          <pc:sldMk cId="848466910" sldId="323"/>
-        </pc:sldMkLst>
-      </pc:sldChg>
-      <pc:sldChg chg="addSp delSp modSp add mod">
-        <pc:chgData name="MIGUEL TRIGUEROS MUÑOZ" userId="a4ee0321-97d7-430f-98a8-7ed13ff9a4bf" providerId="ADAL" clId="{ECF7CA32-5363-4D47-B025-306E25F55430}" dt="2023-11-26T07:16:21.965" v="2670" actId="20577"/>
-        <pc:sldMkLst>
-          <pc:docMk/>
-          <pc:sldMk cId="1069880379" sldId="323"/>
-        </pc:sldMkLst>
-      </pc:sldChg>
-      <pc:sldChg chg="modSp add del">
-        <pc:chgData name="MIGUEL TRIGUEROS MUÑOZ" userId="a4ee0321-97d7-430f-98a8-7ed13ff9a4bf" providerId="ADAL" clId="{ECF7CA32-5363-4D47-B025-306E25F55430}" dt="2023-11-25T07:25:57.010" v="438" actId="2696"/>
-        <pc:sldMkLst>
-          <pc:docMk/>
-          <pc:sldMk cId="1573640797" sldId="323"/>
-        </pc:sldMkLst>
-      </pc:sldChg>
-      <pc:sldChg chg="addSp delSp modSp add mod">
-        <pc:chgData name="MIGUEL TRIGUEROS MUÑOZ" userId="a4ee0321-97d7-430f-98a8-7ed13ff9a4bf" providerId="ADAL" clId="{ECF7CA32-5363-4D47-B025-306E25F55430}" dt="2023-11-25T10:20:38.957" v="1509" actId="208"/>
-        <pc:sldMkLst>
-          <pc:docMk/>
-          <pc:sldMk cId="2304737095" sldId="324"/>
-        </pc:sldMkLst>
-      </pc:sldChg>
-      <pc:sldChg chg="modSp add del">
-        <pc:chgData name="MIGUEL TRIGUEROS MUÑOZ" userId="a4ee0321-97d7-430f-98a8-7ed13ff9a4bf" providerId="ADAL" clId="{ECF7CA32-5363-4D47-B025-306E25F55430}" dt="2023-11-25T07:27:01.097" v="479" actId="2696"/>
-        <pc:sldMkLst>
-          <pc:docMk/>
-          <pc:sldMk cId="4030946607" sldId="324"/>
-        </pc:sldMkLst>
-      </pc:sldChg>
-      <pc:sldChg chg="addSp delSp modSp add mod">
-        <pc:chgData name="MIGUEL TRIGUEROS MUÑOZ" userId="a4ee0321-97d7-430f-98a8-7ed13ff9a4bf" providerId="ADAL" clId="{ECF7CA32-5363-4D47-B025-306E25F55430}" dt="2023-11-26T07:20:29.060" v="2745" actId="14100"/>
-        <pc:sldMkLst>
-          <pc:docMk/>
-          <pc:sldMk cId="1122745256" sldId="325"/>
-        </pc:sldMkLst>
-      </pc:sldChg>
-      <pc:sldChg chg="modSp add del">
-        <pc:chgData name="MIGUEL TRIGUEROS MUÑOZ" userId="a4ee0321-97d7-430f-98a8-7ed13ff9a4bf" providerId="ADAL" clId="{ECF7CA32-5363-4D47-B025-306E25F55430}" dt="2023-11-25T07:31:49.926" v="823" actId="2696"/>
-        <pc:sldMkLst>
-          <pc:docMk/>
-          <pc:sldMk cId="1524151713" sldId="325"/>
-        </pc:sldMkLst>
-      </pc:sldChg>
-      <pc:sldChg chg="modSp add del">
-        <pc:chgData name="MIGUEL TRIGUEROS MUÑOZ" userId="a4ee0321-97d7-430f-98a8-7ed13ff9a4bf" providerId="ADAL" clId="{ECF7CA32-5363-4D47-B025-306E25F55430}" dt="2023-11-25T07:37:42.276" v="1051" actId="2696"/>
-        <pc:sldMkLst>
-          <pc:docMk/>
-          <pc:sldMk cId="1483350769" sldId="326"/>
-        </pc:sldMkLst>
-      </pc:sldChg>
-      <pc:sldChg chg="addSp delSp modSp add mod">
-        <pc:chgData name="MIGUEL TRIGUEROS MUÑOZ" userId="a4ee0321-97d7-430f-98a8-7ed13ff9a4bf" providerId="ADAL" clId="{ECF7CA32-5363-4D47-B025-306E25F55430}" dt="2023-11-26T07:27:07.131" v="2750" actId="20577"/>
-        <pc:sldMkLst>
-          <pc:docMk/>
-          <pc:sldMk cId="3983183523" sldId="326"/>
-        </pc:sldMkLst>
-      </pc:sldChg>
-      <pc:sldChg chg="addSp modSp add mod">
-        <pc:chgData name="MIGUEL TRIGUEROS MUÑOZ" userId="a4ee0321-97d7-430f-98a8-7ed13ff9a4bf" providerId="ADAL" clId="{ECF7CA32-5363-4D47-B025-306E25F55430}" dt="2023-11-25T09:36:43.537" v="1401" actId="1076"/>
-        <pc:sldMkLst>
-          <pc:docMk/>
-          <pc:sldMk cId="1414400370" sldId="327"/>
-        </pc:sldMkLst>
-      </pc:sldChg>
-      <pc:sldChg chg="modSp add del">
-        <pc:chgData name="MIGUEL TRIGUEROS MUÑOZ" userId="a4ee0321-97d7-430f-98a8-7ed13ff9a4bf" providerId="ADAL" clId="{ECF7CA32-5363-4D47-B025-306E25F55430}" dt="2023-11-25T07:55:01.807" v="1364" actId="2696"/>
-        <pc:sldMkLst>
-          <pc:docMk/>
-          <pc:sldMk cId="3976127957" sldId="327"/>
-        </pc:sldMkLst>
-      </pc:sldChg>
-      <pc:sldChg chg="addSp delSp modSp add mod">
-        <pc:chgData name="MIGUEL TRIGUEROS MUÑOZ" userId="a4ee0321-97d7-430f-98a8-7ed13ff9a4bf" providerId="ADAL" clId="{ECF7CA32-5363-4D47-B025-306E25F55430}" dt="2023-11-26T07:19:39.014" v="2736" actId="14100"/>
-        <pc:sldMkLst>
-          <pc:docMk/>
-          <pc:sldMk cId="3410194891" sldId="328"/>
-        </pc:sldMkLst>
-      </pc:sldChg>
-      <pc:sldChg chg="modSp add del">
-        <pc:chgData name="MIGUEL TRIGUEROS MUÑOZ" userId="a4ee0321-97d7-430f-98a8-7ed13ff9a4bf" providerId="ADAL" clId="{ECF7CA32-5363-4D47-B025-306E25F55430}" dt="2023-11-25T09:36:29.535" v="1387" actId="2696"/>
-        <pc:sldMkLst>
-          <pc:docMk/>
-          <pc:sldMk cId="4286382909" sldId="328"/>
-        </pc:sldMkLst>
-      </pc:sldChg>
-      <pc:sldChg chg="modSp add">
-        <pc:chgData name="MIGUEL TRIGUEROS MUÑOZ" userId="a4ee0321-97d7-430f-98a8-7ed13ff9a4bf" providerId="ADAL" clId="{ECF7CA32-5363-4D47-B025-306E25F55430}" dt="2023-11-25T10:43:11.383" v="1946" actId="313"/>
-        <pc:sldMkLst>
-          <pc:docMk/>
-          <pc:sldMk cId="97368630" sldId="329"/>
-        </pc:sldMkLst>
-      </pc:sldChg>
-      <pc:sldChg chg="modSp add del">
-        <pc:chgData name="MIGUEL TRIGUEROS MUÑOZ" userId="a4ee0321-97d7-430f-98a8-7ed13ff9a4bf" providerId="ADAL" clId="{ECF7CA32-5363-4D47-B025-306E25F55430}" dt="2023-11-25T10:12:46.233" v="1466" actId="2696"/>
-        <pc:sldMkLst>
-          <pc:docMk/>
-          <pc:sldMk cId="1940515242" sldId="329"/>
-        </pc:sldMkLst>
-      </pc:sldChg>
-      <pc:sldChg chg="addSp delSp modSp add ord">
-        <pc:chgData name="MIGUEL TRIGUEROS MUÑOZ" userId="a4ee0321-97d7-430f-98a8-7ed13ff9a4bf" providerId="ADAL" clId="{ECF7CA32-5363-4D47-B025-306E25F55430}" dt="2023-11-26T07:44:12.644" v="2995" actId="20577"/>
-        <pc:sldMkLst>
-          <pc:docMk/>
-          <pc:sldMk cId="544873430" sldId="330"/>
-        </pc:sldMkLst>
-      </pc:sldChg>
-      <pc:sldChg chg="modSp add del">
-        <pc:chgData name="MIGUEL TRIGUEROS MUÑOZ" userId="a4ee0321-97d7-430f-98a8-7ed13ff9a4bf" providerId="ADAL" clId="{ECF7CA32-5363-4D47-B025-306E25F55430}" dt="2023-11-26T06:54:32.280" v="2372"/>
-        <pc:sldMkLst>
-          <pc:docMk/>
-          <pc:sldMk cId="892033424" sldId="330"/>
-        </pc:sldMkLst>
-      </pc:sldChg>
-      <pc:sldChg chg="modSp add del">
-        <pc:chgData name="MIGUEL TRIGUEROS MUÑOZ" userId="a4ee0321-97d7-430f-98a8-7ed13ff9a4bf" providerId="ADAL" clId="{ECF7CA32-5363-4D47-B025-306E25F55430}" dt="2023-11-26T06:54:03.899" v="2343"/>
-        <pc:sldMkLst>
-          <pc:docMk/>
-          <pc:sldMk cId="2651884297" sldId="330"/>
-        </pc:sldMkLst>
-      </pc:sldChg>
-      <pc:sldChg chg="modSp add del">
-        <pc:chgData name="MIGUEL TRIGUEROS MUÑOZ" userId="a4ee0321-97d7-430f-98a8-7ed13ff9a4bf" providerId="ADAL" clId="{ECF7CA32-5363-4D47-B025-306E25F55430}" dt="2023-11-25T10:42:12.409" v="1802" actId="2696"/>
-        <pc:sldMkLst>
-          <pc:docMk/>
-          <pc:sldMk cId="2800968920" sldId="330"/>
-        </pc:sldMkLst>
-      </pc:sldChg>
-      <pc:sldChg chg="modSp add del">
-        <pc:chgData name="MIGUEL TRIGUEROS MUÑOZ" userId="a4ee0321-97d7-430f-98a8-7ed13ff9a4bf" providerId="ADAL" clId="{ECF7CA32-5363-4D47-B025-306E25F55430}" dt="2023-11-26T06:48:46.763" v="2190" actId="2696"/>
-        <pc:sldMkLst>
-          <pc:docMk/>
-          <pc:sldMk cId="4046763815" sldId="330"/>
-        </pc:sldMkLst>
-      </pc:sldChg>
-      <pc:sldChg chg="modSp add del">
-        <pc:chgData name="MIGUEL TRIGUEROS MUÑOZ" userId="a4ee0321-97d7-430f-98a8-7ed13ff9a4bf" providerId="ADAL" clId="{ECF7CA32-5363-4D47-B025-306E25F55430}" dt="2023-11-26T07:01:33.194" v="2543"/>
-        <pc:sldMkLst>
-          <pc:docMk/>
-          <pc:sldMk cId="324130740" sldId="331"/>
-        </pc:sldMkLst>
-      </pc:sldChg>
-      <pc:sldChg chg="addSp delSp modSp add mod">
-        <pc:chgData name="MIGUEL TRIGUEROS MUÑOZ" userId="a4ee0321-97d7-430f-98a8-7ed13ff9a4bf" providerId="ADAL" clId="{ECF7CA32-5363-4D47-B025-306E25F55430}" dt="2023-11-26T07:12:23.725" v="2628" actId="9405"/>
-        <pc:sldMkLst>
-          <pc:docMk/>
-          <pc:sldMk cId="959411268" sldId="331"/>
-        </pc:sldMkLst>
-      </pc:sldChg>
-      <pc:sldChg chg="modSp add del">
-        <pc:chgData name="MIGUEL TRIGUEROS MUÑOZ" userId="a4ee0321-97d7-430f-98a8-7ed13ff9a4bf" providerId="ADAL" clId="{ECF7CA32-5363-4D47-B025-306E25F55430}" dt="2023-11-26T07:01:40.599" v="2547" actId="2696"/>
-        <pc:sldMkLst>
-          <pc:docMk/>
-          <pc:sldMk cId="1611791801" sldId="331"/>
-        </pc:sldMkLst>
-      </pc:sldChg>
-      <pc:sldChg chg="modSp add del">
-        <pc:chgData name="MIGUEL TRIGUEROS MUÑOZ" userId="a4ee0321-97d7-430f-98a8-7ed13ff9a4bf" providerId="ADAL" clId="{ECF7CA32-5363-4D47-B025-306E25F55430}" dt="2023-11-26T07:00:33.270" v="2530" actId="2696"/>
-        <pc:sldMkLst>
-          <pc:docMk/>
-          <pc:sldMk cId="3419335723" sldId="331"/>
-        </pc:sldMkLst>
-      </pc:sldChg>
-      <pc:sldChg chg="addSp delSp modSp add mod">
-        <pc:chgData name="MIGUEL TRIGUEROS MUÑOZ" userId="a4ee0321-97d7-430f-98a8-7ed13ff9a4bf" providerId="ADAL" clId="{ECF7CA32-5363-4D47-B025-306E25F55430}" dt="2023-11-26T07:12:27.933" v="2629" actId="9405"/>
-        <pc:sldMkLst>
-          <pc:docMk/>
-          <pc:sldMk cId="1952241282" sldId="332"/>
-        </pc:sldMkLst>
-      </pc:sldChg>
-      <pc:sldChg chg="addSp modSp add mod">
-        <pc:chgData name="MIGUEL TRIGUEROS MUÑOZ" userId="a4ee0321-97d7-430f-98a8-7ed13ff9a4bf" providerId="ADAL" clId="{ECF7CA32-5363-4D47-B025-306E25F55430}" dt="2023-11-26T07:29:44.157" v="2882" actId="14100"/>
-        <pc:sldMkLst>
-          <pc:docMk/>
-          <pc:sldMk cId="2336738011" sldId="333"/>
-        </pc:sldMkLst>
-      </pc:sldChg>
-      <pc:sldChg chg="addSp delSp modSp add mod ord">
-        <pc:chgData name="MIGUEL TRIGUEROS MUÑOZ" userId="a4ee0321-97d7-430f-98a8-7ed13ff9a4bf" providerId="ADAL" clId="{ECF7CA32-5363-4D47-B025-306E25F55430}" dt="2023-12-03T16:38:30.670" v="3023" actId="207"/>
-        <pc:sldMkLst>
-          <pc:docMk/>
-          <pc:sldMk cId="1325656893" sldId="334"/>
-        </pc:sldMkLst>
-      </pc:sldChg>
-      <pc:sldChg chg="modSp add del">
-        <pc:chgData name="MIGUEL TRIGUEROS MUÑOZ" userId="a4ee0321-97d7-430f-98a8-7ed13ff9a4bf" providerId="ADAL" clId="{ECF7CA32-5363-4D47-B025-306E25F55430}" dt="2023-11-26T07:27:17.041" v="2778" actId="2696"/>
-        <pc:sldMkLst>
-          <pc:docMk/>
-          <pc:sldMk cId="3295419295" sldId="334"/>
-        </pc:sldMkLst>
-      </pc:sldChg>
-      <pc:sldChg chg="addSp delSp modSp add mod">
-        <pc:chgData name="MIGUEL TRIGUEROS MUÑOZ" userId="a4ee0321-97d7-430f-98a8-7ed13ff9a4bf" providerId="ADAL" clId="{ECF7CA32-5363-4D47-B025-306E25F55430}" dt="2023-12-03T16:38:38.624" v="3028" actId="207"/>
-        <pc:sldMkLst>
-          <pc:docMk/>
-          <pc:sldMk cId="2012064882" sldId="335"/>
-        </pc:sldMkLst>
-      </pc:sldChg>
-      <pc:sldChg chg="addSp modSp new mod">
-        <pc:chgData name="MIGUEL TRIGUEROS MUÑOZ" userId="a4ee0321-97d7-430f-98a8-7ed13ff9a4bf" providerId="ADAL" clId="{ECF7CA32-5363-4D47-B025-306E25F55430}" dt="2023-12-03T16:43:28.336" v="3088"/>
-        <pc:sldMkLst>
-          <pc:docMk/>
-          <pc:sldMk cId="3389564933" sldId="336"/>
-        </pc:sldMkLst>
-      </pc:sldChg>
-      <pc:sldChg chg="addSp delSp modSp add mod">
-        <pc:chgData name="MIGUEL TRIGUEROS MUÑOZ" userId="a4ee0321-97d7-430f-98a8-7ed13ff9a4bf" providerId="ADAL" clId="{ECF7CA32-5363-4D47-B025-306E25F55430}" dt="2023-12-03T16:44:29.728" v="3101" actId="1076"/>
-        <pc:sldMkLst>
-          <pc:docMk/>
-          <pc:sldMk cId="3634630687" sldId="337"/>
-        </pc:sldMkLst>
-      </pc:sldChg>
-      <pc:sldChg chg="modSp add del">
-        <pc:chgData name="MIGUEL TRIGUEROS MUÑOZ" userId="a4ee0321-97d7-430f-98a8-7ed13ff9a4bf" providerId="ADAL" clId="{ECF7CA32-5363-4D47-B025-306E25F55430}" dt="2023-12-06T11:20:26.290" v="3129" actId="2696"/>
-        <pc:sldMkLst>
-          <pc:docMk/>
-          <pc:sldMk cId="608183959" sldId="338"/>
-        </pc:sldMkLst>
-      </pc:sldChg>
-      <pc:sldChg chg="modSp add del">
-        <pc:chgData name="MIGUEL TRIGUEROS MUÑOZ" userId="a4ee0321-97d7-430f-98a8-7ed13ff9a4bf" providerId="ADAL" clId="{ECF7CA32-5363-4D47-B025-306E25F55430}" dt="2023-12-06T11:25:25.506" v="3141" actId="2696"/>
-        <pc:sldMkLst>
-          <pc:docMk/>
-          <pc:sldMk cId="1017278950" sldId="338"/>
-        </pc:sldMkLst>
-      </pc:sldChg>
-      <pc:sldChg chg="modSp add del">
-        <pc:chgData name="MIGUEL TRIGUEROS MUÑOZ" userId="a4ee0321-97d7-430f-98a8-7ed13ff9a4bf" providerId="ADAL" clId="{ECF7CA32-5363-4D47-B025-306E25F55430}" dt="2023-12-06T11:19:50.724" v="3122" actId="2696"/>
-        <pc:sldMkLst>
-          <pc:docMk/>
-          <pc:sldMk cId="2167009757" sldId="338"/>
-        </pc:sldMkLst>
-      </pc:sldChg>
-      <pc:sldChg chg="modSp add del">
-        <pc:chgData name="MIGUEL TRIGUEROS MUÑOZ" userId="a4ee0321-97d7-430f-98a8-7ed13ff9a4bf" providerId="ADAL" clId="{ECF7CA32-5363-4D47-B025-306E25F55430}" dt="2023-12-06T11:26:52.405" v="3188" actId="2696"/>
-        <pc:sldMkLst>
-          <pc:docMk/>
-          <pc:sldMk cId="3847534666" sldId="338"/>
-        </pc:sldMkLst>
-      </pc:sldChg>
-      <pc:sldMasterChg chg="delSp modSp mod">
-        <pc:chgData name="MIGUEL TRIGUEROS MUÑOZ" userId="a4ee0321-97d7-430f-98a8-7ed13ff9a4bf" providerId="ADAL" clId="{ECF7CA32-5363-4D47-B025-306E25F55430}" dt="2023-11-25T07:31:14.933" v="791" actId="14100"/>
-        <pc:sldMasterMkLst>
-          <pc:docMk/>
-          <pc:sldMasterMk cId="138951284" sldId="2147483668"/>
-        </pc:sldMasterMkLst>
-      </pc:sldMasterChg>
-    </pc:docChg>
-  </pc:docChgLst>
-  <pc:docChgLst>
-    <pc:chgData name="TRIGUEROS MUÑOZ, MIGUEL" userId="93f31087-8566-4d16-a7a1-f20635823349" providerId="ADAL" clId="{28A45800-A829-4FF9-9AF1-45101DDF326D}"/>
-    <pc:docChg chg="custSel modSld modMainMaster addSection modSection">
-      <pc:chgData name="TRIGUEROS MUÑOZ, MIGUEL" userId="93f31087-8566-4d16-a7a1-f20635823349" providerId="ADAL" clId="{28A45800-A829-4FF9-9AF1-45101DDF326D}" dt="2022-11-20T17:40:05.951" v="87"/>
-      <pc:docMkLst>
-        <pc:docMk/>
-      </pc:docMkLst>
-      <pc:sldChg chg="addSp delSp modSp">
-        <pc:chgData name="TRIGUEROS MUÑOZ, MIGUEL" userId="93f31087-8566-4d16-a7a1-f20635823349" providerId="ADAL" clId="{28A45800-A829-4FF9-9AF1-45101DDF326D}" dt="2022-11-20T17:38:11.657" v="78"/>
-        <pc:sldMkLst>
-          <pc:docMk/>
-          <pc:sldMk cId="308865771" sldId="256"/>
-        </pc:sldMkLst>
-      </pc:sldChg>
-      <pc:sldChg chg="delSp mod">
-        <pc:chgData name="TRIGUEROS MUÑOZ, MIGUEL" userId="93f31087-8566-4d16-a7a1-f20635823349" providerId="ADAL" clId="{28A45800-A829-4FF9-9AF1-45101DDF326D}" dt="2022-11-20T17:39:17.696" v="82" actId="478"/>
-        <pc:sldMkLst>
-          <pc:docMk/>
-          <pc:sldMk cId="3881213358" sldId="296"/>
-        </pc:sldMkLst>
-      </pc:sldChg>
-      <pc:sldChg chg="modSp mod">
-        <pc:chgData name="TRIGUEROS MUÑOZ, MIGUEL" userId="93f31087-8566-4d16-a7a1-f20635823349" providerId="ADAL" clId="{28A45800-A829-4FF9-9AF1-45101DDF326D}" dt="2022-11-20T17:33:14.803" v="28" actId="20577"/>
-        <pc:sldMkLst>
-          <pc:docMk/>
-          <pc:sldMk cId="1662085430" sldId="302"/>
-        </pc:sldMkLst>
-      </pc:sldChg>
-      <pc:sldChg chg="addSp delSp modSp mod">
-        <pc:chgData name="TRIGUEROS MUÑOZ, MIGUEL" userId="93f31087-8566-4d16-a7a1-f20635823349" providerId="ADAL" clId="{28A45800-A829-4FF9-9AF1-45101DDF326D}" dt="2022-11-20T17:36:04.460" v="64" actId="21"/>
-        <pc:sldMkLst>
-          <pc:docMk/>
-          <pc:sldMk cId="745458148" sldId="314"/>
-        </pc:sldMkLst>
-      </pc:sldChg>
-      <pc:sldChg chg="delSp mod">
-        <pc:chgData name="TRIGUEROS MUÑOZ, MIGUEL" userId="93f31087-8566-4d16-a7a1-f20635823349" providerId="ADAL" clId="{28A45800-A829-4FF9-9AF1-45101DDF326D}" dt="2022-11-20T17:38:26.571" v="79" actId="478"/>
-        <pc:sldMkLst>
-          <pc:docMk/>
-          <pc:sldMk cId="279635090" sldId="315"/>
-        </pc:sldMkLst>
-      </pc:sldChg>
-      <pc:sldMasterChg chg="addSp modSp mod addSldLayout modSldLayout">
-        <pc:chgData name="TRIGUEROS MUÑOZ, MIGUEL" userId="93f31087-8566-4d16-a7a1-f20635823349" providerId="ADAL" clId="{28A45800-A829-4FF9-9AF1-45101DDF326D}" dt="2022-11-20T17:40:05.951" v="87"/>
-        <pc:sldMasterMkLst>
-          <pc:docMk/>
-          <pc:sldMasterMk cId="138951284" sldId="2147483668"/>
-        </pc:sldMasterMkLst>
-        <pc:sldLayoutChg chg="addSp delSp modSp">
-          <pc:chgData name="TRIGUEROS MUÑOZ, MIGUEL" userId="93f31087-8566-4d16-a7a1-f20635823349" providerId="ADAL" clId="{28A45800-A829-4FF9-9AF1-45101DDF326D}" dt="2022-11-20T17:40:05.951" v="87"/>
-          <pc:sldLayoutMkLst>
-            <pc:docMk/>
-            <pc:sldMasterMk cId="876523488" sldId="2147483687"/>
-            <pc:sldLayoutMk cId="2151700916" sldId="2147483669"/>
-          </pc:sldLayoutMkLst>
-        </pc:sldLayoutChg>
-        <pc:sldLayoutChg chg="addSp delSp modSp mod">
-          <pc:chgData name="TRIGUEROS MUÑOZ, MIGUEL" userId="93f31087-8566-4d16-a7a1-f20635823349" providerId="ADAL" clId="{28A45800-A829-4FF9-9AF1-45101DDF326D}" dt="2022-11-20T17:37:03.080" v="71" actId="21"/>
-          <pc:sldLayoutMkLst>
-            <pc:docMk/>
-            <pc:sldMasterMk cId="138951284" sldId="2147483668"/>
-            <pc:sldLayoutMk cId="1423141970" sldId="2147483670"/>
-          </pc:sldLayoutMkLst>
-        </pc:sldLayoutChg>
-        <pc:sldLayoutChg chg="new mod">
-          <pc:chgData name="TRIGUEROS MUÑOZ, MIGUEL" userId="93f31087-8566-4d16-a7a1-f20635823349" providerId="ADAL" clId="{28A45800-A829-4FF9-9AF1-45101DDF326D}" dt="2022-11-20T17:39:46.886" v="83" actId="11236"/>
-          <pc:sldLayoutMkLst>
-            <pc:docMk/>
-            <pc:sldMasterMk cId="876523488" sldId="2147483687"/>
-            <pc:sldLayoutMk cId="1007035637" sldId="2147483686"/>
-          </pc:sldLayoutMkLst>
-        </pc:sldLayoutChg>
-      </pc:sldMasterChg>
-    </pc:docChg>
-  </pc:docChgLst>
-  <pc:docChgLst>
-    <pc:chgData name="MIGUEL TRIGUEROS MUÑOZ" userId="a4ee0321-97d7-430f-98a8-7ed13ff9a4bf" providerId="ADAL" clId="{DEB93CC6-CB12-4D4E-9032-AF10A8D2E82F}"/>
-    <pc:docChg chg="undo custSel addSld delSld modSld sldOrd modSection">
-      <pc:chgData name="MIGUEL TRIGUEROS MUÑOZ" userId="a4ee0321-97d7-430f-98a8-7ed13ff9a4bf" providerId="ADAL" clId="{DEB93CC6-CB12-4D4E-9032-AF10A8D2E82F}" dt="2024-01-14T10:06:18.358" v="865" actId="20577"/>
-      <pc:docMkLst>
-        <pc:docMk/>
-      </pc:docMkLst>
-      <pc:sldChg chg="modSp mod modCm">
-        <pc:chgData name="MIGUEL TRIGUEROS MUÑOZ" userId="a4ee0321-97d7-430f-98a8-7ed13ff9a4bf" providerId="ADAL" clId="{DEB93CC6-CB12-4D4E-9032-AF10A8D2E82F}" dt="2024-01-14T10:03:36.097" v="862"/>
-        <pc:sldMkLst>
-          <pc:docMk/>
-          <pc:sldMk cId="308865771" sldId="256"/>
-        </pc:sldMkLst>
-        <pc:extLst>
-          <p:ext xmlns:p="http://schemas.openxmlformats.org/presentationml/2006/main" uri="{D6D511B9-2390-475A-947B-AFAB55BFBCF1}">
-            <pc226:cmChg xmlns:pc226="http://schemas.microsoft.com/office/powerpoint/2022/06/main/command" chg="">
-              <pc226:chgData name="MIGUEL TRIGUEROS MUÑOZ" userId="a4ee0321-97d7-430f-98a8-7ed13ff9a4bf" providerId="ADAL" clId="{DEB93CC6-CB12-4D4E-9032-AF10A8D2E82F}" dt="2024-01-14T10:03:36.097" v="862"/>
-              <pc2:cmMkLst xmlns:pc2="http://schemas.microsoft.com/office/powerpoint/2019/9/main/command">
-                <pc:docMk/>
-                <pc:sldMk cId="308865771" sldId="256"/>
-                <pc2:cmMk id="{F1528637-61FE-4547-9330-70EE5DB07593}"/>
-              </pc2:cmMkLst>
-              <pc226:cmRplyChg chg="add">
-                <pc226:chgData name="MIGUEL TRIGUEROS MUÑOZ" userId="a4ee0321-97d7-430f-98a8-7ed13ff9a4bf" providerId="ADAL" clId="{DEB93CC6-CB12-4D4E-9032-AF10A8D2E82F}" dt="2024-01-14T10:03:36.097" v="862"/>
-                <pc2:cmRplyMkLst xmlns:pc2="http://schemas.microsoft.com/office/powerpoint/2019/9/main/command">
-                  <pc:docMk/>
-                  <pc:sldMk cId="308865771" sldId="256"/>
-                  <pc2:cmMk id="{F1528637-61FE-4547-9330-70EE5DB07593}"/>
-                  <pc2:cmRplyMk id="{F6D17209-6F6C-47EF-A7FB-BB586BB7F880}"/>
-                </pc2:cmRplyMkLst>
-              </pc226:cmRplyChg>
-            </pc226:cmChg>
-          </p:ext>
-        </pc:extLst>
-      </pc:sldChg>
-      <pc:sldChg chg="modSp ord">
-        <pc:chgData name="MIGUEL TRIGUEROS MUÑOZ" userId="a4ee0321-97d7-430f-98a8-7ed13ff9a4bf" providerId="ADAL" clId="{DEB93CC6-CB12-4D4E-9032-AF10A8D2E82F}" dt="2024-01-09T17:14:07.864" v="744" actId="20577"/>
-        <pc:sldMkLst>
-          <pc:docMk/>
-          <pc:sldMk cId="1662085430" sldId="302"/>
-        </pc:sldMkLst>
-      </pc:sldChg>
-      <pc:sldChg chg="modSp mod">
-        <pc:chgData name="MIGUEL TRIGUEROS MUÑOZ" userId="a4ee0321-97d7-430f-98a8-7ed13ff9a4bf" providerId="ADAL" clId="{DEB93CC6-CB12-4D4E-9032-AF10A8D2E82F}" dt="2024-01-07T10:29:59.700" v="28" actId="255"/>
-        <pc:sldMkLst>
-          <pc:docMk/>
-          <pc:sldMk cId="1878582030" sldId="304"/>
-        </pc:sldMkLst>
-      </pc:sldChg>
-      <pc:sldChg chg="modSp mod">
-        <pc:chgData name="MIGUEL TRIGUEROS MUÑOZ" userId="a4ee0321-97d7-430f-98a8-7ed13ff9a4bf" providerId="ADAL" clId="{DEB93CC6-CB12-4D4E-9032-AF10A8D2E82F}" dt="2024-01-07T10:29:38.951" v="26" actId="114"/>
-        <pc:sldMkLst>
-          <pc:docMk/>
-          <pc:sldMk cId="524834107" sldId="305"/>
-        </pc:sldMkLst>
-      </pc:sldChg>
-      <pc:sldChg chg="modSp mod">
-        <pc:chgData name="MIGUEL TRIGUEROS MUÑOZ" userId="a4ee0321-97d7-430f-98a8-7ed13ff9a4bf" providerId="ADAL" clId="{DEB93CC6-CB12-4D4E-9032-AF10A8D2E82F}" dt="2024-01-07T10:29:41.921" v="27" actId="114"/>
-        <pc:sldMkLst>
-          <pc:docMk/>
-          <pc:sldMk cId="3007344242" sldId="306"/>
-        </pc:sldMkLst>
-      </pc:sldChg>
-      <pc:sldChg chg="addSp delSp modSp">
-        <pc:chgData name="MIGUEL TRIGUEROS MUÑOZ" userId="a4ee0321-97d7-430f-98a8-7ed13ff9a4bf" providerId="ADAL" clId="{DEB93CC6-CB12-4D4E-9032-AF10A8D2E82F}" dt="2024-01-07T10:49:55.279" v="317" actId="20577"/>
-        <pc:sldMkLst>
-          <pc:docMk/>
-          <pc:sldMk cId="1679762254" sldId="309"/>
-        </pc:sldMkLst>
-      </pc:sldChg>
-      <pc:sldChg chg="addSp delSp modSp mod">
-        <pc:chgData name="MIGUEL TRIGUEROS MUÑOZ" userId="a4ee0321-97d7-430f-98a8-7ed13ff9a4bf" providerId="ADAL" clId="{DEB93CC6-CB12-4D4E-9032-AF10A8D2E82F}" dt="2024-01-07T10:25:02.537" v="22" actId="1076"/>
-        <pc:sldMkLst>
-          <pc:docMk/>
-          <pc:sldMk cId="1813723418" sldId="311"/>
-        </pc:sldMkLst>
-      </pc:sldChg>
-      <pc:sldChg chg="addSp modSp">
-        <pc:chgData name="MIGUEL TRIGUEROS MUÑOZ" userId="a4ee0321-97d7-430f-98a8-7ed13ff9a4bf" providerId="ADAL" clId="{DEB93CC6-CB12-4D4E-9032-AF10A8D2E82F}" dt="2024-01-07T10:47:37.474" v="294" actId="14100"/>
-        <pc:sldMkLst>
-          <pc:docMk/>
-          <pc:sldMk cId="986423972" sldId="322"/>
-        </pc:sldMkLst>
-      </pc:sldChg>
-      <pc:sldChg chg="modSp">
-        <pc:chgData name="MIGUEL TRIGUEROS MUÑOZ" userId="a4ee0321-97d7-430f-98a8-7ed13ff9a4bf" providerId="ADAL" clId="{DEB93CC6-CB12-4D4E-9032-AF10A8D2E82F}" dt="2024-01-09T17:14:14.191" v="745" actId="20577"/>
-        <pc:sldMkLst>
-          <pc:docMk/>
-          <pc:sldMk cId="97368630" sldId="329"/>
-        </pc:sldMkLst>
-      </pc:sldChg>
-      <pc:sldChg chg="modSp">
-        <pc:chgData name="MIGUEL TRIGUEROS MUÑOZ" userId="a4ee0321-97d7-430f-98a8-7ed13ff9a4bf" providerId="ADAL" clId="{DEB93CC6-CB12-4D4E-9032-AF10A8D2E82F}" dt="2024-01-09T17:05:38.615" v="667" actId="20577"/>
-        <pc:sldMkLst>
-          <pc:docMk/>
-          <pc:sldMk cId="959411268" sldId="331"/>
-        </pc:sldMkLst>
-      </pc:sldChg>
-      <pc:sldChg chg="modSp">
-        <pc:chgData name="MIGUEL TRIGUEROS MUÑOZ" userId="a4ee0321-97d7-430f-98a8-7ed13ff9a4bf" providerId="ADAL" clId="{DEB93CC6-CB12-4D4E-9032-AF10A8D2E82F}" dt="2024-01-07T19:18:05.118" v="320" actId="20577"/>
-        <pc:sldMkLst>
-          <pc:docMk/>
-          <pc:sldMk cId="2336738011" sldId="333"/>
-        </pc:sldMkLst>
-      </pc:sldChg>
-      <pc:sldChg chg="addSp delSp modSp add mod modClrScheme chgLayout">
-        <pc:chgData name="MIGUEL TRIGUEROS MUÑOZ" userId="a4ee0321-97d7-430f-98a8-7ed13ff9a4bf" providerId="ADAL" clId="{DEB93CC6-CB12-4D4E-9032-AF10A8D2E82F}" dt="2024-01-07T10:45:07.649" v="159" actId="14100"/>
-        <pc:sldMkLst>
-          <pc:docMk/>
-          <pc:sldMk cId="2601617281" sldId="338"/>
-        </pc:sldMkLst>
-      </pc:sldChg>
-      <pc:sldChg chg="modSp add ord">
-        <pc:chgData name="MIGUEL TRIGUEROS MUÑOZ" userId="a4ee0321-97d7-430f-98a8-7ed13ff9a4bf" providerId="ADAL" clId="{DEB93CC6-CB12-4D4E-9032-AF10A8D2E82F}" dt="2024-01-07T10:45:16.144" v="160" actId="14100"/>
-        <pc:sldMkLst>
-          <pc:docMk/>
-          <pc:sldMk cId="548552804" sldId="339"/>
-        </pc:sldMkLst>
-      </pc:sldChg>
-      <pc:sldChg chg="modSp add del">
-        <pc:chgData name="MIGUEL TRIGUEROS MUÑOZ" userId="a4ee0321-97d7-430f-98a8-7ed13ff9a4bf" providerId="ADAL" clId="{DEB93CC6-CB12-4D4E-9032-AF10A8D2E82F}" dt="2024-01-07T10:35:14.085" v="35" actId="2696"/>
-        <pc:sldMkLst>
-          <pc:docMk/>
-          <pc:sldMk cId="996008408" sldId="339"/>
-        </pc:sldMkLst>
-      </pc:sldChg>
-      <pc:sldChg chg="modSp add">
-        <pc:chgData name="MIGUEL TRIGUEROS MUÑOZ" userId="a4ee0321-97d7-430f-98a8-7ed13ff9a4bf" providerId="ADAL" clId="{DEB93CC6-CB12-4D4E-9032-AF10A8D2E82F}" dt="2024-01-07T10:46:27.559" v="184" actId="20577"/>
-        <pc:sldMkLst>
-          <pc:docMk/>
-          <pc:sldMk cId="1855636476" sldId="340"/>
-        </pc:sldMkLst>
-      </pc:sldChg>
-      <pc:sldChg chg="modSp add del">
-        <pc:chgData name="MIGUEL TRIGUEROS MUÑOZ" userId="a4ee0321-97d7-430f-98a8-7ed13ff9a4bf" providerId="ADAL" clId="{DEB93CC6-CB12-4D4E-9032-AF10A8D2E82F}" dt="2024-01-07T10:48:05.599" v="297" actId="2696"/>
-        <pc:sldMkLst>
-          <pc:docMk/>
-          <pc:sldMk cId="2708177853" sldId="341"/>
-        </pc:sldMkLst>
-      </pc:sldChg>
-      <pc:sldChg chg="modSp add del">
-        <pc:chgData name="MIGUEL TRIGUEROS MUÑOZ" userId="a4ee0321-97d7-430f-98a8-7ed13ff9a4bf" providerId="ADAL" clId="{DEB93CC6-CB12-4D4E-9032-AF10A8D2E82F}" dt="2024-01-07T10:47:01.929" v="186" actId="2696"/>
-        <pc:sldMkLst>
-          <pc:docMk/>
-          <pc:sldMk cId="3275715263" sldId="341"/>
-        </pc:sldMkLst>
-      </pc:sldChg>
-      <pc:sldChg chg="addSp delSp modSp add mod">
-        <pc:chgData name="MIGUEL TRIGUEROS MUÑOZ" userId="a4ee0321-97d7-430f-98a8-7ed13ff9a4bf" providerId="ADAL" clId="{DEB93CC6-CB12-4D4E-9032-AF10A8D2E82F}" dt="2024-01-07T19:38:55.791" v="490" actId="1076"/>
-        <pc:sldMkLst>
-          <pc:docMk/>
-          <pc:sldMk cId="3761948457" sldId="341"/>
-        </pc:sldMkLst>
-      </pc:sldChg>
-      <pc:sldChg chg="addSp delSp modSp add mod">
-        <pc:chgData name="MIGUEL TRIGUEROS MUÑOZ" userId="a4ee0321-97d7-430f-98a8-7ed13ff9a4bf" providerId="ADAL" clId="{DEB93CC6-CB12-4D4E-9032-AF10A8D2E82F}" dt="2024-01-07T19:39:48.436" v="491" actId="1076"/>
-        <pc:sldMkLst>
-          <pc:docMk/>
-          <pc:sldMk cId="1759713922" sldId="342"/>
-        </pc:sldMkLst>
-      </pc:sldChg>
-      <pc:sldChg chg="modSp add del">
-        <pc:chgData name="MIGUEL TRIGUEROS MUÑOZ" userId="a4ee0321-97d7-430f-98a8-7ed13ff9a4bf" providerId="ADAL" clId="{DEB93CC6-CB12-4D4E-9032-AF10A8D2E82F}" dt="2024-01-07T19:18:18.332" v="353" actId="2696"/>
-        <pc:sldMkLst>
-          <pc:docMk/>
-          <pc:sldMk cId="3473415835" sldId="342"/>
-        </pc:sldMkLst>
-      </pc:sldChg>
-      <pc:sldChg chg="delSp modSp add">
-        <pc:chgData name="MIGUEL TRIGUEROS MUÑOZ" userId="a4ee0321-97d7-430f-98a8-7ed13ff9a4bf" providerId="ADAL" clId="{DEB93CC6-CB12-4D4E-9032-AF10A8D2E82F}" dt="2024-01-07T19:45:17.144" v="640" actId="20577"/>
-        <pc:sldMkLst>
-          <pc:docMk/>
-          <pc:sldMk cId="1363057816" sldId="343"/>
-        </pc:sldMkLst>
-      </pc:sldChg>
-      <pc:sldChg chg="addSp modSp add mod">
-        <pc:chgData name="MIGUEL TRIGUEROS MUÑOZ" userId="a4ee0321-97d7-430f-98a8-7ed13ff9a4bf" providerId="ADAL" clId="{DEB93CC6-CB12-4D4E-9032-AF10A8D2E82F}" dt="2024-01-14T10:04:47.782" v="864" actId="20577"/>
-        <pc:sldMkLst>
-          <pc:docMk/>
-          <pc:sldMk cId="3323428066" sldId="344"/>
-        </pc:sldMkLst>
-      </pc:sldChg>
-      <pc:sldChg chg="addSp delSp modSp add mod">
-        <pc:chgData name="MIGUEL TRIGUEROS MUÑOZ" userId="a4ee0321-97d7-430f-98a8-7ed13ff9a4bf" providerId="ADAL" clId="{DEB93CC6-CB12-4D4E-9032-AF10A8D2E82F}" dt="2024-01-09T17:36:17.805" v="820" actId="1076"/>
-        <pc:sldMkLst>
-          <pc:docMk/>
-          <pc:sldMk cId="59108425" sldId="345"/>
-        </pc:sldMkLst>
-      </pc:sldChg>
-      <pc:sldChg chg="addSp delSp modSp add mod">
-        <pc:chgData name="MIGUEL TRIGUEROS MUÑOZ" userId="a4ee0321-97d7-430f-98a8-7ed13ff9a4bf" providerId="ADAL" clId="{DEB93CC6-CB12-4D4E-9032-AF10A8D2E82F}" dt="2024-01-14T10:06:18.358" v="865" actId="20577"/>
-        <pc:sldMkLst>
-          <pc:docMk/>
-          <pc:sldMk cId="1293908598" sldId="346"/>
-        </pc:sldMkLst>
-      </pc:sldChg>
-      <pc:sldChg chg="addSp delSp modSp add mod">
-        <pc:chgData name="MIGUEL TRIGUEROS MUÑOZ" userId="a4ee0321-97d7-430f-98a8-7ed13ff9a4bf" providerId="ADAL" clId="{DEB93CC6-CB12-4D4E-9032-AF10A8D2E82F}" dt="2024-01-09T17:42:32.264" v="824" actId="167"/>
-        <pc:sldMkLst>
-          <pc:docMk/>
-          <pc:sldMk cId="42083021" sldId="347"/>
-        </pc:sldMkLst>
-      </pc:sldChg>
-      <pc:sldChg chg="addSp delSp modSp add">
-        <pc:chgData name="MIGUEL TRIGUEROS MUÑOZ" userId="a4ee0321-97d7-430f-98a8-7ed13ff9a4bf" providerId="ADAL" clId="{DEB93CC6-CB12-4D4E-9032-AF10A8D2E82F}" dt="2024-01-09T17:44:27.121" v="849" actId="1076"/>
-        <pc:sldMkLst>
-          <pc:docMk/>
-          <pc:sldMk cId="982610843" sldId="348"/>
-        </pc:sldMkLst>
-      </pc:sldChg>
-      <pc:sldChg chg="addSp delSp modSp add mod">
-        <pc:chgData name="MIGUEL TRIGUEROS MUÑOZ" userId="a4ee0321-97d7-430f-98a8-7ed13ff9a4bf" providerId="ADAL" clId="{DEB93CC6-CB12-4D4E-9032-AF10A8D2E82F}" dt="2024-01-09T17:56:30.257" v="856" actId="14100"/>
-        <pc:sldMkLst>
-          <pc:docMk/>
-          <pc:sldMk cId="796993660" sldId="349"/>
-        </pc:sldMkLst>
-      </pc:sldChg>
-      <pc:sldMasterChg chg="modSldLayout">
-        <pc:chgData name="MIGUEL TRIGUEROS MUÑOZ" userId="a4ee0321-97d7-430f-98a8-7ed13ff9a4bf" providerId="ADAL" clId="{DEB93CC6-CB12-4D4E-9032-AF10A8D2E82F}" dt="2024-01-07T10:38:56.170" v="62" actId="6014"/>
-        <pc:sldMasterMkLst>
-          <pc:docMk/>
-          <pc:sldMasterMk cId="138951284" sldId="2147483668"/>
-        </pc:sldMasterMkLst>
-        <pc:sldLayoutChg chg="mod">
-          <pc:chgData name="MIGUEL TRIGUEROS MUÑOZ" userId="a4ee0321-97d7-430f-98a8-7ed13ff9a4bf" providerId="ADAL" clId="{DEB93CC6-CB12-4D4E-9032-AF10A8D2E82F}" dt="2024-01-07T10:38:56.170" v="62" actId="6014"/>
-          <pc:sldLayoutMkLst>
-            <pc:docMk/>
-            <pc:sldMasterMk cId="138951284" sldId="2147483668"/>
-            <pc:sldLayoutMk cId="738248331" sldId="2147483685"/>
-          </pc:sldLayoutMkLst>
-        </pc:sldLayoutChg>
-      </pc:sldMasterChg>
-    </pc:docChg>
-  </pc:docChgLst>
-  <pc:docChgLst>
-    <pc:chgData name="MIGUEL TRIGUEROS MUÑOZ" userId="S::miguel.trigueros@aulaxxi.murciaeduca.es::a4ee0321-97d7-430f-98a8-7ed13ff9a4bf" providerId="AD" clId="Web-{275AAB97-552E-8B8D-BB3D-5B715D0335B7}"/>
-    <pc:docChg chg="modSld">
-      <pc:chgData name="MIGUEL TRIGUEROS MUÑOZ" userId="S::miguel.trigueros@aulaxxi.murciaeduca.es::a4ee0321-97d7-430f-98a8-7ed13ff9a4bf" providerId="AD" clId="Web-{275AAB97-552E-8B8D-BB3D-5B715D0335B7}" dt="2024-01-08T09:15:36.092" v="52" actId="20577"/>
-      <pc:docMkLst>
-        <pc:docMk/>
-      </pc:docMkLst>
-      <pc:sldChg chg="modSp">
-        <pc:chgData name="MIGUEL TRIGUEROS MUÑOZ" userId="S::miguel.trigueros@aulaxxi.murciaeduca.es::a4ee0321-97d7-430f-98a8-7ed13ff9a4bf" providerId="AD" clId="Web-{275AAB97-552E-8B8D-BB3D-5B715D0335B7}" dt="2024-01-08T09:15:36.092" v="52" actId="20577"/>
-        <pc:sldMkLst>
-          <pc:docMk/>
-          <pc:sldMk cId="279635090" sldId="315"/>
-        </pc:sldMkLst>
-      </pc:sldChg>
-    </pc:docChg>
-  </pc:docChgLst>
-  <pc:docChgLst>
-    <pc:chgData name="TRIGUEROS MUÑOZ, MIGUEL" userId="93f31087-8566-4d16-a7a1-f20635823349" providerId="ADAL" clId="{E297E389-1D0C-46E5-BDDF-E897149FAF93}"/>
-    <pc:docChg chg="modSld">
-      <pc:chgData name="TRIGUEROS MUÑOZ, MIGUEL" userId="93f31087-8566-4d16-a7a1-f20635823349" providerId="ADAL" clId="{E297E389-1D0C-46E5-BDDF-E897149FAF93}" dt="2022-11-30T19:06:00.063" v="56" actId="113"/>
-      <pc:docMkLst>
-        <pc:docMk/>
-      </pc:docMkLst>
-      <pc:sldChg chg="modSp mod">
-        <pc:chgData name="TRIGUEROS MUÑOZ, MIGUEL" userId="93f31087-8566-4d16-a7a1-f20635823349" providerId="ADAL" clId="{E297E389-1D0C-46E5-BDDF-E897149FAF93}" dt="2022-11-30T19:05:01.068" v="54" actId="113"/>
-        <pc:sldMkLst>
-          <pc:docMk/>
-          <pc:sldMk cId="3881213358" sldId="296"/>
-        </pc:sldMkLst>
-      </pc:sldChg>
-      <pc:sldChg chg="modSp mod">
-        <pc:chgData name="TRIGUEROS MUÑOZ, MIGUEL" userId="93f31087-8566-4d16-a7a1-f20635823349" providerId="ADAL" clId="{E297E389-1D0C-46E5-BDDF-E897149FAF93}" dt="2022-11-30T19:06:00.063" v="56" actId="113"/>
-        <pc:sldMkLst>
-          <pc:docMk/>
-          <pc:sldMk cId="279635090" sldId="315"/>
-        </pc:sldMkLst>
-      </pc:sldChg>
-    </pc:docChg>
-  </pc:docChgLst>
-  <pc:docChgLst>
-    <pc:chgData name="MIGUEL TRIGUEROS MUÑOZ" userId="a4ee0321-97d7-430f-98a8-7ed13ff9a4bf" providerId="ADAL" clId="{157935D5-BB37-4E78-A6C6-0D77E3E140EC}"/>
-    <pc:docChg chg="undo custSel delSld modSld modSection">
-      <pc:chgData name="MIGUEL TRIGUEROS MUÑOZ" userId="a4ee0321-97d7-430f-98a8-7ed13ff9a4bf" providerId="ADAL" clId="{157935D5-BB37-4E78-A6C6-0D77E3E140EC}" dt="2024-01-31T08:09:45.435" v="181" actId="13926"/>
-      <pc:docMkLst>
-        <pc:docMk/>
-      </pc:docMkLst>
-      <pc:sldChg chg="addCm">
-        <pc:chgData name="MIGUEL TRIGUEROS MUÑOZ" userId="a4ee0321-97d7-430f-98a8-7ed13ff9a4bf" providerId="ADAL" clId="{157935D5-BB37-4E78-A6C6-0D77E3E140EC}" dt="2024-01-10T09:36:43.765" v="1"/>
-        <pc:sldMkLst>
-          <pc:docMk/>
-          <pc:sldMk cId="308865771" sldId="256"/>
-        </pc:sldMkLst>
-        <pc:extLst>
-          <p:ext xmlns:p="http://schemas.openxmlformats.org/presentationml/2006/main" uri="{D6D511B9-2390-475A-947B-AFAB55BFBCF1}">
-            <pc226:cmChg xmlns:pc226="http://schemas.microsoft.com/office/powerpoint/2022/06/main/command" chg="add">
-              <pc226:chgData name="MIGUEL TRIGUEROS MUÑOZ" userId="a4ee0321-97d7-430f-98a8-7ed13ff9a4bf" providerId="ADAL" clId="{157935D5-BB37-4E78-A6C6-0D77E3E140EC}" dt="2024-01-10T09:36:43.765" v="1"/>
-              <pc2:cmMkLst xmlns:pc2="http://schemas.microsoft.com/office/powerpoint/2019/9/main/command">
-                <pc:docMk/>
-                <pc:sldMk cId="308865771" sldId="256"/>
-                <pc2:cmMk id="{F1528637-61FE-4547-9330-70EE5DB07593}"/>
-              </pc2:cmMkLst>
-            </pc226:cmChg>
-          </p:ext>
-        </pc:extLst>
-      </pc:sldChg>
-      <pc:sldChg chg="addCm">
-        <pc:chgData name="MIGUEL TRIGUEROS MUÑOZ" userId="a4ee0321-97d7-430f-98a8-7ed13ff9a4bf" providerId="ADAL" clId="{157935D5-BB37-4E78-A6C6-0D77E3E140EC}" dt="2023-12-13T08:16:33.760" v="0"/>
-        <pc:sldMkLst>
-          <pc:docMk/>
-          <pc:sldMk cId="1813723418" sldId="311"/>
-        </pc:sldMkLst>
-        <pc:extLst>
-          <p:ext xmlns:p="http://schemas.openxmlformats.org/presentationml/2006/main" uri="{D6D511B9-2390-475A-947B-AFAB55BFBCF1}">
-            <pc226:cmChg xmlns:pc226="http://schemas.microsoft.com/office/powerpoint/2022/06/main/command" chg="add">
-              <pc226:chgData name="MIGUEL TRIGUEROS MUÑOZ" userId="a4ee0321-97d7-430f-98a8-7ed13ff9a4bf" providerId="ADAL" clId="{157935D5-BB37-4E78-A6C6-0D77E3E140EC}" dt="2023-12-13T08:16:33.760" v="0"/>
-              <pc2:cmMkLst xmlns:pc2="http://schemas.microsoft.com/office/powerpoint/2019/9/main/command">
-                <pc:docMk/>
-                <pc:sldMk cId="1813723418" sldId="311"/>
-                <pc2:cmMk id="{BCE2DAF4-6518-4FA6-A134-8E57CAE3599C}"/>
-              </pc2:cmMkLst>
-            </pc226:cmChg>
-          </p:ext>
-        </pc:extLst>
-      </pc:sldChg>
-      <pc:sldChg chg="modSp mod">
-        <pc:chgData name="MIGUEL TRIGUEROS MUÑOZ" userId="a4ee0321-97d7-430f-98a8-7ed13ff9a4bf" providerId="ADAL" clId="{157935D5-BB37-4E78-A6C6-0D77E3E140EC}" dt="2024-01-31T08:07:20.670" v="170" actId="113"/>
-        <pc:sldMkLst>
-          <pc:docMk/>
-          <pc:sldMk cId="2304737095" sldId="324"/>
-        </pc:sldMkLst>
-      </pc:sldChg>
-      <pc:sldChg chg="modSp mod">
-        <pc:chgData name="MIGUEL TRIGUEROS MUÑOZ" userId="a4ee0321-97d7-430f-98a8-7ed13ff9a4bf" providerId="ADAL" clId="{157935D5-BB37-4E78-A6C6-0D77E3E140EC}" dt="2024-01-31T08:09:45.435" v="181" actId="13926"/>
-        <pc:sldMkLst>
-          <pc:docMk/>
-          <pc:sldMk cId="1414400370" sldId="327"/>
-        </pc:sldMkLst>
-      </pc:sldChg>
-      <pc:sldChg chg="del">
-        <pc:chgData name="MIGUEL TRIGUEROS MUÑOZ" userId="a4ee0321-97d7-430f-98a8-7ed13ff9a4bf" providerId="ADAL" clId="{157935D5-BB37-4E78-A6C6-0D77E3E140EC}" dt="2024-01-31T08:09:16.822" v="171" actId="47"/>
-        <pc:sldMkLst>
-          <pc:docMk/>
-          <pc:sldMk cId="97368630" sldId="329"/>
-        </pc:sldMkLst>
-      </pc:sldChg>
-    </pc:docChg>
-  </pc:docChgLst>
-  <pc:docChgLst>
-    <pc:chgData name="MIGUEL TRIGUEROS MUÑOZ" userId="S::miguel.trigueros@aulaxxi.murciaeduca.es::a4ee0321-97d7-430f-98a8-7ed13ff9a4bf" providerId="AD" clId="Web-{27FF2389-1315-5408-2064-CC1960CCDEDB}"/>
-    <pc:docChg chg="modSld">
-      <pc:chgData name="MIGUEL TRIGUEROS MUÑOZ" userId="S::miguel.trigueros@aulaxxi.murciaeduca.es::a4ee0321-97d7-430f-98a8-7ed13ff9a4bf" providerId="AD" clId="Web-{27FF2389-1315-5408-2064-CC1960CCDEDB}" dt="2024-10-29T09:22:22.166" v="98" actId="20577"/>
-      <pc:docMkLst>
-        <pc:docMk/>
-      </pc:docMkLst>
-      <pc:sldChg chg="addSp modSp">
-        <pc:chgData name="MIGUEL TRIGUEROS MUÑOZ" userId="S::miguel.trigueros@aulaxxi.murciaeduca.es::a4ee0321-97d7-430f-98a8-7ed13ff9a4bf" providerId="AD" clId="Web-{27FF2389-1315-5408-2064-CC1960CCDEDB}" dt="2024-10-29T09:22:22.166" v="98" actId="20577"/>
-        <pc:sldMkLst>
-          <pc:docMk/>
-          <pc:sldMk cId="524834107" sldId="305"/>
-        </pc:sldMkLst>
-      </pc:sldChg>
-      <pc:sldChg chg="modSp">
-        <pc:chgData name="MIGUEL TRIGUEROS MUÑOZ" userId="S::miguel.trigueros@aulaxxi.murciaeduca.es::a4ee0321-97d7-430f-98a8-7ed13ff9a4bf" providerId="AD" clId="Web-{27FF2389-1315-5408-2064-CC1960CCDEDB}" dt="2024-10-29T08:39:01.933" v="14" actId="20577"/>
-        <pc:sldMkLst>
-          <pc:docMk/>
-          <pc:sldMk cId="2304737095" sldId="324"/>
-        </pc:sldMkLst>
-      </pc:sldChg>
-      <pc:sldChg chg="addSp delSp modSp">
-        <pc:chgData name="MIGUEL TRIGUEROS MUÑOZ" userId="S::miguel.trigueros@aulaxxi.murciaeduca.es::a4ee0321-97d7-430f-98a8-7ed13ff9a4bf" providerId="AD" clId="Web-{27FF2389-1315-5408-2064-CC1960CCDEDB}" dt="2024-10-29T09:21:28.946" v="75"/>
-        <pc:sldMkLst>
-          <pc:docMk/>
-          <pc:sldMk cId="1122745256" sldId="325"/>
-        </pc:sldMkLst>
-      </pc:sldChg>
-    </pc:docChg>
-  </pc:docChgLst>
-  <pc:docChgLst>
-    <pc:chgData name="MIGUEL TRIGUEROS MUÑOZ" userId="S::miguel.trigueros@aulaxxi.murciaeduca.es::a4ee0321-97d7-430f-98a8-7ed13ff9a4bf" providerId="AD" clId="Web-{C91F7346-E0EB-D576-22DD-D21FE546A58B}"/>
-    <pc:docChg chg="modSld">
-      <pc:chgData name="MIGUEL TRIGUEROS MUÑOZ" userId="S::miguel.trigueros@aulaxxi.murciaeduca.es::a4ee0321-97d7-430f-98a8-7ed13ff9a4bf" providerId="AD" clId="Web-{C91F7346-E0EB-D576-22DD-D21FE546A58B}" dt="2024-10-22T08:05:30.325" v="12" actId="20577"/>
-      <pc:docMkLst>
-        <pc:docMk/>
-      </pc:docMkLst>
-      <pc:sldChg chg="modSp">
-        <pc:chgData name="MIGUEL TRIGUEROS MUÑOZ" userId="S::miguel.trigueros@aulaxxi.murciaeduca.es::a4ee0321-97d7-430f-98a8-7ed13ff9a4bf" providerId="AD" clId="Web-{C91F7346-E0EB-D576-22DD-D21FE546A58B}" dt="2024-10-22T08:05:30.325" v="12" actId="20577"/>
-        <pc:sldMkLst>
-          <pc:docMk/>
-          <pc:sldMk cId="2269836530" sldId="312"/>
-        </pc:sldMkLst>
-      </pc:sldChg>
-      <pc:sldChg chg="modSp">
-        <pc:chgData name="MIGUEL TRIGUEROS MUÑOZ" userId="S::miguel.trigueros@aulaxxi.murciaeduca.es::a4ee0321-97d7-430f-98a8-7ed13ff9a4bf" providerId="AD" clId="Web-{C91F7346-E0EB-D576-22DD-D21FE546A58B}" dt="2024-10-22T07:16:07.076" v="8" actId="20577"/>
-        <pc:sldMkLst>
-          <pc:docMk/>
-          <pc:sldMk cId="279635090" sldId="315"/>
-        </pc:sldMkLst>
-      </pc:sldChg>
-    </pc:docChg>
-  </pc:docChgLst>
-  <pc:docChgLst>
-    <pc:chgData name="MIGUEL TRIGUEROS MUÑOZ" userId="93f31087-8566-4d16-a7a1-f20635823349" providerId="ADAL" clId="{2064191C-0C86-4C83-9439-2D0DFB2B342F}"/>
-    <pc:docChg chg="undo redo custSel addSld delSld modSld sldOrd">
-      <pc:chgData name="MIGUEL TRIGUEROS MUÑOZ" userId="93f31087-8566-4d16-a7a1-f20635823349" providerId="ADAL" clId="{2064191C-0C86-4C83-9439-2D0DFB2B342F}" dt="2022-11-01T10:53:29.091" v="1800" actId="1035"/>
-      <pc:docMkLst>
-        <pc:docMk/>
-      </pc:docMkLst>
-      <pc:sldChg chg="delSp modSp del mod">
-        <pc:chgData name="MIGUEL TRIGUEROS MUÑOZ" userId="93f31087-8566-4d16-a7a1-f20635823349" providerId="ADAL" clId="{2064191C-0C86-4C83-9439-2D0DFB2B342F}" dt="2022-11-01T08:01:09.424" v="77" actId="47"/>
-        <pc:sldMkLst>
-          <pc:docMk/>
-          <pc:sldMk cId="308865771" sldId="256"/>
-        </pc:sldMkLst>
-      </pc:sldChg>
-      <pc:sldChg chg="add del">
-        <pc:chgData name="MIGUEL TRIGUEROS MUÑOZ" userId="93f31087-8566-4d16-a7a1-f20635823349" providerId="ADAL" clId="{2064191C-0C86-4C83-9439-2D0DFB2B342F}" dt="2022-11-01T07:47:14.052" v="16" actId="47"/>
-        <pc:sldMkLst>
-          <pc:docMk/>
-          <pc:sldMk cId="0" sldId="258"/>
-        </pc:sldMkLst>
-      </pc:sldChg>
-      <pc:sldChg chg="add del">
-        <pc:chgData name="MIGUEL TRIGUEROS MUÑOZ" userId="93f31087-8566-4d16-a7a1-f20635823349" providerId="ADAL" clId="{2064191C-0C86-4C83-9439-2D0DFB2B342F}" dt="2022-11-01T07:47:15.011" v="17" actId="47"/>
-        <pc:sldMkLst>
-          <pc:docMk/>
-          <pc:sldMk cId="0" sldId="259"/>
-        </pc:sldMkLst>
-      </pc:sldChg>
-      <pc:sldChg chg="addSp delSp modSp del mod">
-        <pc:chgData name="MIGUEL TRIGUEROS MUÑOZ" userId="93f31087-8566-4d16-a7a1-f20635823349" providerId="ADAL" clId="{2064191C-0C86-4C83-9439-2D0DFB2B342F}" dt="2022-11-01T09:39:15.494" v="714" actId="47"/>
-        <pc:sldMkLst>
-          <pc:docMk/>
-          <pc:sldMk cId="0" sldId="260"/>
-        </pc:sldMkLst>
-      </pc:sldChg>
-      <pc:sldChg chg="delSp modSp del mod">
-        <pc:chgData name="MIGUEL TRIGUEROS MUÑOZ" userId="93f31087-8566-4d16-a7a1-f20635823349" providerId="ADAL" clId="{2064191C-0C86-4C83-9439-2D0DFB2B342F}" dt="2022-11-01T07:48:40.006" v="27" actId="47"/>
-        <pc:sldMkLst>
-          <pc:docMk/>
-          <pc:sldMk cId="0" sldId="261"/>
-        </pc:sldMkLst>
-      </pc:sldChg>
-      <pc:sldChg chg="modSp del mod">
-        <pc:chgData name="MIGUEL TRIGUEROS MUÑOZ" userId="93f31087-8566-4d16-a7a1-f20635823349" providerId="ADAL" clId="{2064191C-0C86-4C83-9439-2D0DFB2B342F}" dt="2022-11-01T09:42:12.353" v="751" actId="47"/>
-        <pc:sldMkLst>
-          <pc:docMk/>
-          <pc:sldMk cId="0" sldId="262"/>
-        </pc:sldMkLst>
-      </pc:sldChg>
-      <pc:sldChg chg="modSp del mod ord">
-        <pc:chgData name="MIGUEL TRIGUEROS MUÑOZ" userId="93f31087-8566-4d16-a7a1-f20635823349" providerId="ADAL" clId="{2064191C-0C86-4C83-9439-2D0DFB2B342F}" dt="2022-11-01T09:43:55.225" v="789" actId="47"/>
-        <pc:sldMkLst>
-          <pc:docMk/>
-          <pc:sldMk cId="0" sldId="263"/>
-        </pc:sldMkLst>
-      </pc:sldChg>
-      <pc:sldChg chg="modSp del mod">
-        <pc:chgData name="MIGUEL TRIGUEROS MUÑOZ" userId="93f31087-8566-4d16-a7a1-f20635823349" providerId="ADAL" clId="{2064191C-0C86-4C83-9439-2D0DFB2B342F}" dt="2022-11-01T09:50:09.257" v="799" actId="47"/>
-        <pc:sldMkLst>
-          <pc:docMk/>
-          <pc:sldMk cId="0" sldId="264"/>
-        </pc:sldMkLst>
-      </pc:sldChg>
-      <pc:sldChg chg="del">
-        <pc:chgData name="MIGUEL TRIGUEROS MUÑOZ" userId="93f31087-8566-4d16-a7a1-f20635823349" providerId="ADAL" clId="{2064191C-0C86-4C83-9439-2D0DFB2B342F}" dt="2022-11-01T09:51:44.175" v="815" actId="47"/>
-        <pc:sldMkLst>
-          <pc:docMk/>
-          <pc:sldMk cId="0" sldId="265"/>
-        </pc:sldMkLst>
-      </pc:sldChg>
-      <pc:sldChg chg="del">
-        <pc:chgData name="MIGUEL TRIGUEROS MUÑOZ" userId="93f31087-8566-4d16-a7a1-f20635823349" providerId="ADAL" clId="{2064191C-0C86-4C83-9439-2D0DFB2B342F}" dt="2022-11-01T09:52:57.318" v="823" actId="47"/>
-        <pc:sldMkLst>
-          <pc:docMk/>
-          <pc:sldMk cId="0" sldId="266"/>
-        </pc:sldMkLst>
-      </pc:sldChg>
-      <pc:sldChg chg="del">
-        <pc:chgData name="MIGUEL TRIGUEROS MUÑOZ" userId="93f31087-8566-4d16-a7a1-f20635823349" providerId="ADAL" clId="{2064191C-0C86-4C83-9439-2D0DFB2B342F}" dt="2022-11-01T09:53:18.738" v="828" actId="47"/>
-        <pc:sldMkLst>
-          <pc:docMk/>
-          <pc:sldMk cId="0" sldId="267"/>
-        </pc:sldMkLst>
-      </pc:sldChg>
-      <pc:sldChg chg="del">
-        <pc:chgData name="MIGUEL TRIGUEROS MUÑOZ" userId="93f31087-8566-4d16-a7a1-f20635823349" providerId="ADAL" clId="{2064191C-0C86-4C83-9439-2D0DFB2B342F}" dt="2022-11-01T10:07:11.458" v="1125" actId="47"/>
-        <pc:sldMkLst>
-          <pc:docMk/>
-          <pc:sldMk cId="0" sldId="268"/>
-        </pc:sldMkLst>
-      </pc:sldChg>
-      <pc:sldChg chg="del">
-        <pc:chgData name="MIGUEL TRIGUEROS MUÑOZ" userId="93f31087-8566-4d16-a7a1-f20635823349" providerId="ADAL" clId="{2064191C-0C86-4C83-9439-2D0DFB2B342F}" dt="2022-11-01T10:09:50.925" v="1151" actId="47"/>
-        <pc:sldMkLst>
-          <pc:docMk/>
-          <pc:sldMk cId="0" sldId="269"/>
-        </pc:sldMkLst>
-      </pc:sldChg>
-      <pc:sldChg chg="del">
-        <pc:chgData name="MIGUEL TRIGUEROS MUÑOZ" userId="93f31087-8566-4d16-a7a1-f20635823349" providerId="ADAL" clId="{2064191C-0C86-4C83-9439-2D0DFB2B342F}" dt="2022-11-01T10:10:51.584" v="1160" actId="47"/>
-        <pc:sldMkLst>
-          <pc:docMk/>
-          <pc:sldMk cId="0" sldId="270"/>
-        </pc:sldMkLst>
-      </pc:sldChg>
-      <pc:sldChg chg="del">
-        <pc:chgData name="MIGUEL TRIGUEROS MUÑOZ" userId="93f31087-8566-4d16-a7a1-f20635823349" providerId="ADAL" clId="{2064191C-0C86-4C83-9439-2D0DFB2B342F}" dt="2022-11-01T10:13:26.351" v="1172" actId="47"/>
-        <pc:sldMkLst>
-          <pc:docMk/>
-          <pc:sldMk cId="0" sldId="271"/>
-        </pc:sldMkLst>
-      </pc:sldChg>
-      <pc:sldChg chg="add del">
-        <pc:chgData name="MIGUEL TRIGUEROS MUÑOZ" userId="93f31087-8566-4d16-a7a1-f20635823349" providerId="ADAL" clId="{2064191C-0C86-4C83-9439-2D0DFB2B342F}" dt="2022-11-01T07:50:03.697" v="72" actId="47"/>
-        <pc:sldMkLst>
-          <pc:docMk/>
-          <pc:sldMk cId="0" sldId="277"/>
-        </pc:sldMkLst>
-      </pc:sldChg>
-      <pc:sldChg chg="del">
-        <pc:chgData name="MIGUEL TRIGUEROS MUÑOZ" userId="93f31087-8566-4d16-a7a1-f20635823349" providerId="ADAL" clId="{2064191C-0C86-4C83-9439-2D0DFB2B342F}" dt="2022-11-01T07:49:44.939" v="55" actId="47"/>
-        <pc:sldMkLst>
-          <pc:docMk/>
-          <pc:sldMk cId="0" sldId="278"/>
-        </pc:sldMkLst>
-      </pc:sldChg>
-      <pc:sldChg chg="del">
-        <pc:chgData name="MIGUEL TRIGUEROS MUÑOZ" userId="93f31087-8566-4d16-a7a1-f20635823349" providerId="ADAL" clId="{2064191C-0C86-4C83-9439-2D0DFB2B342F}" dt="2022-11-01T07:49:47.284" v="56" actId="47"/>
-        <pc:sldMkLst>
-          <pc:docMk/>
-          <pc:sldMk cId="0" sldId="279"/>
-        </pc:sldMkLst>
-      </pc:sldChg>
-      <pc:sldChg chg="del">
-        <pc:chgData name="MIGUEL TRIGUEROS MUÑOZ" userId="93f31087-8566-4d16-a7a1-f20635823349" providerId="ADAL" clId="{2064191C-0C86-4C83-9439-2D0DFB2B342F}" dt="2022-11-01T07:49:48.768" v="57" actId="47"/>
-        <pc:sldMkLst>
-          <pc:docMk/>
-          <pc:sldMk cId="0" sldId="280"/>
-        </pc:sldMkLst>
-      </pc:sldChg>
-      <pc:sldChg chg="del">
-        <pc:chgData name="MIGUEL TRIGUEROS MUÑOZ" userId="93f31087-8566-4d16-a7a1-f20635823349" providerId="ADAL" clId="{2064191C-0C86-4C83-9439-2D0DFB2B342F}" dt="2022-11-01T07:49:49.488" v="58" actId="47"/>
-        <pc:sldMkLst>
-          <pc:docMk/>
-          <pc:sldMk cId="0" sldId="281"/>
-        </pc:sldMkLst>
-      </pc:sldChg>
-      <pc:sldChg chg="del">
-        <pc:chgData name="MIGUEL TRIGUEROS MUÑOZ" userId="93f31087-8566-4d16-a7a1-f20635823349" providerId="ADAL" clId="{2064191C-0C86-4C83-9439-2D0DFB2B342F}" dt="2022-11-01T07:49:50.286" v="59" actId="47"/>
-        <pc:sldMkLst>
-          <pc:docMk/>
-          <pc:sldMk cId="0" sldId="282"/>
-        </pc:sldMkLst>
-      </pc:sldChg>
-      <pc:sldChg chg="del">
-        <pc:chgData name="MIGUEL TRIGUEROS MUÑOZ" userId="93f31087-8566-4d16-a7a1-f20635823349" providerId="ADAL" clId="{2064191C-0C86-4C83-9439-2D0DFB2B342F}" dt="2022-11-01T07:49:51.144" v="60" actId="47"/>
-        <pc:sldMkLst>
-          <pc:docMk/>
-          <pc:sldMk cId="0" sldId="283"/>
-        </pc:sldMkLst>
-      </pc:sldChg>
-      <pc:sldChg chg="del">
-        <pc:chgData name="MIGUEL TRIGUEROS MUÑOZ" userId="93f31087-8566-4d16-a7a1-f20635823349" providerId="ADAL" clId="{2064191C-0C86-4C83-9439-2D0DFB2B342F}" dt="2022-11-01T07:49:51.847" v="61" actId="47"/>
-        <pc:sldMkLst>
-          <pc:docMk/>
-          <pc:sldMk cId="0" sldId="284"/>
-        </pc:sldMkLst>
-      </pc:sldChg>
-      <pc:sldChg chg="del">
-        <pc:chgData name="MIGUEL TRIGUEROS MUÑOZ" userId="93f31087-8566-4d16-a7a1-f20635823349" providerId="ADAL" clId="{2064191C-0C86-4C83-9439-2D0DFB2B342F}" dt="2022-11-01T07:49:52.648" v="62" actId="47"/>
-        <pc:sldMkLst>
-          <pc:docMk/>
-          <pc:sldMk cId="0" sldId="285"/>
-        </pc:sldMkLst>
-      </pc:sldChg>
-      <pc:sldChg chg="del">
-        <pc:chgData name="MIGUEL TRIGUEROS MUÑOZ" userId="93f31087-8566-4d16-a7a1-f20635823349" providerId="ADAL" clId="{2064191C-0C86-4C83-9439-2D0DFB2B342F}" dt="2022-11-01T07:49:53.348" v="63" actId="47"/>
-        <pc:sldMkLst>
-          <pc:docMk/>
-          <pc:sldMk cId="0" sldId="286"/>
-        </pc:sldMkLst>
-      </pc:sldChg>
-      <pc:sldChg chg="del">
-        <pc:chgData name="MIGUEL TRIGUEROS MUÑOZ" userId="93f31087-8566-4d16-a7a1-f20635823349" providerId="ADAL" clId="{2064191C-0C86-4C83-9439-2D0DFB2B342F}" dt="2022-11-01T07:49:54.052" v="64" actId="47"/>
-        <pc:sldMkLst>
-          <pc:docMk/>
-          <pc:sldMk cId="0" sldId="287"/>
-        </pc:sldMkLst>
-      </pc:sldChg>
-      <pc:sldChg chg="del">
-        <pc:chgData name="MIGUEL TRIGUEROS MUÑOZ" userId="93f31087-8566-4d16-a7a1-f20635823349" providerId="ADAL" clId="{2064191C-0C86-4C83-9439-2D0DFB2B342F}" dt="2022-11-01T07:49:54.692" v="65" actId="47"/>
-        <pc:sldMkLst>
-          <pc:docMk/>
-          <pc:sldMk cId="0" sldId="288"/>
-        </pc:sldMkLst>
-      </pc:sldChg>
-      <pc:sldChg chg="del">
-        <pc:chgData name="MIGUEL TRIGUEROS MUÑOZ" userId="93f31087-8566-4d16-a7a1-f20635823349" providerId="ADAL" clId="{2064191C-0C86-4C83-9439-2D0DFB2B342F}" dt="2022-11-01T07:49:55.381" v="66" actId="47"/>
-        <pc:sldMkLst>
-          <pc:docMk/>
-          <pc:sldMk cId="0" sldId="289"/>
-        </pc:sldMkLst>
-      </pc:sldChg>
-      <pc:sldChg chg="del">
-        <pc:chgData name="MIGUEL TRIGUEROS MUÑOZ" userId="93f31087-8566-4d16-a7a1-f20635823349" providerId="ADAL" clId="{2064191C-0C86-4C83-9439-2D0DFB2B342F}" dt="2022-11-01T07:49:56.021" v="67" actId="47"/>
-        <pc:sldMkLst>
-          <pc:docMk/>
-          <pc:sldMk cId="0" sldId="290"/>
-        </pc:sldMkLst>
-      </pc:sldChg>
-      <pc:sldChg chg="del">
-        <pc:chgData name="MIGUEL TRIGUEROS MUÑOZ" userId="93f31087-8566-4d16-a7a1-f20635823349" providerId="ADAL" clId="{2064191C-0C86-4C83-9439-2D0DFB2B342F}" dt="2022-11-01T07:49:56.677" v="68" actId="47"/>
-        <pc:sldMkLst>
-          <pc:docMk/>
-          <pc:sldMk cId="0" sldId="291"/>
-        </pc:sldMkLst>
-      </pc:sldChg>
-      <pc:sldChg chg="del">
-        <pc:chgData name="MIGUEL TRIGUEROS MUÑOZ" userId="93f31087-8566-4d16-a7a1-f20635823349" providerId="ADAL" clId="{2064191C-0C86-4C83-9439-2D0DFB2B342F}" dt="2022-11-01T07:49:57.241" v="69" actId="47"/>
-        <pc:sldMkLst>
-          <pc:docMk/>
-          <pc:sldMk cId="0" sldId="292"/>
-        </pc:sldMkLst>
-      </pc:sldChg>
-      <pc:sldChg chg="add del">
-        <pc:chgData name="MIGUEL TRIGUEROS MUÑOZ" userId="93f31087-8566-4d16-a7a1-f20635823349" providerId="ADAL" clId="{2064191C-0C86-4C83-9439-2D0DFB2B342F}" dt="2022-11-01T07:50:04.338" v="73" actId="47"/>
-        <pc:sldMkLst>
-          <pc:docMk/>
-          <pc:sldMk cId="0" sldId="293"/>
-        </pc:sldMkLst>
-      </pc:sldChg>
-      <pc:sldChg chg="modSp add del mod ord">
-        <pc:chgData name="MIGUEL TRIGUEROS MUÑOZ" userId="93f31087-8566-4d16-a7a1-f20635823349" providerId="ADAL" clId="{2064191C-0C86-4C83-9439-2D0DFB2B342F}" dt="2022-11-01T09:39:28.658" v="717" actId="47"/>
-        <pc:sldMkLst>
-          <pc:docMk/>
-          <pc:sldMk cId="1578358678" sldId="294"/>
-        </pc:sldMkLst>
-      </pc:sldChg>
-      <pc:sldChg chg="new del ord">
-        <pc:chgData name="MIGUEL TRIGUEROS MUÑOZ" userId="93f31087-8566-4d16-a7a1-f20635823349" providerId="ADAL" clId="{2064191C-0C86-4C83-9439-2D0DFB2B342F}" dt="2022-11-01T08:01:30.512" v="82" actId="47"/>
-        <pc:sldMkLst>
-          <pc:docMk/>
-          <pc:sldMk cId="1780616453" sldId="294"/>
-        </pc:sldMkLst>
-      </pc:sldChg>
-      <pc:sldChg chg="addSp delSp modSp new mod">
-        <pc:chgData name="MIGUEL TRIGUEROS MUÑOZ" userId="93f31087-8566-4d16-a7a1-f20635823349" providerId="ADAL" clId="{2064191C-0C86-4C83-9439-2D0DFB2B342F}" dt="2022-11-01T09:41:44.304" v="747" actId="20577"/>
-        <pc:sldMkLst>
-          <pc:docMk/>
-          <pc:sldMk cId="2182144064" sldId="295"/>
-        </pc:sldMkLst>
-      </pc:sldChg>
-      <pc:sldChg chg="addSp delSp modSp add mod ord">
-        <pc:chgData name="MIGUEL TRIGUEROS MUÑOZ" userId="93f31087-8566-4d16-a7a1-f20635823349" providerId="ADAL" clId="{2064191C-0C86-4C83-9439-2D0DFB2B342F}" dt="2022-11-01T09:58:41.033" v="981" actId="20577"/>
-        <pc:sldMkLst>
-          <pc:docMk/>
-          <pc:sldMk cId="3881213358" sldId="296"/>
-        </pc:sldMkLst>
-      </pc:sldChg>
-      <pc:sldChg chg="addSp modSp add mod">
-        <pc:chgData name="MIGUEL TRIGUEROS MUÑOZ" userId="93f31087-8566-4d16-a7a1-f20635823349" providerId="ADAL" clId="{2064191C-0C86-4C83-9439-2D0DFB2B342F}" dt="2022-11-01T09:52:11.509" v="817" actId="1076"/>
-        <pc:sldMkLst>
-          <pc:docMk/>
-          <pc:sldMk cId="651048111" sldId="297"/>
-        </pc:sldMkLst>
-      </pc:sldChg>
-      <pc:sldChg chg="add del">
-        <pc:chgData name="MIGUEL TRIGUEROS MUÑOZ" userId="93f31087-8566-4d16-a7a1-f20635823349" providerId="ADAL" clId="{2064191C-0C86-4C83-9439-2D0DFB2B342F}" dt="2022-11-01T09:43:01.789" v="780" actId="47"/>
-        <pc:sldMkLst>
-          <pc:docMk/>
-          <pc:sldMk cId="2028147615" sldId="297"/>
-        </pc:sldMkLst>
-      </pc:sldChg>
-      <pc:sldChg chg="addSp modSp add mod">
-        <pc:chgData name="MIGUEL TRIGUEROS MUÑOZ" userId="93f31087-8566-4d16-a7a1-f20635823349" providerId="ADAL" clId="{2064191C-0C86-4C83-9439-2D0DFB2B342F}" dt="2022-11-01T09:53:13.829" v="827" actId="20577"/>
-        <pc:sldMkLst>
-          <pc:docMk/>
-          <pc:sldMk cId="1285496475" sldId="298"/>
-        </pc:sldMkLst>
-      </pc:sldChg>
-      <pc:sldChg chg="addSp modSp add mod">
-        <pc:chgData name="MIGUEL TRIGUEROS MUÑOZ" userId="93f31087-8566-4d16-a7a1-f20635823349" providerId="ADAL" clId="{2064191C-0C86-4C83-9439-2D0DFB2B342F}" dt="2022-11-01T09:54:14.131" v="886" actId="255"/>
-        <pc:sldMkLst>
-          <pc:docMk/>
-          <pc:sldMk cId="975738591" sldId="299"/>
-        </pc:sldMkLst>
-      </pc:sldChg>
-      <pc:sldChg chg="addSp delSp modSp add mod">
-        <pc:chgData name="MIGUEL TRIGUEROS MUÑOZ" userId="93f31087-8566-4d16-a7a1-f20635823349" providerId="ADAL" clId="{2064191C-0C86-4C83-9439-2D0DFB2B342F}" dt="2022-11-01T10:07:40.189" v="1130" actId="113"/>
-        <pc:sldMkLst>
-          <pc:docMk/>
-          <pc:sldMk cId="1286011775" sldId="300"/>
-        </pc:sldMkLst>
-      </pc:sldChg>
-      <pc:sldChg chg="modSp add del mod">
-        <pc:chgData name="MIGUEL TRIGUEROS MUÑOZ" userId="93f31087-8566-4d16-a7a1-f20635823349" providerId="ADAL" clId="{2064191C-0C86-4C83-9439-2D0DFB2B342F}" dt="2022-11-01T10:00:07.119" v="1023" actId="2696"/>
-        <pc:sldMkLst>
-          <pc:docMk/>
-          <pc:sldMk cId="3355152371" sldId="301"/>
-        </pc:sldMkLst>
-      </pc:sldChg>
-      <pc:sldChg chg="addSp modSp add mod">
-        <pc:chgData name="MIGUEL TRIGUEROS MUÑOZ" userId="93f31087-8566-4d16-a7a1-f20635823349" providerId="ADAL" clId="{2064191C-0C86-4C83-9439-2D0DFB2B342F}" dt="2022-11-01T10:00:36.539" v="1026" actId="207"/>
-        <pc:sldMkLst>
-          <pc:docMk/>
-          <pc:sldMk cId="4280179594" sldId="301"/>
-        </pc:sldMkLst>
-      </pc:sldChg>
-      <pc:sldChg chg="addSp delSp modSp add mod">
-        <pc:chgData name="MIGUEL TRIGUEROS MUÑOZ" userId="93f31087-8566-4d16-a7a1-f20635823349" providerId="ADAL" clId="{2064191C-0C86-4C83-9439-2D0DFB2B342F}" dt="2022-11-01T10:04:46.154" v="1087" actId="20577"/>
-        <pc:sldMkLst>
-          <pc:docMk/>
-          <pc:sldMk cId="1662085430" sldId="302"/>
-        </pc:sldMkLst>
-      </pc:sldChg>
-      <pc:sldChg chg="delSp new mod">
-        <pc:chgData name="MIGUEL TRIGUEROS MUÑOZ" userId="93f31087-8566-4d16-a7a1-f20635823349" providerId="ADAL" clId="{2064191C-0C86-4C83-9439-2D0DFB2B342F}" dt="2022-11-01T10:03:15.569" v="1053" actId="21"/>
-        <pc:sldMkLst>
-          <pc:docMk/>
-          <pc:sldMk cId="40683663" sldId="303"/>
-        </pc:sldMkLst>
-      </pc:sldChg>
-      <pc:sldChg chg="addSp delSp modSp add mod">
-        <pc:chgData name="MIGUEL TRIGUEROS MUÑOZ" userId="93f31087-8566-4d16-a7a1-f20635823349" providerId="ADAL" clId="{2064191C-0C86-4C83-9439-2D0DFB2B342F}" dt="2022-11-01T10:09:39.021" v="1149" actId="1076"/>
-        <pc:sldMkLst>
-          <pc:docMk/>
-          <pc:sldMk cId="1878582030" sldId="304"/>
-        </pc:sldMkLst>
-      </pc:sldChg>
-      <pc:sldChg chg="addSp modSp add mod">
-        <pc:chgData name="MIGUEL TRIGUEROS MUÑOZ" userId="93f31087-8566-4d16-a7a1-f20635823349" providerId="ADAL" clId="{2064191C-0C86-4C83-9439-2D0DFB2B342F}" dt="2022-11-01T10:10:47.786" v="1159" actId="1076"/>
-        <pc:sldMkLst>
-          <pc:docMk/>
-          <pc:sldMk cId="524834107" sldId="305"/>
-        </pc:sldMkLst>
-      </pc:sldChg>
-      <pc:sldChg chg="add del">
-        <pc:chgData name="MIGUEL TRIGUEROS MUÑOZ" userId="93f31087-8566-4d16-a7a1-f20635823349" providerId="ADAL" clId="{2064191C-0C86-4C83-9439-2D0DFB2B342F}" dt="2022-11-01T10:07:54.175" v="1132" actId="47"/>
-        <pc:sldMkLst>
-          <pc:docMk/>
-          <pc:sldMk cId="1446723010" sldId="305"/>
-        </pc:sldMkLst>
-      </pc:sldChg>
-      <pc:sldChg chg="addSp modSp add mod">
-        <pc:chgData name="MIGUEL TRIGUEROS MUÑOZ" userId="93f31087-8566-4d16-a7a1-f20635823349" providerId="ADAL" clId="{2064191C-0C86-4C83-9439-2D0DFB2B342F}" dt="2022-11-01T10:13:16.102" v="1171" actId="14100"/>
-        <pc:sldMkLst>
-          <pc:docMk/>
-          <pc:sldMk cId="3007344242" sldId="306"/>
-        </pc:sldMkLst>
-      </pc:sldChg>
-      <pc:sldChg chg="addSp modSp add del mod">
-        <pc:chgData name="MIGUEL TRIGUEROS MUÑOZ" userId="93f31087-8566-4d16-a7a1-f20635823349" providerId="ADAL" clId="{2064191C-0C86-4C83-9439-2D0DFB2B342F}" dt="2022-11-01T10:33:17.644" v="1536" actId="47"/>
-        <pc:sldMkLst>
-          <pc:docMk/>
-          <pc:sldMk cId="2662598700" sldId="307"/>
-        </pc:sldMkLst>
-      </pc:sldChg>
-      <pc:sldChg chg="modSp add mod">
-        <pc:chgData name="MIGUEL TRIGUEROS MUÑOZ" userId="93f31087-8566-4d16-a7a1-f20635823349" providerId="ADAL" clId="{2064191C-0C86-4C83-9439-2D0DFB2B342F}" dt="2022-11-01T10:14:29.522" v="1194" actId="20577"/>
-        <pc:sldMkLst>
-          <pc:docMk/>
-          <pc:sldMk cId="1441313987" sldId="308"/>
-        </pc:sldMkLst>
-      </pc:sldChg>
-      <pc:sldChg chg="modSp add mod">
-        <pc:chgData name="MIGUEL TRIGUEROS MUÑOZ" userId="93f31087-8566-4d16-a7a1-f20635823349" providerId="ADAL" clId="{2064191C-0C86-4C83-9439-2D0DFB2B342F}" dt="2022-11-01T10:47:41.617" v="1748" actId="20577"/>
-        <pc:sldMkLst>
-          <pc:docMk/>
-          <pc:sldMk cId="1679762254" sldId="309"/>
-        </pc:sldMkLst>
-      </pc:sldChg>
-      <pc:sldChg chg="addSp modSp add mod">
-        <pc:chgData name="MIGUEL TRIGUEROS MUÑOZ" userId="93f31087-8566-4d16-a7a1-f20635823349" providerId="ADAL" clId="{2064191C-0C86-4C83-9439-2D0DFB2B342F}" dt="2022-11-01T10:47:56.254" v="1756" actId="20577"/>
-        <pc:sldMkLst>
-          <pc:docMk/>
-          <pc:sldMk cId="2242644199" sldId="310"/>
-        </pc:sldMkLst>
-      </pc:sldChg>
-      <pc:sldChg chg="addSp delSp modSp add mod">
-        <pc:chgData name="MIGUEL TRIGUEROS MUÑOZ" userId="93f31087-8566-4d16-a7a1-f20635823349" providerId="ADAL" clId="{2064191C-0C86-4C83-9439-2D0DFB2B342F}" dt="2022-11-01T10:47:20.532" v="1740" actId="255"/>
-        <pc:sldMkLst>
-          <pc:docMk/>
-          <pc:sldMk cId="1813723418" sldId="311"/>
-        </pc:sldMkLst>
-      </pc:sldChg>
-      <pc:sldChg chg="modSp add mod">
-        <pc:chgData name="MIGUEL TRIGUEROS MUÑOZ" userId="93f31087-8566-4d16-a7a1-f20635823349" providerId="ADAL" clId="{2064191C-0C86-4C83-9439-2D0DFB2B342F}" dt="2022-11-01T10:50:52.418" v="1780" actId="14100"/>
-        <pc:sldMkLst>
-          <pc:docMk/>
-          <pc:sldMk cId="2269836530" sldId="312"/>
-        </pc:sldMkLst>
-      </pc:sldChg>
-      <pc:sldChg chg="addSp delSp modSp add mod">
-        <pc:chgData name="MIGUEL TRIGUEROS MUÑOZ" userId="93f31087-8566-4d16-a7a1-f20635823349" providerId="ADAL" clId="{2064191C-0C86-4C83-9439-2D0DFB2B342F}" dt="2022-11-01T10:53:29.091" v="1800" actId="1035"/>
-        <pc:sldMkLst>
-          <pc:docMk/>
-          <pc:sldMk cId="1814859966" sldId="313"/>
-        </pc:sldMkLst>
-      </pc:sldChg>
-    </pc:docChg>
-  </pc:docChgLst>
-  <pc:docChgLst>
-    <pc:chgData name="MIGUEL TRIGUEROS MUÑOZ" userId="S::miguel.trigueros@aulaxxi.murciaeduca.es::a4ee0321-97d7-430f-98a8-7ed13ff9a4bf" providerId="AD" clId="Web-{14E18D3B-83CD-B621-F1D2-38A67C2FDD62}"/>
-    <pc:docChg chg="modSld">
-      <pc:chgData name="MIGUEL TRIGUEROS MUÑOZ" userId="S::miguel.trigueros@aulaxxi.murciaeduca.es::a4ee0321-97d7-430f-98a8-7ed13ff9a4bf" providerId="AD" clId="Web-{14E18D3B-83CD-B621-F1D2-38A67C2FDD62}" dt="2024-10-24T10:05:05.067" v="7" actId="20577"/>
-      <pc:docMkLst>
-        <pc:docMk/>
-      </pc:docMkLst>
-      <pc:sldChg chg="modSp">
-        <pc:chgData name="MIGUEL TRIGUEROS MUÑOZ" userId="S::miguel.trigueros@aulaxxi.murciaeduca.es::a4ee0321-97d7-430f-98a8-7ed13ff9a4bf" providerId="AD" clId="Web-{14E18D3B-83CD-B621-F1D2-38A67C2FDD62}" dt="2024-10-24T10:05:05.067" v="7" actId="20577"/>
-        <pc:sldMkLst>
-          <pc:docMk/>
-          <pc:sldMk cId="2242644199" sldId="310"/>
-        </pc:sldMkLst>
-      </pc:sldChg>
-    </pc:docChg>
-  </pc:docChgLst>
-  <pc:docChgLst>
-    <pc:chgData name="Miguel Trigueros Muñoz" userId="7753574ed83b4f98" providerId="LiveId" clId="{6BB54B94-95A1-4CB9-84EC-4B68CAB84776}"/>
-    <pc:docChg chg="undo custSel addSld delSld modSld sldOrd modMainMaster addSection delSection modSection">
-      <pc:chgData name="Miguel Trigueros Muñoz" userId="7753574ed83b4f98" providerId="LiveId" clId="{6BB54B94-95A1-4CB9-84EC-4B68CAB84776}" dt="2025-07-08T08:56:04.492" v="921" actId="1076"/>
-      <pc:docMkLst>
-        <pc:docMk/>
-      </pc:docMkLst>
-      <pc:sldChg chg="modSp mod">
-        <pc:chgData name="Miguel Trigueros Muñoz" userId="7753574ed83b4f98" providerId="LiveId" clId="{6BB54B94-95A1-4CB9-84EC-4B68CAB84776}" dt="2025-06-25T10:49:08.603" v="2" actId="20577"/>
-        <pc:sldMkLst>
-          <pc:docMk/>
-          <pc:sldMk cId="308865771" sldId="256"/>
-        </pc:sldMkLst>
-        <pc:spChg chg="mod">
-          <ac:chgData name="Miguel Trigueros Muñoz" userId="7753574ed83b4f98" providerId="LiveId" clId="{6BB54B94-95A1-4CB9-84EC-4B68CAB84776}" dt="2025-06-25T10:49:08.603" v="2" actId="20577"/>
-          <ac:spMkLst>
-            <pc:docMk/>
-            <pc:sldMk cId="308865771" sldId="256"/>
-            <ac:spMk id="2" creationId="{BB6B5ACD-B995-716B-F5F7-1C14289F141D}"/>
-          </ac:spMkLst>
-        </pc:spChg>
-      </pc:sldChg>
-      <pc:sldChg chg="modSp mod">
-        <pc:chgData name="Miguel Trigueros Muñoz" userId="7753574ed83b4f98" providerId="LiveId" clId="{6BB54B94-95A1-4CB9-84EC-4B68CAB84776}" dt="2025-06-25T11:03:55.443" v="428" actId="1076"/>
-        <pc:sldMkLst>
-          <pc:docMk/>
-          <pc:sldMk cId="3881213358" sldId="296"/>
-        </pc:sldMkLst>
-        <pc:spChg chg="mod">
-          <ac:chgData name="Miguel Trigueros Muñoz" userId="7753574ed83b4f98" providerId="LiveId" clId="{6BB54B94-95A1-4CB9-84EC-4B68CAB84776}" dt="2025-06-25T11:03:55.443" v="428" actId="1076"/>
-          <ac:spMkLst>
-            <pc:docMk/>
-            <pc:sldMk cId="3881213358" sldId="296"/>
-            <ac:spMk id="6" creationId="{445AF7CC-753C-B7DA-948E-71ACFD5A6849}"/>
-          </ac:spMkLst>
-        </pc:spChg>
-      </pc:sldChg>
-      <pc:sldChg chg="modSp add del mod ord">
-        <pc:chgData name="Miguel Trigueros Muñoz" userId="7753574ed83b4f98" providerId="LiveId" clId="{6BB54B94-95A1-4CB9-84EC-4B68CAB84776}" dt="2025-07-08T08:55:21.783" v="918" actId="20577"/>
-        <pc:sldMkLst>
-          <pc:docMk/>
-          <pc:sldMk cId="1662085430" sldId="302"/>
-        </pc:sldMkLst>
-        <pc:spChg chg="mod">
-          <ac:chgData name="Miguel Trigueros Muñoz" userId="7753574ed83b4f98" providerId="LiveId" clId="{6BB54B94-95A1-4CB9-84EC-4B68CAB84776}" dt="2025-07-08T08:55:21.783" v="918" actId="20577"/>
-          <ac:spMkLst>
-            <pc:docMk/>
-            <pc:sldMk cId="1662085430" sldId="302"/>
-            <ac:spMk id="5" creationId="{2E672CE3-414F-1E3C-9928-F4B6B7568735}"/>
-          </ac:spMkLst>
-        </pc:spChg>
-      </pc:sldChg>
-      <pc:sldChg chg="delSp modSp mod">
-        <pc:chgData name="Miguel Trigueros Muñoz" userId="7753574ed83b4f98" providerId="LiveId" clId="{6BB54B94-95A1-4CB9-84EC-4B68CAB84776}" dt="2025-07-08T08:41:32.575" v="817" actId="21"/>
-        <pc:sldMkLst>
-          <pc:docMk/>
-          <pc:sldMk cId="524834107" sldId="305"/>
-        </pc:sldMkLst>
-        <pc:picChg chg="del mod">
-          <ac:chgData name="Miguel Trigueros Muñoz" userId="7753574ed83b4f98" providerId="LiveId" clId="{6BB54B94-95A1-4CB9-84EC-4B68CAB84776}" dt="2025-07-08T08:41:32.575" v="817" actId="21"/>
-          <ac:picMkLst>
-            <pc:docMk/>
-            <pc:sldMk cId="524834107" sldId="305"/>
-            <ac:picMk id="5" creationId="{68ECA448-6F57-0EC4-0ABD-505FC34CF3C0}"/>
-          </ac:picMkLst>
-        </pc:picChg>
-      </pc:sldChg>
-      <pc:sldChg chg="addSp delSp modSp mod">
-        <pc:chgData name="Miguel Trigueros Muñoz" userId="7753574ed83b4f98" providerId="LiveId" clId="{6BB54B94-95A1-4CB9-84EC-4B68CAB84776}" dt="2025-07-08T08:54:47.661" v="915" actId="20577"/>
+        <pc:chgData name="MIGUEL TRIGUEROS MUÑOZ" userId="S::miguel.trigueros@aulaxxi.murciaeduca.es::a4ee0321-97d7-430f-98a8-7ed13ff9a4bf" providerId="AD" clId="Web-{E09DD130-612E-646E-A622-1F0A4BF8BCB8}" dt="2025-10-04T07:15:30.355" v="28" actId="20577"/>
         <pc:sldMkLst>
           <pc:docMk/>
           <pc:sldMk cId="1441313987" sldId="308"/>
         </pc:sldMkLst>
         <pc:spChg chg="mod">
-          <ac:chgData name="Miguel Trigueros Muñoz" userId="7753574ed83b4f98" providerId="LiveId" clId="{6BB54B94-95A1-4CB9-84EC-4B68CAB84776}" dt="2025-07-08T08:54:47.661" v="915" actId="20577"/>
-          <ac:spMkLst>
-            <pc:docMk/>
-            <pc:sldMk cId="1441313987" sldId="308"/>
-            <ac:spMk id="2" creationId="{3EA543D3-C58C-1AE7-0D94-9F33892E7FF5}"/>
-          </ac:spMkLst>
-        </pc:spChg>
-        <pc:spChg chg="mod">
-          <ac:chgData name="Miguel Trigueros Muñoz" userId="7753574ed83b4f98" providerId="LiveId" clId="{6BB54B94-95A1-4CB9-84EC-4B68CAB84776}" dt="2025-07-08T08:54:24.428" v="912" actId="20577"/>
+          <ac:chgData name="MIGUEL TRIGUEROS MUÑOZ" userId="S::miguel.trigueros@aulaxxi.murciaeduca.es::a4ee0321-97d7-430f-98a8-7ed13ff9a4bf" providerId="AD" clId="Web-{E09DD130-612E-646E-A622-1F0A4BF8BCB8}" dt="2025-10-04T07:15:30.355" v="28" actId="20577"/>
           <ac:spMkLst>
             <pc:docMk/>
             <pc:sldMk cId="1441313987" sldId="308"/>
             <ac:spMk id="7" creationId="{03FD58B7-5F60-8ED6-BC4F-7B286447C10A}"/>
           </ac:spMkLst>
         </pc:spChg>
-        <pc:picChg chg="add del">
-          <ac:chgData name="Miguel Trigueros Muñoz" userId="7753574ed83b4f98" providerId="LiveId" clId="{6BB54B94-95A1-4CB9-84EC-4B68CAB84776}" dt="2025-07-08T08:52:52.536" v="897" actId="478"/>
-          <ac:picMkLst>
-            <pc:docMk/>
-            <pc:sldMk cId="1441313987" sldId="308"/>
-            <ac:picMk id="4" creationId="{162E0DBC-520E-3745-FB63-511F8EF5A680}"/>
-          </ac:picMkLst>
-        </pc:picChg>
-        <pc:picChg chg="add del">
-          <ac:chgData name="Miguel Trigueros Muñoz" userId="7753574ed83b4f98" providerId="LiveId" clId="{6BB54B94-95A1-4CB9-84EC-4B68CAB84776}" dt="2025-07-08T08:53:05.550" v="898" actId="478"/>
-          <ac:picMkLst>
-            <pc:docMk/>
-            <pc:sldMk cId="1441313987" sldId="308"/>
-            <ac:picMk id="5" creationId="{456112D8-8ECF-F940-B383-D25717D6547E}"/>
-          </ac:picMkLst>
-        </pc:picChg>
-        <pc:picChg chg="add mod">
-          <ac:chgData name="Miguel Trigueros Muñoz" userId="7753574ed83b4f98" providerId="LiveId" clId="{6BB54B94-95A1-4CB9-84EC-4B68CAB84776}" dt="2025-07-08T08:54:05.326" v="907" actId="1076"/>
-          <ac:picMkLst>
-            <pc:docMk/>
-            <pc:sldMk cId="1441313987" sldId="308"/>
-            <ac:picMk id="8" creationId="{01FB271B-271C-2C8D-713F-8217BA7FB958}"/>
-          </ac:picMkLst>
-        </pc:picChg>
-        <pc:picChg chg="add mod">
-          <ac:chgData name="Miguel Trigueros Muñoz" userId="7753574ed83b4f98" providerId="LiveId" clId="{6BB54B94-95A1-4CB9-84EC-4B68CAB84776}" dt="2025-07-08T08:53:58.559" v="905" actId="1076"/>
-          <ac:picMkLst>
-            <pc:docMk/>
-            <pc:sldMk cId="1441313987" sldId="308"/>
-            <ac:picMk id="10" creationId="{867E6D05-1444-3E64-9E1C-937BF4CCFA88}"/>
-          </ac:picMkLst>
-        </pc:picChg>
       </pc:sldChg>
-      <pc:sldChg chg="modSp mod modClrScheme chgLayout">
-        <pc:chgData name="Miguel Trigueros Muñoz" userId="7753574ed83b4f98" providerId="LiveId" clId="{6BB54B94-95A1-4CB9-84EC-4B68CAB84776}" dt="2025-07-08T08:56:04.492" v="921" actId="1076"/>
+      <pc:sldChg chg="addSp delSp modSp mod modClrScheme chgLayout">
+        <pc:chgData name="MIGUEL TRIGUEROS MUÑOZ" userId="S::miguel.trigueros@aulaxxi.murciaeduca.es::a4ee0321-97d7-430f-98a8-7ed13ff9a4bf" providerId="AD" clId="Web-{E09DD130-612E-646E-A622-1F0A4BF8BCB8}" dt="2025-10-04T07:12:59.197" v="26" actId="20577"/>
         <pc:sldMkLst>
           <pc:docMk/>
           <pc:sldMk cId="1679762254" sldId="309"/>
         </pc:sldMkLst>
         <pc:spChg chg="mod ord">
-          <ac:chgData name="Miguel Trigueros Muñoz" userId="7753574ed83b4f98" providerId="LiveId" clId="{6BB54B94-95A1-4CB9-84EC-4B68CAB84776}" dt="2025-07-08T08:55:55.392" v="919" actId="20577"/>
+          <ac:chgData name="MIGUEL TRIGUEROS MUÑOZ" userId="S::miguel.trigueros@aulaxxi.murciaeduca.es::a4ee0321-97d7-430f-98a8-7ed13ff9a4bf" providerId="AD" clId="Web-{E09DD130-612E-646E-A622-1F0A4BF8BCB8}" dt="2025-10-04T07:10:12.428" v="2"/>
           <ac:spMkLst>
             <pc:docMk/>
             <pc:sldMk cId="1679762254" sldId="309"/>
@@ -2874,15 +312,23 @@
           </ac:spMkLst>
         </pc:spChg>
         <pc:spChg chg="mod ord">
-          <ac:chgData name="Miguel Trigueros Muñoz" userId="7753574ed83b4f98" providerId="LiveId" clId="{6BB54B94-95A1-4CB9-84EC-4B68CAB84776}" dt="2025-07-08T08:56:04.492" v="921" actId="1076"/>
+          <ac:chgData name="MIGUEL TRIGUEROS MUÑOZ" userId="S::miguel.trigueros@aulaxxi.murciaeduca.es::a4ee0321-97d7-430f-98a8-7ed13ff9a4bf" providerId="AD" clId="Web-{E09DD130-612E-646E-A622-1F0A4BF8BCB8}" dt="2025-10-04T07:10:12.428" v="2"/>
           <ac:spMkLst>
             <pc:docMk/>
             <pc:sldMk cId="1679762254" sldId="309"/>
             <ac:spMk id="3" creationId="{45075051-CFEA-750E-7BF4-B90054C05CEF}"/>
           </ac:spMkLst>
         </pc:spChg>
+        <pc:spChg chg="add del mod ord">
+          <ac:chgData name="MIGUEL TRIGUEROS MUÑOZ" userId="S::miguel.trigueros@aulaxxi.murciaeduca.es::a4ee0321-97d7-430f-98a8-7ed13ff9a4bf" providerId="AD" clId="Web-{E09DD130-612E-646E-A622-1F0A4BF8BCB8}" dt="2025-10-04T07:10:12.428" v="2"/>
+          <ac:spMkLst>
+            <pc:docMk/>
+            <pc:sldMk cId="1679762254" sldId="309"/>
+            <ac:spMk id="4" creationId="{39630288-84F8-3E5A-9858-A24CA4E7BAB1}"/>
+          </ac:spMkLst>
+        </pc:spChg>
         <pc:spChg chg="mod ord">
-          <ac:chgData name="Miguel Trigueros Muñoz" userId="7753574ed83b4f98" providerId="LiveId" clId="{6BB54B94-95A1-4CB9-84EC-4B68CAB84776}" dt="2025-07-08T08:42:24.795" v="818" actId="700"/>
+          <ac:chgData name="MIGUEL TRIGUEROS MUÑOZ" userId="S::miguel.trigueros@aulaxxi.murciaeduca.es::a4ee0321-97d7-430f-98a8-7ed13ff9a4bf" providerId="AD" clId="Web-{E09DD130-612E-646E-A622-1F0A4BF8BCB8}" dt="2025-10-04T07:10:12.428" v="2"/>
           <ac:spMkLst>
             <pc:docMk/>
             <pc:sldMk cId="1679762254" sldId="309"/>
@@ -2890,7 +336,7 @@
           </ac:spMkLst>
         </pc:spChg>
         <pc:spChg chg="mod ord">
-          <ac:chgData name="Miguel Trigueros Muñoz" userId="7753574ed83b4f98" providerId="LiveId" clId="{6BB54B94-95A1-4CB9-84EC-4B68CAB84776}" dt="2025-07-08T08:56:01.184" v="920" actId="1076"/>
+          <ac:chgData name="MIGUEL TRIGUEROS MUÑOZ" userId="S::miguel.trigueros@aulaxxi.murciaeduca.es::a4ee0321-97d7-430f-98a8-7ed13ff9a4bf" providerId="AD" clId="Web-{E09DD130-612E-646E-A622-1F0A4BF8BCB8}" dt="2025-10-04T07:12:59.197" v="26" actId="20577"/>
           <ac:spMkLst>
             <pc:docMk/>
             <pc:sldMk cId="1679762254" sldId="309"/>
@@ -2898,365 +344,6 @@
           </ac:spMkLst>
         </pc:spChg>
       </pc:sldChg>
-      <pc:sldChg chg="delSp modSp mod">
-        <pc:chgData name="Miguel Trigueros Muñoz" userId="7753574ed83b4f98" providerId="LiveId" clId="{6BB54B94-95A1-4CB9-84EC-4B68CAB84776}" dt="2025-06-25T16:37:10.669" v="512" actId="478"/>
-        <pc:sldMkLst>
-          <pc:docMk/>
-          <pc:sldMk cId="2242644199" sldId="310"/>
-        </pc:sldMkLst>
-      </pc:sldChg>
-      <pc:sldChg chg="modSp mod">
-        <pc:chgData name="Miguel Trigueros Muñoz" userId="7753574ed83b4f98" providerId="LiveId" clId="{6BB54B94-95A1-4CB9-84EC-4B68CAB84776}" dt="2025-06-25T16:37:38.307" v="513" actId="20577"/>
-        <pc:sldMkLst>
-          <pc:docMk/>
-          <pc:sldMk cId="1813723418" sldId="311"/>
-        </pc:sldMkLst>
-        <pc:spChg chg="mod">
-          <ac:chgData name="Miguel Trigueros Muñoz" userId="7753574ed83b4f98" providerId="LiveId" clId="{6BB54B94-95A1-4CB9-84EC-4B68CAB84776}" dt="2025-06-25T16:37:38.307" v="513" actId="20577"/>
-          <ac:spMkLst>
-            <pc:docMk/>
-            <pc:sldMk cId="1813723418" sldId="311"/>
-            <ac:spMk id="2" creationId="{3EA543D3-C58C-1AE7-0D94-9F33892E7FF5}"/>
-          </ac:spMkLst>
-        </pc:spChg>
-        <pc:picChg chg="mod">
-          <ac:chgData name="Miguel Trigueros Muñoz" userId="7753574ed83b4f98" providerId="LiveId" clId="{6BB54B94-95A1-4CB9-84EC-4B68CAB84776}" dt="2025-06-25T16:36:50.834" v="510" actId="1076"/>
-          <ac:picMkLst>
-            <pc:docMk/>
-            <pc:sldMk cId="1813723418" sldId="311"/>
-            <ac:picMk id="7" creationId="{4B0949EA-A9E5-4B21-8045-7CC4F691DE73}"/>
-          </ac:picMkLst>
-        </pc:picChg>
-      </pc:sldChg>
-      <pc:sldChg chg="modSp mod modNotesTx">
-        <pc:chgData name="Miguel Trigueros Muñoz" userId="7753574ed83b4f98" providerId="LiveId" clId="{6BB54B94-95A1-4CB9-84EC-4B68CAB84776}" dt="2025-07-08T08:33:17.085" v="633" actId="5793"/>
-        <pc:sldMkLst>
-          <pc:docMk/>
-          <pc:sldMk cId="745458148" sldId="314"/>
-        </pc:sldMkLst>
-        <pc:spChg chg="mod">
-          <ac:chgData name="Miguel Trigueros Muñoz" userId="7753574ed83b4f98" providerId="LiveId" clId="{6BB54B94-95A1-4CB9-84EC-4B68CAB84776}" dt="2025-06-25T10:57:55.033" v="54" actId="207"/>
-          <ac:spMkLst>
-            <pc:docMk/>
-            <pc:sldMk cId="745458148" sldId="314"/>
-            <ac:spMk id="3" creationId="{B6D7D569-2E40-41FB-F9B2-C2262085590C}"/>
-          </ac:spMkLst>
-        </pc:spChg>
-      </pc:sldChg>
-      <pc:sldChg chg="modSp mod modNotesTx">
-        <pc:chgData name="Miguel Trigueros Muñoz" userId="7753574ed83b4f98" providerId="LiveId" clId="{6BB54B94-95A1-4CB9-84EC-4B68CAB84776}" dt="2025-06-25T11:24:24.068" v="478" actId="20577"/>
-        <pc:sldMkLst>
-          <pc:docMk/>
-          <pc:sldMk cId="279635090" sldId="315"/>
-        </pc:sldMkLst>
-        <pc:spChg chg="mod">
-          <ac:chgData name="Miguel Trigueros Muñoz" userId="7753574ed83b4f98" providerId="LiveId" clId="{6BB54B94-95A1-4CB9-84EC-4B68CAB84776}" dt="2025-06-25T10:53:38.267" v="5" actId="13926"/>
-          <ac:spMkLst>
-            <pc:docMk/>
-            <pc:sldMk cId="279635090" sldId="315"/>
-            <ac:spMk id="6" creationId="{20F891AE-3DB4-281E-D362-E59AEAA2466D}"/>
-          </ac:spMkLst>
-        </pc:spChg>
-      </pc:sldChg>
-      <pc:sldChg chg="addSp delSp modSp mod">
-        <pc:chgData name="Miguel Trigueros Muñoz" userId="7753574ed83b4f98" providerId="LiveId" clId="{6BB54B94-95A1-4CB9-84EC-4B68CAB84776}" dt="2025-07-08T08:35:15.539" v="643" actId="20577"/>
-        <pc:sldMkLst>
-          <pc:docMk/>
-          <pc:sldMk cId="2894294298" sldId="321"/>
-        </pc:sldMkLst>
-        <pc:spChg chg="mod">
-          <ac:chgData name="Miguel Trigueros Muñoz" userId="7753574ed83b4f98" providerId="LiveId" clId="{6BB54B94-95A1-4CB9-84EC-4B68CAB84776}" dt="2025-07-08T08:35:15.539" v="643" actId="20577"/>
-          <ac:spMkLst>
-            <pc:docMk/>
-            <pc:sldMk cId="2894294298" sldId="321"/>
-            <ac:spMk id="6" creationId="{B183351C-4D5E-30A0-6864-D1F246ECB474}"/>
-          </ac:spMkLst>
-        </pc:spChg>
-        <pc:spChg chg="mod">
-          <ac:chgData name="Miguel Trigueros Muñoz" userId="7753574ed83b4f98" providerId="LiveId" clId="{6BB54B94-95A1-4CB9-84EC-4B68CAB84776}" dt="2025-06-25T10:50:45.013" v="4" actId="207"/>
-          <ac:spMkLst>
-            <pc:docMk/>
-            <pc:sldMk cId="2894294298" sldId="321"/>
-            <ac:spMk id="7" creationId="{32D7E460-3301-F563-D75E-6947A92E3D95}"/>
-          </ac:spMkLst>
-        </pc:spChg>
-        <pc:picChg chg="del">
-          <ac:chgData name="Miguel Trigueros Muñoz" userId="7753574ed83b4f98" providerId="LiveId" clId="{6BB54B94-95A1-4CB9-84EC-4B68CAB84776}" dt="2025-07-08T08:34:28.581" v="636" actId="478"/>
-          <ac:picMkLst>
-            <pc:docMk/>
-            <pc:sldMk cId="2894294298" sldId="321"/>
-            <ac:picMk id="3" creationId="{1E4E4ECA-2209-2E28-DEE7-7FD62C7869AD}"/>
-          </ac:picMkLst>
-        </pc:picChg>
-        <pc:picChg chg="del mod">
-          <ac:chgData name="Miguel Trigueros Muñoz" userId="7753574ed83b4f98" providerId="LiveId" clId="{6BB54B94-95A1-4CB9-84EC-4B68CAB84776}" dt="2025-07-08T08:34:26.678" v="635" actId="478"/>
-          <ac:picMkLst>
-            <pc:docMk/>
-            <pc:sldMk cId="2894294298" sldId="321"/>
-            <ac:picMk id="5" creationId="{36B2CF0A-64B1-D82B-BD78-DA8D4DCF51E9}"/>
-          </ac:picMkLst>
-        </pc:picChg>
-        <pc:picChg chg="add mod">
-          <ac:chgData name="Miguel Trigueros Muñoz" userId="7753574ed83b4f98" providerId="LiveId" clId="{6BB54B94-95A1-4CB9-84EC-4B68CAB84776}" dt="2025-07-08T08:35:05.370" v="642" actId="1076"/>
-          <ac:picMkLst>
-            <pc:docMk/>
-            <pc:sldMk cId="2894294298" sldId="321"/>
-            <ac:picMk id="8" creationId="{38326712-3A07-A64B-540C-6A5992DA8E81}"/>
-          </ac:picMkLst>
-        </pc:picChg>
-      </pc:sldChg>
-      <pc:sldChg chg="del">
-        <pc:chgData name="Miguel Trigueros Muñoz" userId="7753574ed83b4f98" providerId="LiveId" clId="{6BB54B94-95A1-4CB9-84EC-4B68CAB84776}" dt="2025-06-25T11:34:40.431" v="505" actId="47"/>
-        <pc:sldMkLst>
-          <pc:docMk/>
-          <pc:sldMk cId="1069880379" sldId="323"/>
-        </pc:sldMkLst>
-      </pc:sldChg>
-      <pc:sldChg chg="del">
-        <pc:chgData name="Miguel Trigueros Muñoz" userId="7753574ed83b4f98" providerId="LiveId" clId="{6BB54B94-95A1-4CB9-84EC-4B68CAB84776}" dt="2025-06-25T11:34:42.267" v="506" actId="47"/>
-        <pc:sldMkLst>
-          <pc:docMk/>
-          <pc:sldMk cId="2304737095" sldId="324"/>
-        </pc:sldMkLst>
-      </pc:sldChg>
-      <pc:sldChg chg="del">
-        <pc:chgData name="Miguel Trigueros Muñoz" userId="7753574ed83b4f98" providerId="LiveId" clId="{6BB54B94-95A1-4CB9-84EC-4B68CAB84776}" dt="2025-06-25T11:34:23.961" v="498" actId="47"/>
-        <pc:sldMkLst>
-          <pc:docMk/>
-          <pc:sldMk cId="1122745256" sldId="325"/>
-        </pc:sldMkLst>
-      </pc:sldChg>
-      <pc:sldChg chg="del">
-        <pc:chgData name="Miguel Trigueros Muñoz" userId="7753574ed83b4f98" providerId="LiveId" clId="{6BB54B94-95A1-4CB9-84EC-4B68CAB84776}" dt="2025-06-25T11:34:22.959" v="497" actId="47"/>
-        <pc:sldMkLst>
-          <pc:docMk/>
-          <pc:sldMk cId="3983183523" sldId="326"/>
-        </pc:sldMkLst>
-      </pc:sldChg>
-      <pc:sldChg chg="del">
-        <pc:chgData name="Miguel Trigueros Muñoz" userId="7753574ed83b4f98" providerId="LiveId" clId="{6BB54B94-95A1-4CB9-84EC-4B68CAB84776}" dt="2025-06-25T11:34:39.227" v="504" actId="47"/>
-        <pc:sldMkLst>
-          <pc:docMk/>
-          <pc:sldMk cId="3410194891" sldId="328"/>
-        </pc:sldMkLst>
-      </pc:sldChg>
-      <pc:sldChg chg="del">
-        <pc:chgData name="Miguel Trigueros Muñoz" userId="7753574ed83b4f98" providerId="LiveId" clId="{6BB54B94-95A1-4CB9-84EC-4B68CAB84776}" dt="2025-06-25T11:34:22.057" v="496" actId="47"/>
-        <pc:sldMkLst>
-          <pc:docMk/>
-          <pc:sldMk cId="2336738011" sldId="333"/>
-        </pc:sldMkLst>
-      </pc:sldChg>
-      <pc:sldChg chg="addSp modSp mod modNotesTx">
-        <pc:chgData name="Miguel Trigueros Muñoz" userId="7753574ed83b4f98" providerId="LiveId" clId="{6BB54B94-95A1-4CB9-84EC-4B68CAB84776}" dt="2025-07-08T08:38:02.197" v="807" actId="1076"/>
-        <pc:sldMkLst>
-          <pc:docMk/>
-          <pc:sldMk cId="3389564933" sldId="336"/>
-        </pc:sldMkLst>
-        <pc:spChg chg="mod">
-          <ac:chgData name="Miguel Trigueros Muñoz" userId="7753574ed83b4f98" providerId="LiveId" clId="{6BB54B94-95A1-4CB9-84EC-4B68CAB84776}" dt="2025-06-25T11:18:01.520" v="462" actId="20577"/>
-          <ac:spMkLst>
-            <pc:docMk/>
-            <pc:sldMk cId="3389564933" sldId="336"/>
-            <ac:spMk id="2" creationId="{3E5C811E-805D-D9E6-EA65-A467FD5EB763}"/>
-          </ac:spMkLst>
-        </pc:spChg>
-        <pc:spChg chg="add mod">
-          <ac:chgData name="Miguel Trigueros Muñoz" userId="7753574ed83b4f98" providerId="LiveId" clId="{6BB54B94-95A1-4CB9-84EC-4B68CAB84776}" dt="2025-07-08T08:38:02.197" v="807" actId="1076"/>
-          <ac:spMkLst>
-            <pc:docMk/>
-            <pc:sldMk cId="3389564933" sldId="336"/>
-            <ac:spMk id="6" creationId="{4AC6248C-E96B-DF95-7143-ACFD7E4A3D95}"/>
-          </ac:spMkLst>
-        </pc:spChg>
-        <pc:picChg chg="mod">
-          <ac:chgData name="Miguel Trigueros Muñoz" userId="7753574ed83b4f98" providerId="LiveId" clId="{6BB54B94-95A1-4CB9-84EC-4B68CAB84776}" dt="2025-06-25T11:02:38.252" v="414" actId="1076"/>
-          <ac:picMkLst>
-            <pc:docMk/>
-            <pc:sldMk cId="3389564933" sldId="336"/>
-            <ac:picMk id="5" creationId="{42B708EC-12FE-4677-16EA-4744A71508E0}"/>
-          </ac:picMkLst>
-        </pc:picChg>
-      </pc:sldChg>
-      <pc:sldChg chg="addSp modSp mod modNotesTx">
-        <pc:chgData name="Miguel Trigueros Muñoz" userId="7753574ed83b4f98" providerId="LiveId" clId="{6BB54B94-95A1-4CB9-84EC-4B68CAB84776}" dt="2025-07-08T08:37:29.944" v="802" actId="1076"/>
-        <pc:sldMkLst>
-          <pc:docMk/>
-          <pc:sldMk cId="3634630687" sldId="337"/>
-        </pc:sldMkLst>
-        <pc:spChg chg="mod">
-          <ac:chgData name="Miguel Trigueros Muñoz" userId="7753574ed83b4f98" providerId="LiveId" clId="{6BB54B94-95A1-4CB9-84EC-4B68CAB84776}" dt="2025-06-25T11:18:12.611" v="467" actId="20577"/>
-          <ac:spMkLst>
-            <pc:docMk/>
-            <pc:sldMk cId="3634630687" sldId="337"/>
-            <ac:spMk id="2" creationId="{3E5C811E-805D-D9E6-EA65-A467FD5EB763}"/>
-          </ac:spMkLst>
-        </pc:spChg>
-        <pc:spChg chg="add mod">
-          <ac:chgData name="Miguel Trigueros Muñoz" userId="7753574ed83b4f98" providerId="LiveId" clId="{6BB54B94-95A1-4CB9-84EC-4B68CAB84776}" dt="2025-07-08T08:37:29.944" v="802" actId="1076"/>
-          <ac:spMkLst>
-            <pc:docMk/>
-            <pc:sldMk cId="3634630687" sldId="337"/>
-            <ac:spMk id="5" creationId="{5611700F-B18C-21FA-226E-AC1B81D28B82}"/>
-          </ac:spMkLst>
-        </pc:spChg>
-      </pc:sldChg>
-      <pc:sldChg chg="del">
-        <pc:chgData name="Miguel Trigueros Muñoz" userId="7753574ed83b4f98" providerId="LiveId" clId="{6BB54B94-95A1-4CB9-84EC-4B68CAB84776}" dt="2025-06-25T11:34:19.488" v="494" actId="47"/>
-        <pc:sldMkLst>
-          <pc:docMk/>
-          <pc:sldMk cId="3761948457" sldId="341"/>
-        </pc:sldMkLst>
-      </pc:sldChg>
-      <pc:sldChg chg="del">
-        <pc:chgData name="Miguel Trigueros Muñoz" userId="7753574ed83b4f98" providerId="LiveId" clId="{6BB54B94-95A1-4CB9-84EC-4B68CAB84776}" dt="2025-06-25T11:34:20.428" v="495" actId="47"/>
-        <pc:sldMkLst>
-          <pc:docMk/>
-          <pc:sldMk cId="1759713922" sldId="342"/>
-        </pc:sldMkLst>
-      </pc:sldChg>
-      <pc:sldChg chg="del">
-        <pc:chgData name="Miguel Trigueros Muñoz" userId="7753574ed83b4f98" providerId="LiveId" clId="{6BB54B94-95A1-4CB9-84EC-4B68CAB84776}" dt="2025-06-25T11:34:16.502" v="492" actId="47"/>
-        <pc:sldMkLst>
-          <pc:docMk/>
-          <pc:sldMk cId="1363057816" sldId="343"/>
-        </pc:sldMkLst>
-      </pc:sldChg>
-      <pc:sldChg chg="del">
-        <pc:chgData name="Miguel Trigueros Muñoz" userId="7753574ed83b4f98" providerId="LiveId" clId="{6BB54B94-95A1-4CB9-84EC-4B68CAB84776}" dt="2025-06-25T11:34:18.394" v="493" actId="47"/>
-        <pc:sldMkLst>
-          <pc:docMk/>
-          <pc:sldMk cId="1188484412" sldId="350"/>
-        </pc:sldMkLst>
-      </pc:sldChg>
-      <pc:sldChg chg="del">
-        <pc:chgData name="Miguel Trigueros Muñoz" userId="7753574ed83b4f98" providerId="LiveId" clId="{6BB54B94-95A1-4CB9-84EC-4B68CAB84776}" dt="2025-06-25T11:34:13.223" v="490" actId="47"/>
-        <pc:sldMkLst>
-          <pc:docMk/>
-          <pc:sldMk cId="2076484974" sldId="351"/>
-        </pc:sldMkLst>
-      </pc:sldChg>
-      <pc:sldChg chg="del">
-        <pc:chgData name="Miguel Trigueros Muñoz" userId="7753574ed83b4f98" providerId="LiveId" clId="{6BB54B94-95A1-4CB9-84EC-4B68CAB84776}" dt="2025-06-25T11:34:14.252" v="491" actId="47"/>
-        <pc:sldMkLst>
-          <pc:docMk/>
-          <pc:sldMk cId="683416156" sldId="352"/>
-        </pc:sldMkLst>
-      </pc:sldChg>
-      <pc:sldChg chg="del">
-        <pc:chgData name="Miguel Trigueros Muñoz" userId="7753574ed83b4f98" providerId="LiveId" clId="{6BB54B94-95A1-4CB9-84EC-4B68CAB84776}" dt="2025-06-25T11:34:11.652" v="489" actId="47"/>
-        <pc:sldMkLst>
-          <pc:docMk/>
-          <pc:sldMk cId="1131165253" sldId="353"/>
-        </pc:sldMkLst>
-      </pc:sldChg>
-      <pc:sldChg chg="del">
-        <pc:chgData name="Miguel Trigueros Muñoz" userId="7753574ed83b4f98" providerId="LiveId" clId="{6BB54B94-95A1-4CB9-84EC-4B68CAB84776}" dt="2025-06-25T11:34:10.624" v="488" actId="47"/>
-        <pc:sldMkLst>
-          <pc:docMk/>
-          <pc:sldMk cId="3098520206" sldId="354"/>
-        </pc:sldMkLst>
-      </pc:sldChg>
-      <pc:sldChg chg="del">
-        <pc:chgData name="Miguel Trigueros Muñoz" userId="7753574ed83b4f98" providerId="LiveId" clId="{6BB54B94-95A1-4CB9-84EC-4B68CAB84776}" dt="2025-06-25T11:34:08.599" v="487" actId="47"/>
-        <pc:sldMkLst>
-          <pc:docMk/>
-          <pc:sldMk cId="3753997660" sldId="355"/>
-        </pc:sldMkLst>
-      </pc:sldChg>
-      <pc:sldChg chg="addSp delSp modSp add mod">
-        <pc:chgData name="Miguel Trigueros Muñoz" userId="7753574ed83b4f98" providerId="LiveId" clId="{6BB54B94-95A1-4CB9-84EC-4B68CAB84776}" dt="2025-07-08T08:38:20.418" v="809" actId="1076"/>
-        <pc:sldMkLst>
-          <pc:docMk/>
-          <pc:sldMk cId="1660613626" sldId="356"/>
-        </pc:sldMkLst>
-        <pc:spChg chg="mod">
-          <ac:chgData name="Miguel Trigueros Muñoz" userId="7753574ed83b4f98" providerId="LiveId" clId="{6BB54B94-95A1-4CB9-84EC-4B68CAB84776}" dt="2025-06-25T11:18:17.008" v="472" actId="20577"/>
-          <ac:spMkLst>
-            <pc:docMk/>
-            <pc:sldMk cId="1660613626" sldId="356"/>
-            <ac:spMk id="2" creationId="{5D9DB3D6-6A4D-8FB8-223A-22E5A84699B3}"/>
-          </ac:spMkLst>
-        </pc:spChg>
-        <pc:spChg chg="mod">
-          <ac:chgData name="Miguel Trigueros Muñoz" userId="7753574ed83b4f98" providerId="LiveId" clId="{6BB54B94-95A1-4CB9-84EC-4B68CAB84776}" dt="2025-06-25T11:16:53.423" v="440" actId="20577"/>
-          <ac:spMkLst>
-            <pc:docMk/>
-            <pc:sldMk cId="1660613626" sldId="356"/>
-            <ac:spMk id="3" creationId="{C6647708-4F55-D7EB-E43B-41919551D511}"/>
-          </ac:spMkLst>
-        </pc:spChg>
-        <pc:spChg chg="add mod">
-          <ac:chgData name="Miguel Trigueros Muñoz" userId="7753574ed83b4f98" providerId="LiveId" clId="{6BB54B94-95A1-4CB9-84EC-4B68CAB84776}" dt="2025-07-08T08:38:20.418" v="809" actId="1076"/>
-          <ac:spMkLst>
-            <pc:docMk/>
-            <pc:sldMk cId="1660613626" sldId="356"/>
-            <ac:spMk id="6" creationId="{2A6C73E2-9971-CF69-8548-DC8312592D02}"/>
-          </ac:spMkLst>
-        </pc:spChg>
-        <pc:picChg chg="add mod">
-          <ac:chgData name="Miguel Trigueros Muñoz" userId="7753574ed83b4f98" providerId="LiveId" clId="{6BB54B94-95A1-4CB9-84EC-4B68CAB84776}" dt="2025-06-25T11:16:49.475" v="434" actId="14100"/>
-          <ac:picMkLst>
-            <pc:docMk/>
-            <pc:sldMk cId="1660613626" sldId="356"/>
-            <ac:picMk id="5" creationId="{3BAA878E-1174-2648-C6F5-CBDA3143EC04}"/>
-          </ac:picMkLst>
-        </pc:picChg>
-      </pc:sldChg>
-      <pc:sldChg chg="addSp delSp modSp add mod">
-        <pc:chgData name="Miguel Trigueros Muñoz" userId="7753574ed83b4f98" providerId="LiveId" clId="{6BB54B94-95A1-4CB9-84EC-4B68CAB84776}" dt="2025-07-08T08:38:35.375" v="815" actId="1076"/>
-        <pc:sldMkLst>
-          <pc:docMk/>
-          <pc:sldMk cId="4247384922" sldId="357"/>
-        </pc:sldMkLst>
-        <pc:spChg chg="mod">
-          <ac:chgData name="Miguel Trigueros Muñoz" userId="7753574ed83b4f98" providerId="LiveId" clId="{6BB54B94-95A1-4CB9-84EC-4B68CAB84776}" dt="2025-06-25T11:18:22.180" v="477" actId="20577"/>
-          <ac:spMkLst>
-            <pc:docMk/>
-            <pc:sldMk cId="4247384922" sldId="357"/>
-            <ac:spMk id="2" creationId="{A20C8586-5DA6-09E1-6B6C-DECEF556A6CB}"/>
-          </ac:spMkLst>
-        </pc:spChg>
-        <pc:spChg chg="mod">
-          <ac:chgData name="Miguel Trigueros Muñoz" userId="7753574ed83b4f98" providerId="LiveId" clId="{6BB54B94-95A1-4CB9-84EC-4B68CAB84776}" dt="2025-06-25T11:17:35.945" v="452" actId="20577"/>
-          <ac:spMkLst>
-            <pc:docMk/>
-            <pc:sldMk cId="4247384922" sldId="357"/>
-            <ac:spMk id="3" creationId="{967773EC-3856-B16D-D050-DFDB10CC6B77}"/>
-          </ac:spMkLst>
-        </pc:spChg>
-        <pc:spChg chg="add mod">
-          <ac:chgData name="Miguel Trigueros Muñoz" userId="7753574ed83b4f98" providerId="LiveId" clId="{6BB54B94-95A1-4CB9-84EC-4B68CAB84776}" dt="2025-07-08T08:38:35.375" v="815" actId="1076"/>
-          <ac:spMkLst>
-            <pc:docMk/>
-            <pc:sldMk cId="4247384922" sldId="357"/>
-            <ac:spMk id="6" creationId="{948DECC6-71F7-78E3-695C-DE9A88B85399}"/>
-          </ac:spMkLst>
-        </pc:spChg>
-        <pc:picChg chg="add mod ord">
-          <ac:chgData name="Miguel Trigueros Muñoz" userId="7753574ed83b4f98" providerId="LiveId" clId="{6BB54B94-95A1-4CB9-84EC-4B68CAB84776}" dt="2025-07-08T08:38:29.811" v="814" actId="1076"/>
-          <ac:picMkLst>
-            <pc:docMk/>
-            <pc:sldMk cId="4247384922" sldId="357"/>
-            <ac:picMk id="5" creationId="{3B79FE88-E729-D3A2-1AC7-C63192D1468C}"/>
-          </ac:picMkLst>
-        </pc:picChg>
-      </pc:sldChg>
-      <pc:sldMasterChg chg="modSp mod">
-        <pc:chgData name="Miguel Trigueros Muñoz" userId="7753574ed83b4f98" providerId="LiveId" clId="{6BB54B94-95A1-4CB9-84EC-4B68CAB84776}" dt="2025-07-08T08:36:30.697" v="796" actId="20577"/>
-        <pc:sldMasterMkLst>
-          <pc:docMk/>
-          <pc:sldMasterMk cId="876523488" sldId="2147483687"/>
-        </pc:sldMasterMkLst>
-        <pc:spChg chg="mod">
-          <ac:chgData name="Miguel Trigueros Muñoz" userId="7753574ed83b4f98" providerId="LiveId" clId="{6BB54B94-95A1-4CB9-84EC-4B68CAB84776}" dt="2025-07-08T08:36:30.697" v="796" actId="20577"/>
-          <ac:spMkLst>
-            <pc:docMk/>
-            <pc:sldMasterMk cId="876523488" sldId="2147483687"/>
-            <ac:spMk id="18" creationId="{F589B1CF-02D4-4456-3BF5-4299A2F5FF62}"/>
-          </ac:spMkLst>
-        </pc:spChg>
-      </pc:sldMasterChg>
     </pc:docChg>
   </pc:docChgLst>
 </pc:chgInfo>
@@ -3412,7 +499,7 @@
           <a:p>
             <a:fld id="{BA89FAE3-5837-4C1B-BC4B-90063F16532C}" type="datetimeFigureOut">
               <a:rPr lang="es-ES" smtClean="0"/>
-              <a:t>08/07/2025</a:t>
+              <a:t>04/10/2025</a:t>
             </a:fld>
             <a:endParaRPr lang="es-ES"/>
           </a:p>
@@ -3676,7 +763,7 @@
           <a:p>
             <a:fld id="{8EB2F5B8-9C38-4C2F-A3DB-B7BB22627150}" type="datetimeFigureOut">
               <a:rPr lang="es-ES" smtClean="0"/>
-              <a:t>08/07/2025</a:t>
+              <a:t>03/10/2025</a:t>
             </a:fld>
             <a:endParaRPr lang="es-ES"/>
           </a:p>
@@ -7470,7 +4557,7 @@
           <a:p>
             <a:fld id="{4573F839-80E0-456A-B4D0-BAFED41946AC}" type="datetime1">
               <a:rPr lang="en-US" smtClean="0"/>
-              <a:t>7/8/2025</a:t>
+              <a:t>10/3/2025</a:t>
             </a:fld>
             <a:endParaRPr lang="en-US"/>
           </a:p>
@@ -7648,7 +4735,7 @@
           <a:p>
             <a:fld id="{51593C50-AD2B-485A-B3A1-D50376802F8F}" type="datetime1">
               <a:rPr lang="en-US" smtClean="0"/>
-              <a:t>7/8/2025</a:t>
+              <a:t>10/3/2025</a:t>
             </a:fld>
             <a:endParaRPr lang="en-US"/>
           </a:p>
@@ -13845,12 +10932,14 @@
         </p:nvSpPr>
         <p:spPr>
           <a:xfrm>
-            <a:off x="153628" y="1778356"/>
-            <a:ext cx="7834989" cy="3950208"/>
+            <a:off x="22772" y="1559585"/>
+            <a:ext cx="8707438" cy="5710555"/>
           </a:xfrm>
         </p:spPr>
         <p:txBody>
-          <a:bodyPr/>
+          <a:bodyPr vert="horz" lIns="91440" tIns="45720" rIns="91440" bIns="45720" rtlCol="0" anchor="t">
+            <a:normAutofit/>
+          </a:bodyPr>
           <a:lstStyle/>
           <a:p>
             <a:pPr marL="800100" lvl="1" indent="-342900" rtl="0" eaLnBrk="1" latinLnBrk="0" hangingPunct="1">
@@ -14164,62 +11253,87 @@
                 <a:solidFill>
                   <a:srgbClr val="0070C0"/>
                 </a:solidFill>
-                <a:latin typeface="Tahoma" panose="020B0604030504040204" pitchFamily="34" charset="0"/>
-                <a:ea typeface="Tahoma" panose="020B0604030504040204" pitchFamily="34" charset="0"/>
-                <a:cs typeface="Tahoma" panose="020B0604030504040204" pitchFamily="34" charset="0"/>
+                <a:latin typeface="Tahoma"/>
+                <a:ea typeface="Tahoma"/>
+                <a:cs typeface="Tahoma"/>
+              </a:rPr>
+              <a:t> </a:t>
+            </a:r>
+            <a:r>
+              <a:rPr lang="es-ES" sz="1600" dirty="0">
+                <a:solidFill>
+                  <a:srgbClr val="0070C0"/>
+                </a:solidFill>
+                <a:latin typeface="Tahoma"/>
+                <a:ea typeface="Tahoma"/>
+                <a:cs typeface="Tahoma"/>
               </a:rPr>
               <a:t>HERRAMIENTA: Web </a:t>
             </a:r>
             <a:r>
+              <a:rPr lang="es-ES" sz="1600" dirty="0">
+                <a:solidFill>
+                  <a:srgbClr val="0070C0"/>
+                </a:solidFill>
+                <a:latin typeface="Tahoma"/>
+                <a:ea typeface="Tahoma"/>
+                <a:cs typeface="Tahoma"/>
+                <a:hlinkClick r:id="rId2"/>
+              </a:rPr>
+              <a:t>Draw.io </a:t>
+            </a:r>
+            <a:endParaRPr lang="es-ES" sz="1600" dirty="0">
+              <a:solidFill>
+                <a:srgbClr val="0070C0"/>
+              </a:solidFill>
+              <a:effectLst/>
+              <a:latin typeface="Tahoma"/>
+              <a:ea typeface="Tahoma"/>
+              <a:cs typeface="Tahoma"/>
+            </a:endParaRPr>
+          </a:p>
+          <a:p>
+            <a:pPr marL="0" indent="0">
+              <a:buNone/>
+            </a:pPr>
+            <a:endParaRPr lang="es-ES" sz="1600" dirty="0">
+              <a:solidFill>
+                <a:srgbClr val="0070C0"/>
+              </a:solidFill>
+              <a:latin typeface="Tahoma"/>
+              <a:ea typeface="Tahoma"/>
+              <a:cs typeface="Tahoma"/>
+            </a:endParaRPr>
+          </a:p>
+          <a:p>
+            <a:pPr marL="0" indent="0">
+              <a:buNone/>
+            </a:pPr>
+            <a:endParaRPr lang="es-ES" sz="1600" dirty="0">
+              <a:solidFill>
+                <a:srgbClr val="0070C0"/>
+              </a:solidFill>
+              <a:latin typeface="Tahoma"/>
+              <a:ea typeface="Tahoma"/>
+              <a:cs typeface="Tahoma"/>
+            </a:endParaRPr>
+          </a:p>
+          <a:p>
+            <a:pPr lvl="2">
+              <a:buFont typeface="Wingdings" charset="2"/>
+              <a:buChar char="§"/>
+            </a:pPr>
+            <a:r>
               <a:rPr lang="es-ES" dirty="0">
                 <a:solidFill>
-                  <a:srgbClr val="0070C0"/>
-                </a:solidFill>
-                <a:latin typeface="Tahoma" panose="020B0604030504040204" pitchFamily="34" charset="0"/>
-                <a:ea typeface="Tahoma" panose="020B0604030504040204" pitchFamily="34" charset="0"/>
-                <a:cs typeface="Tahoma" panose="020B0604030504040204" pitchFamily="34" charset="0"/>
-                <a:hlinkClick r:id="rId2"/>
-              </a:rPr>
-              <a:t>Draw.io </a:t>
-            </a:r>
-            <a:r>
-              <a:rPr lang="es-ES" dirty="0">
-                <a:solidFill>
-                  <a:srgbClr val="0070C0"/>
-                </a:solidFill>
-                <a:latin typeface="Tahoma" panose="020B0604030504040204" pitchFamily="34" charset="0"/>
-                <a:ea typeface="Tahoma" panose="020B0604030504040204" pitchFamily="34" charset="0"/>
-                <a:cs typeface="Tahoma" panose="020B0604030504040204" pitchFamily="34" charset="0"/>
-              </a:rPr>
-              <a:t>o umletino.com</a:t>
-            </a:r>
-          </a:p>
-          <a:p>
-            <a:pPr marL="342900" marR="0" lvl="0" indent="-342900" algn="l" defTabSz="457200" rtl="0" eaLnBrk="1" fontAlgn="auto" latinLnBrk="0" hangingPunct="1">
-              <a:lnSpc>
-                <a:spcPct val="100000"/>
-              </a:lnSpc>
-              <a:spcBef>
-                <a:spcPts val="1000"/>
-              </a:spcBef>
-              <a:spcAft>
-                <a:spcPts val="0"/>
-              </a:spcAft>
-              <a:buClr>
-                <a:schemeClr val="accent1"/>
-              </a:buClr>
-              <a:buSzPct val="80000"/>
-              <a:buFont typeface="Wingdings 3" charset="2"/>
-              <a:buChar char=""/>
-              <a:tabLst/>
-              <a:defRPr/>
-            </a:pPr>
-            <a:endParaRPr lang="es-ES" dirty="0">
-              <a:effectLst/>
-            </a:endParaRPr>
-          </a:p>
-          <a:p>
-            <a:endParaRPr lang="es-ES" dirty="0"/>
+                  <a:srgbClr val="FF0000"/>
+                </a:solidFill>
+                <a:latin typeface="Tahoma"/>
+                <a:ea typeface="Tahoma"/>
+                <a:cs typeface="Tahoma"/>
+              </a:rPr>
+              <a:t>HERRAMIENTA: PROBEMOS </a:t>
+            </a:r>
           </a:p>
         </p:txBody>
       </p:sp>
@@ -14274,15 +11388,10 @@
             <a:spLocks noGrp="1"/>
           </p:cNvSpPr>
           <p:nvPr>
-            <p:ph idx="4294967295"/>
-          </p:nvPr>
-        </p:nvSpPr>
-        <p:spPr>
-          <a:xfrm>
-            <a:off x="153628" y="1261958"/>
-            <a:ext cx="8570913" cy="338137"/>
-          </a:xfrm>
-        </p:spPr>
+            <p:ph idx="1"/>
+          </p:nvPr>
+        </p:nvSpPr>
+        <p:spPr/>
         <p:txBody>
           <a:bodyPr>
             <a:normAutofit fontScale="92500" lnSpcReduction="20000"/>
@@ -19504,17 +16613,19 @@
         </p:nvSpPr>
         <p:spPr/>
         <p:txBody>
-          <a:bodyPr/>
+          <a:bodyPr vert="horz" lIns="91440" tIns="45720" rIns="91440" bIns="45720" rtlCol="0" anchor="t">
+            <a:normAutofit/>
+          </a:bodyPr>
           <a:lstStyle/>
           <a:p>
             <a:r>
-              <a:rPr lang="es-ES" dirty="0">
+              <a:rPr lang="es-ES">
                 <a:solidFill>
                   <a:schemeClr val="tx2"/>
                 </a:solidFill>
-                <a:latin typeface="Tahoma" panose="020B0604030504040204" pitchFamily="34" charset="0"/>
-                <a:ea typeface="Tahoma" panose="020B0604030504040204" pitchFamily="34" charset="0"/>
-                <a:cs typeface="Tahoma" panose="020B0604030504040204" pitchFamily="34" charset="0"/>
+                <a:latin typeface="Tahoma"/>
+                <a:ea typeface="Tahoma"/>
+                <a:cs typeface="Tahoma"/>
               </a:rPr>
               <a:t>Realiza el caso práctico disponible en el repositorio</a:t>
             </a:r>

</xml_diff>

<commit_message>
Mejora el enunciado draw.io
</commit_message>
<xml_diff>
--- a/00 PRESENTACIONES compartida alumnos/ED02a - Diagramas de comportamiento CU.pptx
+++ b/00 PRESENTACIONES compartida alumnos/ED02a - Diagramas de comportamiento CU.pptx
@@ -261,7 +261,7 @@
 <file path=ppt/revisionInfo.xml><?xml version="1.0" encoding="utf-8"?>
 <p1510:revInfo xmlns:a="http://schemas.openxmlformats.org/drawingml/2006/main" xmlns:r="http://schemas.openxmlformats.org/officeDocument/2006/relationships" xmlns:p1510="http://schemas.microsoft.com/office/powerpoint/2015/10/main">
   <p1510:revLst>
-    <p1510:client id="{E09DD130-612E-646E-A622-1F0A4BF8BCB8}" v="29" dt="2025-10-04T07:15:30.355"/>
+    <p1510:client id="{90E2A9E7-7C12-B274-D7CB-01D663E1F7C2}" v="44" dt="2025-11-02T06:24:38.731"/>
   </p1510:revLst>
 </p1510:revInfo>
 </file>
@@ -319,14 +319,6 @@
             <ac:spMk id="3" creationId="{45075051-CFEA-750E-7BF4-B90054C05CEF}"/>
           </ac:spMkLst>
         </pc:spChg>
-        <pc:spChg chg="add del mod ord">
-          <ac:chgData name="MIGUEL TRIGUEROS MUÑOZ" userId="S::miguel.trigueros@aulaxxi.murciaeduca.es::a4ee0321-97d7-430f-98a8-7ed13ff9a4bf" providerId="AD" clId="Web-{E09DD130-612E-646E-A622-1F0A4BF8BCB8}" dt="2025-10-04T07:10:12.428" v="2"/>
-          <ac:spMkLst>
-            <pc:docMk/>
-            <pc:sldMk cId="1679762254" sldId="309"/>
-            <ac:spMk id="4" creationId="{39630288-84F8-3E5A-9858-A24CA4E7BAB1}"/>
-          </ac:spMkLst>
-        </pc:spChg>
         <pc:spChg chg="mod ord">
           <ac:chgData name="MIGUEL TRIGUEROS MUÑOZ" userId="S::miguel.trigueros@aulaxxi.murciaeduca.es::a4ee0321-97d7-430f-98a8-7ed13ff9a4bf" providerId="AD" clId="Web-{E09DD130-612E-646E-A622-1F0A4BF8BCB8}" dt="2025-10-04T07:10:12.428" v="2"/>
           <ac:spMkLst>
@@ -341,6 +333,53 @@
             <pc:docMk/>
             <pc:sldMk cId="1679762254" sldId="309"/>
             <ac:spMk id="6" creationId="{6AF26118-0494-EB9E-7176-C80456E36815}"/>
+          </ac:spMkLst>
+        </pc:spChg>
+      </pc:sldChg>
+    </pc:docChg>
+  </pc:docChgLst>
+  <pc:docChgLst>
+    <pc:chgData name="MIGUEL TRIGUEROS MUÑOZ" userId="S::miguel.trigueros@aulaxxi.murciaeduca.es::a4ee0321-97d7-430f-98a8-7ed13ff9a4bf" providerId="AD" clId="Web-{90E2A9E7-7C12-B274-D7CB-01D663E1F7C2}"/>
+    <pc:docChg chg="modSld">
+      <pc:chgData name="MIGUEL TRIGUEROS MUÑOZ" userId="S::miguel.trigueros@aulaxxi.murciaeduca.es::a4ee0321-97d7-430f-98a8-7ed13ff9a4bf" providerId="AD" clId="Web-{90E2A9E7-7C12-B274-D7CB-01D663E1F7C2}" dt="2025-11-02T06:24:38.434" v="26" actId="1076"/>
+      <pc:docMkLst>
+        <pc:docMk/>
+      </pc:docMkLst>
+      <pc:sldChg chg="delSp modSp">
+        <pc:chgData name="MIGUEL TRIGUEROS MUÑOZ" userId="S::miguel.trigueros@aulaxxi.murciaeduca.es::a4ee0321-97d7-430f-98a8-7ed13ff9a4bf" providerId="AD" clId="Web-{90E2A9E7-7C12-B274-D7CB-01D663E1F7C2}" dt="2025-11-02T06:23:37.398" v="6"/>
+        <pc:sldMkLst>
+          <pc:docMk/>
+          <pc:sldMk cId="1813723418" sldId="311"/>
+        </pc:sldMkLst>
+        <pc:spChg chg="mod">
+          <ac:chgData name="MIGUEL TRIGUEROS MUÑOZ" userId="S::miguel.trigueros@aulaxxi.murciaeduca.es::a4ee0321-97d7-430f-98a8-7ed13ff9a4bf" providerId="AD" clId="Web-{90E2A9E7-7C12-B274-D7CB-01D663E1F7C2}" dt="2025-11-02T06:23:37.398" v="6"/>
+          <ac:spMkLst>
+            <pc:docMk/>
+            <pc:sldMk cId="1813723418" sldId="311"/>
+            <ac:spMk id="5" creationId="{88D7B9B6-425E-3377-41A4-67288BA48F5C}"/>
+          </ac:spMkLst>
+        </pc:spChg>
+        <pc:cxnChg chg="del">
+          <ac:chgData name="MIGUEL TRIGUEROS MUÑOZ" userId="S::miguel.trigueros@aulaxxi.murciaeduca.es::a4ee0321-97d7-430f-98a8-7ed13ff9a4bf" providerId="AD" clId="Web-{90E2A9E7-7C12-B274-D7CB-01D663E1F7C2}" dt="2025-11-02T06:23:03.708" v="0"/>
+          <ac:cxnSpMkLst>
+            <pc:docMk/>
+            <pc:sldMk cId="1813723418" sldId="311"/>
+            <ac:cxnSpMk id="3" creationId="{7D902D33-A590-277A-4920-2646C6AF1BCD}"/>
+          </ac:cxnSpMkLst>
+        </pc:cxnChg>
+      </pc:sldChg>
+      <pc:sldChg chg="addSp modSp">
+        <pc:chgData name="MIGUEL TRIGUEROS MUÑOZ" userId="S::miguel.trigueros@aulaxxi.murciaeduca.es::a4ee0321-97d7-430f-98a8-7ed13ff9a4bf" providerId="AD" clId="Web-{90E2A9E7-7C12-B274-D7CB-01D663E1F7C2}" dt="2025-11-02T06:24:38.434" v="26" actId="1076"/>
+        <pc:sldMkLst>
+          <pc:docMk/>
+          <pc:sldMk cId="1814859966" sldId="313"/>
+        </pc:sldMkLst>
+        <pc:spChg chg="add mod">
+          <ac:chgData name="MIGUEL TRIGUEROS MUÑOZ" userId="S::miguel.trigueros@aulaxxi.murciaeduca.es::a4ee0321-97d7-430f-98a8-7ed13ff9a4bf" providerId="AD" clId="Web-{90E2A9E7-7C12-B274-D7CB-01D663E1F7C2}" dt="2025-11-02T06:24:38.434" v="26" actId="1076"/>
+          <ac:spMkLst>
+            <pc:docMk/>
+            <pc:sldMk cId="1814859966" sldId="313"/>
+            <ac:spMk id="10" creationId="{B4AF8F94-C012-9746-80BC-5687F3F16C0B}"/>
           </ac:spMkLst>
         </pc:spChg>
       </pc:sldChg>
@@ -499,7 +538,7 @@
           <a:p>
             <a:fld id="{BA89FAE3-5837-4C1B-BC4B-90063F16532C}" type="datetimeFigureOut">
               <a:rPr lang="es-ES" smtClean="0"/>
-              <a:t>04/10/2025</a:t>
+              <a:t>01/11/2025</a:t>
             </a:fld>
             <a:endParaRPr lang="es-ES"/>
           </a:p>
@@ -763,7 +802,7 @@
           <a:p>
             <a:fld id="{8EB2F5B8-9C38-4C2F-A3DB-B7BB22627150}" type="datetimeFigureOut">
               <a:rPr lang="es-ES" smtClean="0"/>
-              <a:t>03/10/2025</a:t>
+              <a:t>01/11/2025</a:t>
             </a:fld>
             <a:endParaRPr lang="es-ES"/>
           </a:p>
@@ -4557,7 +4596,7 @@
           <a:p>
             <a:fld id="{4573F839-80E0-456A-B4D0-BAFED41946AC}" type="datetime1">
               <a:rPr lang="en-US" smtClean="0"/>
-              <a:t>10/3/2025</a:t>
+              <a:t>11/1/2025</a:t>
             </a:fld>
             <a:endParaRPr lang="en-US"/>
           </a:p>
@@ -4735,7 +4774,7 @@
           <a:p>
             <a:fld id="{51593C50-AD2B-485A-B3A1-D50376802F8F}" type="datetime1">
               <a:rPr lang="en-US" smtClean="0"/>
-              <a:t>10/3/2025</a:t>
+              <a:t>11/1/2025</a:t>
             </a:fld>
             <a:endParaRPr lang="en-US"/>
           </a:p>
@@ -12250,6 +12289,43 @@
           </a:p>
         </p:txBody>
       </p:sp>
+      <p:sp>
+        <p:nvSpPr>
+          <p:cNvPr id="10" name="CuadroTexto 9">
+            <a:extLst>
+              <a:ext uri="{FF2B5EF4-FFF2-40B4-BE49-F238E27FC236}">
+                <a16:creationId xmlns:a16="http://schemas.microsoft.com/office/drawing/2014/main" id="{B4AF8F94-C012-9746-80BC-5687F3F16C0B}"/>
+              </a:ext>
+            </a:extLst>
+          </p:cNvPr>
+          <p:cNvSpPr txBox="1"/>
+          <p:nvPr/>
+        </p:nvSpPr>
+        <p:spPr>
+          <a:xfrm>
+            <a:off x="278951" y="2067190"/>
+            <a:ext cx="838764" cy="553998"/>
+          </a:xfrm>
+          <a:prstGeom prst="rect">
+            <a:avLst/>
+          </a:prstGeom>
+          <a:solidFill>
+            <a:schemeClr val="bg1"/>
+          </a:solidFill>
+        </p:spPr>
+        <p:txBody>
+          <a:bodyPr wrap="square" lIns="91440" tIns="45720" rIns="91440" bIns="45720" rtlCol="0" anchor="t">
+            <a:spAutoFit/>
+          </a:bodyPr>
+          <a:lstStyle/>
+          <a:p>
+            <a:r>
+              <a:rPr lang="es-ES" sz="1000" dirty="0"/>
+              <a:t>Mejorar el nombre del rol</a:t>
+            </a:r>
+          </a:p>
+        </p:txBody>
+      </p:sp>
     </p:spTree>
     <p:extLst>
       <p:ext uri="{BB962C8B-B14F-4D97-AF65-F5344CB8AC3E}">
@@ -12835,44 +12911,6 @@
           </a:prstGeom>
         </p:spPr>
       </p:pic>
-      <p:cxnSp>
-        <p:nvCxnSpPr>
-          <p:cNvPr id="3" name="Conector recto 2">
-            <a:extLst>
-              <a:ext uri="{FF2B5EF4-FFF2-40B4-BE49-F238E27FC236}">
-                <a16:creationId xmlns:a16="http://schemas.microsoft.com/office/drawing/2014/main" id="{7D902D33-A590-277A-4920-2646C6AF1BCD}"/>
-              </a:ext>
-            </a:extLst>
-          </p:cNvPr>
-          <p:cNvCxnSpPr>
-            <a:cxnSpLocks/>
-          </p:cNvCxnSpPr>
-          <p:nvPr/>
-        </p:nvCxnSpPr>
-        <p:spPr>
-          <a:xfrm>
-            <a:off x="351085" y="3570791"/>
-            <a:ext cx="857955" cy="0"/>
-          </a:xfrm>
-          <a:prstGeom prst="line">
-            <a:avLst/>
-          </a:prstGeom>
-        </p:spPr>
-        <p:style>
-          <a:lnRef idx="3">
-            <a:schemeClr val="accent5"/>
-          </a:lnRef>
-          <a:fillRef idx="0">
-            <a:schemeClr val="accent5"/>
-          </a:fillRef>
-          <a:effectRef idx="2">
-            <a:schemeClr val="accent5"/>
-          </a:effectRef>
-          <a:fontRef idx="minor">
-            <a:schemeClr val="tx1"/>
-          </a:fontRef>
-        </p:style>
-      </p:cxnSp>
       <p:sp>
         <p:nvSpPr>
           <p:cNvPr id="5" name="CuadroTexto 4">
@@ -12887,22 +12925,24 @@
         </p:nvSpPr>
         <p:spPr>
           <a:xfrm>
-            <a:off x="187511" y="3631830"/>
-            <a:ext cx="1580444" cy="369332"/>
+            <a:off x="431351" y="3428630"/>
+            <a:ext cx="838764" cy="246221"/>
           </a:xfrm>
           <a:prstGeom prst="rect">
             <a:avLst/>
           </a:prstGeom>
-          <a:noFill/>
+          <a:solidFill>
+            <a:schemeClr val="bg1"/>
+          </a:solidFill>
         </p:spPr>
         <p:txBody>
-          <a:bodyPr wrap="square" rtlCol="0">
+          <a:bodyPr wrap="square" lIns="91440" tIns="45720" rIns="91440" bIns="45720" rtlCol="0" anchor="t">
             <a:spAutoFit/>
           </a:bodyPr>
           <a:lstStyle/>
           <a:p>
             <a:r>
-              <a:rPr lang="es-ES" dirty="0"/>
+              <a:rPr lang="es-ES" sz="1000" dirty="0"/>
               <a:t>Ciudadano</a:t>
             </a:r>
           </a:p>

</xml_diff>